<commit_message>
Minor changes in part 1
</commit_message>
<xml_diff>
--- a/pt1/lectures/lecture1/lecture1.pptx
+++ b/pt1/lectures/lecture1/lecture1.pptx
@@ -11995,119 +11995,6 @@
       </p:grpSpPr>
       <p:sp>
         <p:nvSpPr>
-          <p:cNvPr id="3" name="Объект 2"/>
-          <p:cNvSpPr>
-            <a:spLocks noGrp="1"/>
-          </p:cNvSpPr>
-          <p:nvPr>
-            <p:ph idx="1"/>
-          </p:nvPr>
-        </p:nvSpPr>
-        <p:spPr bwMode="auto">
-          <a:xfrm flipH="0" flipV="0">
-            <a:off x="5011150" y="1316735"/>
-            <a:ext cx="6928003" cy="4988813"/>
-          </a:xfrm>
-          <a:prstGeom prst="rect">
-            <a:avLst/>
-          </a:prstGeom>
-          <a:solidFill>
-            <a:schemeClr val="bg1"/>
-          </a:solidFill>
-        </p:spPr>
-        <p:txBody>
-          <a:bodyPr vertOverflow="overflow" horzOverflow="overflow" vert="horz" wrap="square" lIns="91440" tIns="45720" rIns="91440" bIns="45720" numCol="1" spcCol="0" rtlCol="0" fromWordArt="0" anchor="t" anchorCtr="0" forceAA="0" upright="0" compatLnSpc="0">
-            <a:normAutofit fontScale="95000" lnSpcReduction="1000"/>
-          </a:bodyPr>
-          <a:lstStyle/>
-          <a:p>
-            <a:pPr>
-              <a:buClr>
-                <a:schemeClr val="accent1"/>
-              </a:buClr>
-              <a:buSzPct val="80000"/>
-              <a:buFont typeface="Wingdings"/>
-              <a:buChar char="Ø"/>
-              <a:defRPr/>
-            </a:pPr>
-            <a:r>
-              <a:rPr lang="ru-RU"/>
-              <a:t>Для простой инициализации членов данных объекта предусмотрен список инициализации</a:t>
-            </a:r>
-            <a:endParaRPr/>
-          </a:p>
-          <a:p>
-            <a:pPr>
-              <a:buClr>
-                <a:schemeClr val="accent1"/>
-              </a:buClr>
-              <a:buSzPct val="80000"/>
-              <a:buFont typeface="Wingdings"/>
-              <a:buChar char="Ø"/>
-              <a:defRPr/>
-            </a:pPr>
-            <a:r>
-              <a:rPr lang="ru-RU"/>
-              <a:t>Члены данных, не инициализированные в списке инициализации, сначала создаются при помощи конструкторов по умолчанию (если это объекты, а не переменные встроенных типов), и только потом поток выполнения переходит в конструктор</a:t>
-            </a:r>
-            <a:endParaRPr/>
-          </a:p>
-          <a:p>
-            <a:pPr>
-              <a:buClr>
-                <a:schemeClr val="accent1"/>
-              </a:buClr>
-              <a:buSzPct val="80000"/>
-              <a:buFont typeface="Wingdings"/>
-              <a:buChar char="Ø"/>
-              <a:defRPr/>
-            </a:pPr>
-            <a:r>
-              <a:rPr lang="ru-RU"/>
-              <a:t>При инициализации в списке инициализации предварительного создания объекта-члена данных с конструктором по умолчанию не происходит</a:t>
-            </a:r>
-            <a:endParaRPr/>
-          </a:p>
-          <a:p>
-            <a:pPr>
-              <a:buClr>
-                <a:schemeClr val="accent1"/>
-              </a:buClr>
-              <a:buSzPct val="80000"/>
-              <a:buFont typeface="Wingdings"/>
-              <a:buChar char="Ø"/>
-              <a:defRPr/>
-            </a:pPr>
-            <a:r>
-              <a:rPr lang="ru-RU"/>
-              <a:t>Если для инициализации объекта-члена данных класса достаточно конструктора по умолчанию указанного объекта-члена данных, в явном виде вызывать его конструктор не нужно</a:t>
-            </a:r>
-            <a:endParaRPr/>
-          </a:p>
-          <a:p>
-            <a:pPr>
-              <a:buClr>
-                <a:schemeClr val="accent1"/>
-              </a:buClr>
-              <a:buSzPct val="80000"/>
-              <a:buFont typeface="Wingdings"/>
-              <a:buChar char="Ø"/>
-              <a:defRPr/>
-            </a:pPr>
-            <a:r>
-              <a:rPr lang="ru-RU"/>
-              <a:t>Ч</a:t>
-            </a:r>
-            <a:r>
-              <a:rPr lang="ru-RU"/>
-              <a:t>лены данных, являющиеся нестатическими константами (см. дальше), могут быть инициализированы с параметрами только в списке инициализации</a:t>
-            </a:r>
-            <a:endParaRPr lang="en-US"/>
-          </a:p>
-        </p:txBody>
-      </p:sp>
-      <p:sp>
-        <p:nvSpPr>
           <p:cNvPr id="4" name="Заголовок 1"/>
           <p:cNvSpPr>
             <a:spLocks noGrp="1"/>
@@ -12119,7 +12006,7 @@
         <p:spPr bwMode="auto">
           <a:xfrm>
             <a:off x="283779" y="210557"/>
-            <a:ext cx="11655376" cy="984398"/>
+            <a:ext cx="11655376" cy="1113746"/>
           </a:xfrm>
           <a:prstGeom prst="rect">
             <a:avLst/>
@@ -12154,9 +12041,264 @@
           </a:p>
         </p:txBody>
       </p:sp>
+      <p:sp>
+        <p:nvSpPr>
+          <p:cNvPr id="5" name="Объект 2"/>
+          <p:cNvSpPr>
+            <a:spLocks noGrp="1"/>
+          </p:cNvSpPr>
+          <p:nvPr>
+            <p:ph idx="1"/>
+          </p:nvPr>
+        </p:nvSpPr>
+        <p:spPr bwMode="auto">
+          <a:xfrm>
+            <a:off x="283778" y="1496291"/>
+            <a:ext cx="11655377" cy="4042476"/>
+          </a:xfrm>
+          <a:prstGeom prst="rect">
+            <a:avLst/>
+          </a:prstGeom>
+          <a:solidFill>
+            <a:schemeClr val="bg1"/>
+          </a:solidFill>
+        </p:spPr>
+        <p:txBody>
+          <a:bodyPr>
+            <a:normAutofit fontScale="92500" lnSpcReduction="10000"/>
+          </a:bodyPr>
+          <a:lstStyle/>
+          <a:p>
+            <a:pPr>
+              <a:buClr>
+                <a:schemeClr val="accent1"/>
+              </a:buClr>
+              <a:buSzPct val="80000"/>
+              <a:buFont typeface="Wingdings"/>
+              <a:buChar char="Ø"/>
+              <a:defRPr/>
+            </a:pPr>
+            <a:r>
+              <a:rPr lang="ru-RU" sz="2000"/>
+              <a:t>При создании объекта класса каждый объект получает свою собственную копию нестатических свойств </a:t>
+            </a:r>
+            <a:endParaRPr lang="ru-RU" sz="2000"/>
+          </a:p>
+          <a:p>
+            <a:pPr>
+              <a:buClr>
+                <a:schemeClr val="accent1"/>
+              </a:buClr>
+              <a:buSzPct val="80000"/>
+              <a:buFont typeface="Wingdings"/>
+              <a:buChar char="Ø"/>
+              <a:defRPr/>
+            </a:pPr>
+            <a:r>
+              <a:rPr lang="ru-RU" sz="2000"/>
+              <a:t>Статические </a:t>
+            </a:r>
+            <a:r>
+              <a:rPr lang="ru-RU" sz="2000"/>
+              <a:t>члены класса, т. е. объявленные как  </a:t>
+            </a:r>
+            <a:r>
+              <a:rPr lang="en-US" sz="2000"/>
+              <a:t>static</a:t>
+            </a:r>
+            <a:r>
+              <a:rPr lang="ru-RU" sz="2000"/>
+              <a:t>, относятся к классу как к пространству имен, а не к конкретному объекту, поэтому они при создании новых объектов не копируются, но объекты, будучи экземплярами класса, тоже имеют к ним </a:t>
+            </a:r>
+            <a:r>
+              <a:rPr lang="ru-RU" sz="2000"/>
+              <a:t>доступ</a:t>
+            </a:r>
+            <a:endParaRPr lang="en-US" sz="2000"/>
+          </a:p>
+          <a:p>
+            <a:pPr>
+              <a:buClr>
+                <a:schemeClr val="accent1"/>
+              </a:buClr>
+              <a:buSzPct val="80000"/>
+              <a:buFont typeface="Wingdings"/>
+              <a:buChar char="Ø"/>
+              <a:defRPr/>
+            </a:pPr>
+            <a:r>
+              <a:rPr lang="ru-RU" sz="2000"/>
+              <a:t>По этой причине из статических методов нельзя обращаться к нестатическим членам класса – это не их уровень абстракции. Объект является экземпляром класса, поэтому он «видит» всё, что в нём есть, однако, статические члены принадлежат классу, а не объекту. Как правило, статическими объявляют простые «служебные» </a:t>
+            </a:r>
+            <a:r>
+              <a:rPr lang="ru-RU" sz="2000"/>
+              <a:t>методы</a:t>
+            </a:r>
+            <a:endParaRPr/>
+          </a:p>
+          <a:p>
+            <a:pPr>
+              <a:buClr>
+                <a:schemeClr val="accent1"/>
+              </a:buClr>
+              <a:buSzPct val="80000"/>
+              <a:buFont typeface="Wingdings"/>
+              <a:buChar char="Ø"/>
+              <a:defRPr/>
+            </a:pPr>
+            <a:r>
+              <a:rPr lang="ru-RU" sz="2000"/>
+              <a:t>Статические переменные класса – это, как правило, константы. Поэтому они часто объявляются как </a:t>
+            </a:r>
+            <a:r>
+              <a:rPr lang="en-US" sz="2000"/>
+              <a:t>static </a:t>
+            </a:r>
+            <a:r>
+              <a:rPr lang="en-US" sz="2000"/>
+              <a:t>const</a:t>
+            </a:r>
+            <a:endParaRPr lang="ru-RU" sz="2000"/>
+          </a:p>
+          <a:p>
+            <a:pPr>
+              <a:buClr>
+                <a:schemeClr val="accent1"/>
+              </a:buClr>
+              <a:buSzPct val="80000"/>
+              <a:buFont typeface="Wingdings"/>
+              <a:buChar char="Ø"/>
+              <a:defRPr/>
+            </a:pPr>
+            <a:r>
+              <a:rPr lang="ru-RU" sz="2000"/>
+              <a:t>Статические переменные </a:t>
+            </a:r>
+            <a:r>
+              <a:rPr lang="ru-RU" sz="2000"/>
+              <a:t>класса не инициализируются в конструкторе, т.к. не относятся к конкретному объекту</a:t>
+            </a:r>
+            <a:endParaRPr/>
+          </a:p>
+          <a:p>
+            <a:pPr>
+              <a:buClr>
+                <a:schemeClr val="accent1"/>
+              </a:buClr>
+              <a:buSzPct val="80000"/>
+              <a:buFont typeface="Wingdings"/>
+              <a:buChar char="Ø"/>
+              <a:defRPr/>
+            </a:pPr>
+            <a:endParaRPr lang="en-US" sz="2000"/>
+          </a:p>
+          <a:p>
+            <a:pPr>
+              <a:buClr>
+                <a:schemeClr val="accent1"/>
+              </a:buClr>
+              <a:buSzPct val="80000"/>
+              <a:buFont typeface="Wingdings"/>
+              <a:buChar char="Ø"/>
+              <a:defRPr/>
+            </a:pPr>
+            <a:endParaRPr lang="en-US" sz="2400"/>
+          </a:p>
+        </p:txBody>
+      </p:sp>
+      <p:sp>
+        <p:nvSpPr>
+          <p:cNvPr id="6" name="TextBox 5"/>
+          <p:cNvSpPr txBox="1"/>
+          <p:nvPr/>
+        </p:nvSpPr>
+        <p:spPr bwMode="auto">
+          <a:xfrm>
+            <a:off x="576485" y="5538768"/>
+            <a:ext cx="2542683" cy="923330"/>
+          </a:xfrm>
+          <a:prstGeom prst="rect">
+            <a:avLst/>
+          </a:prstGeom>
+          <a:noFill/>
+        </p:spPr>
+        <p:txBody>
+          <a:bodyPr wrap="none" rtlCol="0">
+            <a:spAutoFit/>
+          </a:bodyPr>
+          <a:lstStyle/>
+          <a:p>
+            <a:pPr algn="ctr">
+              <a:defRPr/>
+            </a:pPr>
+            <a:r>
+              <a:rPr lang="en-US"/>
+              <a:t>cat.h</a:t>
+            </a:r>
+            <a:endParaRPr lang="ru-RU"/>
+          </a:p>
+          <a:p>
+            <a:pPr algn="ctr">
+              <a:defRPr/>
+            </a:pPr>
+            <a:r>
+              <a:rPr lang="ru-RU"/>
+              <a:t>(внутри </a:t>
+            </a:r>
+            <a:endParaRPr/>
+          </a:p>
+          <a:p>
+            <a:pPr algn="ctr">
+              <a:defRPr/>
+            </a:pPr>
+            <a:r>
+              <a:rPr lang="ru-RU"/>
+              <a:t>определения класса):</a:t>
+            </a:r>
+            <a:endParaRPr lang="en-US"/>
+          </a:p>
+        </p:txBody>
+      </p:sp>
+      <p:sp>
+        <p:nvSpPr>
+          <p:cNvPr id="7" name="TextBox 6"/>
+          <p:cNvSpPr txBox="1"/>
+          <p:nvPr/>
+        </p:nvSpPr>
+        <p:spPr bwMode="auto">
+          <a:xfrm>
+            <a:off x="7003216" y="5826384"/>
+            <a:ext cx="1051891" cy="369332"/>
+          </a:xfrm>
+          <a:prstGeom prst="rect">
+            <a:avLst/>
+          </a:prstGeom>
+          <a:noFill/>
+        </p:spPr>
+        <p:txBody>
+          <a:bodyPr wrap="none" rtlCol="0">
+            <a:spAutoFit/>
+          </a:bodyPr>
+          <a:lstStyle/>
+          <a:p>
+            <a:pPr>
+              <a:defRPr/>
+            </a:pPr>
+            <a:r>
+              <a:rPr lang="en-US"/>
+              <a:t>cat.cpp</a:t>
+            </a:r>
+            <a:r>
+              <a:rPr lang="ru-RU"/>
+              <a:t>:</a:t>
+            </a:r>
+            <a:endParaRPr lang="en-US"/>
+          </a:p>
+        </p:txBody>
+      </p:sp>
       <p:pic>
         <p:nvPicPr>
-          <p:cNvPr id="5" name="Рисунок 4"/>
+          <p:cNvPr id="3" name="Рисунок 2"/>
           <p:cNvPicPr>
             <a:picLocks noChangeAspect="1"/>
           </p:cNvPicPr>
@@ -12168,248 +12310,52 @@
         </p:blipFill>
         <p:spPr bwMode="auto">
           <a:xfrm>
-            <a:off x="613263" y="2073302"/>
-            <a:ext cx="4214708" cy="2882746"/>
+            <a:off x="3194468" y="5808744"/>
+            <a:ext cx="2740850" cy="519320"/>
           </a:xfrm>
           <a:prstGeom prst="rect">
             <a:avLst/>
           </a:prstGeom>
         </p:spPr>
       </p:pic>
-      <p:sp>
-        <p:nvSpPr>
-          <p:cNvPr id="6" name="Прямоугольник 5"/>
-          <p:cNvSpPr/>
+      <p:pic>
+        <p:nvPicPr>
+          <p:cNvPr id="10" name="Рисунок 9"/>
+          <p:cNvPicPr>
+            <a:picLocks noChangeAspect="1"/>
+          </p:cNvPicPr>
           <p:nvPr/>
-        </p:nvSpPr>
+        </p:nvPicPr>
+        <p:blipFill>
+          <a:blip r:embed="rId3"/>
+          <a:stretch/>
+        </p:blipFill>
         <p:spPr bwMode="auto">
           <a:xfrm>
-            <a:off x="1207008" y="2304287"/>
-            <a:ext cx="2340864" cy="512065"/>
+            <a:off x="8252730" y="5747181"/>
+            <a:ext cx="3278204" cy="506503"/>
+          </a:xfrm>
+          <a:prstGeom prst="rect">
+            <a:avLst/>
+          </a:prstGeom>
+        </p:spPr>
+      </p:pic>
+      <p:sp>
+        <p:nvSpPr>
+          <p:cNvPr id="843281296" name=""/>
+          <p:cNvSpPr txBox="1"/>
+          <p:nvPr/>
+        </p:nvSpPr>
+        <p:spPr bwMode="auto">
+          <a:xfrm flipH="0" flipV="0">
+            <a:off x="10110943" y="6328063"/>
+            <a:ext cx="1828211" cy="366119"/>
           </a:xfrm>
           <a:prstGeom prst="rect">
             <a:avLst/>
           </a:prstGeom>
           <a:noFill/>
         </p:spPr>
-        <p:style>
-          <a:lnRef idx="2">
-            <a:schemeClr val="accent1">
-              <a:shade val="50000"/>
-            </a:schemeClr>
-          </a:lnRef>
-          <a:fillRef idx="1">
-            <a:schemeClr val="accent1"/>
-          </a:fillRef>
-          <a:effectRef idx="0">
-            <a:schemeClr val="accent1"/>
-          </a:effectRef>
-          <a:fontRef idx="minor">
-            <a:schemeClr val="lt1"/>
-          </a:fontRef>
-        </p:style>
-        <p:txBody>
-          <a:bodyPr rtlCol="0" anchor="ctr"/>
-          <a:lstStyle/>
-          <a:p>
-            <a:pPr algn="ctr">
-              <a:defRPr/>
-            </a:pPr>
-            <a:endParaRPr lang="en-US"/>
-          </a:p>
-        </p:txBody>
-      </p:sp>
-      <p:sp>
-        <p:nvSpPr>
-          <p:cNvPr id="7" name="Прямоугольник 6"/>
-          <p:cNvSpPr/>
-          <p:nvPr/>
-        </p:nvSpPr>
-        <p:spPr bwMode="auto">
-          <a:xfrm>
-            <a:off x="1207008" y="3764280"/>
-            <a:ext cx="3529584" cy="512064"/>
-          </a:xfrm>
-          <a:prstGeom prst="rect">
-            <a:avLst/>
-          </a:prstGeom>
-          <a:noFill/>
-        </p:spPr>
-        <p:style>
-          <a:lnRef idx="2">
-            <a:schemeClr val="accent1">
-              <a:shade val="50000"/>
-            </a:schemeClr>
-          </a:lnRef>
-          <a:fillRef idx="1">
-            <a:schemeClr val="accent1"/>
-          </a:fillRef>
-          <a:effectRef idx="0">
-            <a:schemeClr val="accent1"/>
-          </a:effectRef>
-          <a:fontRef idx="minor">
-            <a:schemeClr val="lt1"/>
-          </a:fontRef>
-        </p:style>
-        <p:txBody>
-          <a:bodyPr rtlCol="0" anchor="ctr"/>
-          <a:lstStyle/>
-          <a:p>
-            <a:pPr algn="ctr">
-              <a:defRPr/>
-            </a:pPr>
-            <a:endParaRPr lang="en-US"/>
-          </a:p>
-        </p:txBody>
-      </p:sp>
-      <p:cxnSp>
-        <p:nvCxnSpPr>
-          <p:cNvPr id="9" name="Прямая соединительная линия 8"/>
-          <p:cNvCxnSpPr>
-            <a:cxnSpLocks/>
-          </p:cNvCxnSpPr>
-          <p:nvPr/>
-        </p:nvCxnSpPr>
-        <p:spPr bwMode="auto">
-          <a:xfrm flipH="1">
-            <a:off x="430083" y="2304288"/>
-            <a:ext cx="776926" cy="0"/>
-          </a:xfrm>
-          <a:prstGeom prst="line">
-            <a:avLst/>
-          </a:prstGeom>
-          <a:ln w="19050"/>
-        </p:spPr>
-        <p:style>
-          <a:lnRef idx="1">
-            <a:schemeClr val="accent1"/>
-          </a:lnRef>
-          <a:fillRef idx="0">
-            <a:schemeClr val="accent1"/>
-          </a:fillRef>
-          <a:effectRef idx="0">
-            <a:schemeClr val="accent1"/>
-          </a:effectRef>
-          <a:fontRef idx="minor">
-            <a:schemeClr val="tx1"/>
-          </a:fontRef>
-        </p:style>
-      </p:cxnSp>
-      <p:cxnSp>
-        <p:nvCxnSpPr>
-          <p:cNvPr id="11" name="Прямая соединительная линия 10"/>
-          <p:cNvCxnSpPr>
-            <a:cxnSpLocks/>
-          </p:cNvCxnSpPr>
-          <p:nvPr/>
-        </p:nvCxnSpPr>
-        <p:spPr bwMode="auto">
-          <a:xfrm>
-            <a:off x="430083" y="2304288"/>
-            <a:ext cx="0" cy="3182112"/>
-          </a:xfrm>
-          <a:prstGeom prst="line">
-            <a:avLst/>
-          </a:prstGeom>
-          <a:ln w="19050"/>
-        </p:spPr>
-        <p:style>
-          <a:lnRef idx="1">
-            <a:schemeClr val="accent1"/>
-          </a:lnRef>
-          <a:fillRef idx="0">
-            <a:schemeClr val="accent1"/>
-          </a:fillRef>
-          <a:effectRef idx="0">
-            <a:schemeClr val="accent1"/>
-          </a:effectRef>
-          <a:fontRef idx="minor">
-            <a:schemeClr val="tx1"/>
-          </a:fontRef>
-        </p:style>
-      </p:cxnSp>
-      <p:cxnSp>
-        <p:nvCxnSpPr>
-          <p:cNvPr id="13" name="Прямая соединительная линия 12"/>
-          <p:cNvCxnSpPr>
-            <a:cxnSpLocks/>
-          </p:cNvCxnSpPr>
-          <p:nvPr/>
-        </p:nvCxnSpPr>
-        <p:spPr bwMode="auto">
-          <a:xfrm flipH="1">
-            <a:off x="430083" y="3764280"/>
-            <a:ext cx="776926" cy="0"/>
-          </a:xfrm>
-          <a:prstGeom prst="line">
-            <a:avLst/>
-          </a:prstGeom>
-          <a:ln w="19050"/>
-        </p:spPr>
-        <p:style>
-          <a:lnRef idx="1">
-            <a:schemeClr val="accent1"/>
-          </a:lnRef>
-          <a:fillRef idx="0">
-            <a:schemeClr val="accent1"/>
-          </a:fillRef>
-          <a:effectRef idx="0">
-            <a:schemeClr val="accent1"/>
-          </a:effectRef>
-          <a:fontRef idx="minor">
-            <a:schemeClr val="tx1"/>
-          </a:fontRef>
-        </p:style>
-      </p:cxnSp>
-      <p:sp>
-        <p:nvSpPr>
-          <p:cNvPr id="17" name="TextBox 16"/>
-          <p:cNvSpPr txBox="1"/>
-          <p:nvPr/>
-        </p:nvSpPr>
-        <p:spPr bwMode="auto">
-          <a:xfrm>
-            <a:off x="430083" y="5373099"/>
-            <a:ext cx="2648482" cy="369332"/>
-          </a:xfrm>
-          <a:prstGeom prst="rect">
-            <a:avLst/>
-          </a:prstGeom>
-          <a:noFill/>
-        </p:spPr>
-        <p:txBody>
-          <a:bodyPr wrap="none" rtlCol="0">
-            <a:spAutoFit/>
-          </a:bodyPr>
-          <a:lstStyle/>
-          <a:p>
-            <a:pPr>
-              <a:defRPr/>
-            </a:pPr>
-            <a:r>
-              <a:rPr lang="ru-RU"/>
-              <a:t>Список инициализации</a:t>
-            </a:r>
-            <a:endParaRPr lang="en-US"/>
-          </a:p>
-        </p:txBody>
-      </p:sp>
-      <p:sp>
-        <p:nvSpPr>
-          <p:cNvPr id="567220444" name=""/>
-          <p:cNvSpPr txBox="1"/>
-          <p:nvPr/>
-        </p:nvSpPr>
-        <p:spPr bwMode="auto">
-          <a:xfrm flipH="0" flipV="0">
-            <a:off x="8286618" y="6305549"/>
-            <a:ext cx="3638022" cy="366119"/>
-          </a:xfrm>
-          <a:prstGeom prst="rect">
-            <a:avLst/>
-          </a:prstGeom>
-          <a:noFill/>
-        </p:spPr>
         <p:txBody>
           <a:bodyPr vertOverflow="overflow" horzOverflow="overflow" vert="horz" wrap="none" lIns="91440" tIns="45720" rIns="91440" bIns="45720" numCol="1" spcCol="0" rtlCol="0" fromWordArt="0" anchor="t" anchorCtr="0" forceAA="0" upright="0" compatLnSpc="0">
             <a:spAutoFit/>
@@ -12420,7 +12366,7 @@
             </a:pPr>
             <a:r>
               <a:rPr/>
-              <a:t>examples/2_default_construction</a:t>
+              <a:t>examples/1_cat</a:t>
             </a:r>
             <a:endParaRPr/>
           </a:p>
@@ -12439,6 +12385,13 @@
       <p:transition advClick="1"/>
     </mc:Fallback>
   </mc:AlternateContent>
+  <p:timing>
+    <p:tnLst>
+      <p:par>
+        <p:cTn id="1" dur="indefinite" restart="never" nodeType="tmRoot"/>
+      </p:par>
+    </p:tnLst>
+  </p:timing>
 </p:sld>
 </file>
 
@@ -12472,7 +12425,7 @@
         <p:spPr bwMode="auto">
           <a:xfrm>
             <a:off x="283779" y="210557"/>
-            <a:ext cx="11655376" cy="1113746"/>
+            <a:ext cx="11655376" cy="822715"/>
           </a:xfrm>
           <a:prstGeom prst="rect">
             <a:avLst/>
@@ -12501,7 +12454,7 @@
             </a:r>
             <a:r>
               <a:rPr lang="ru-RU" sz="2800" b="1"/>
-              <a:t>ООП в С++. Создание объекта</a:t>
+              <a:t>ООП в С++. Характеристики объекта</a:t>
             </a:r>
             <a:endParaRPr lang="en-US" sz="2800" b="1"/>
           </a:p>
@@ -12519,8 +12472,8 @@
         </p:nvSpPr>
         <p:spPr bwMode="auto">
           <a:xfrm>
-            <a:off x="283778" y="1496291"/>
-            <a:ext cx="11655377" cy="4042476"/>
+            <a:off x="283778" y="1234441"/>
+            <a:ext cx="11655377" cy="5405350"/>
           </a:xfrm>
           <a:prstGeom prst="rect">
             <a:avLst/>
@@ -12531,7 +12484,7 @@
         </p:spPr>
         <p:txBody>
           <a:bodyPr>
-            <a:normAutofit fontScale="92500" lnSpcReduction="10000"/>
+            <a:normAutofit/>
           </a:bodyPr>
           <a:lstStyle/>
           <a:p>
@@ -12546,9 +12499,33 @@
             </a:pPr>
             <a:r>
               <a:rPr lang="ru-RU" sz="2000"/>
-              <a:t>При создании объекта класса каждый объект получает свою собственную копию нестатических свойств </a:t>
-            </a:r>
-            <a:endParaRPr lang="ru-RU" sz="2000"/>
+              <a:t>Состояние объекта </a:t>
+            </a:r>
+            <a:r>
+              <a:rPr lang="ru-RU" sz="2000"/>
+              <a:t>характеризуется перечнем </a:t>
+            </a:r>
+            <a:r>
+              <a:rPr lang="ru-RU" sz="2000"/>
+              <a:t>всех </a:t>
+            </a:r>
+            <a:r>
+              <a:rPr lang="ru-RU" sz="2000"/>
+              <a:t>свойств данного объекта и текущими </a:t>
+            </a:r>
+            <a:r>
+              <a:rPr lang="ru-RU" sz="2000"/>
+              <a:t>значениями </a:t>
+            </a:r>
+            <a:r>
+              <a:rPr lang="ru-RU" sz="2000"/>
+              <a:t>каждого из этих </a:t>
+            </a:r>
+            <a:r>
+              <a:rPr lang="ru-RU" sz="2000"/>
+              <a:t>свойств, т.е. отражает его «историю»</a:t>
+            </a:r>
+            <a:endParaRPr/>
           </a:p>
           <a:p>
             <a:pPr>
@@ -12562,25 +12539,25 @@
             </a:pPr>
             <a:r>
               <a:rPr lang="ru-RU" sz="2000"/>
-              <a:t>Статические </a:t>
+              <a:t>Поведение </a:t>
             </a:r>
             <a:r>
               <a:rPr lang="ru-RU" sz="2000"/>
-              <a:t>члены класса, т. е. объявленные как  </a:t>
-            </a:r>
-            <a:r>
-              <a:rPr lang="en-US" sz="2000"/>
-              <a:t>static</a:t>
+              <a:t>объекта - это его наблюдаемая и проверяемая извне </a:t>
             </a:r>
             <a:r>
               <a:rPr lang="ru-RU" sz="2000"/>
-              <a:t>, относятся к классу как к пространству имен, а не к конкретному объекту, поэтому они при создании новых объектов не копируются, но объекты, будучи экземплярами класса, тоже имеют к ним </a:t>
+              <a:t>деятельность. </a:t>
             </a:r>
             <a:r>
               <a:rPr lang="ru-RU" sz="2000"/>
-              <a:t>доступ</a:t>
-            </a:r>
-            <a:endParaRPr lang="en-US" sz="2000"/>
+              <a:t>Объекты не существуют изолированно, а подвергаются воздействию или сами воздействуют на другие </a:t>
+            </a:r>
+            <a:r>
+              <a:rPr lang="ru-RU" sz="2000"/>
+              <a:t>объекты. То, что объекты могут делать и то, что можно делать с ними, определяется реализацией его открытых функций-членов (публичных методов) и его состоянием</a:t>
+            </a:r>
+            <a:endParaRPr/>
           </a:p>
           <a:p>
             <a:pPr>
@@ -12594,196 +12571,16 @@
             </a:pPr>
             <a:r>
               <a:rPr lang="ru-RU" sz="2000"/>
-              <a:t>По этой причине из статических методов нельзя обращаться к нестатическим членам класса – это не их уровень абстракции. Объект является экземпляром класса, поэтому он «видит» всё, что в нём есть, однако, статические члены принадлежат классу, а не объекту. Как правило, статическими объявляют простые «служебные» </a:t>
+              <a:t>Идентичность (уникальность) – это такое свойство объекта, которое отличает его от всех других </a:t>
             </a:r>
             <a:r>
               <a:rPr lang="ru-RU" sz="2000"/>
-              <a:t>методы</a:t>
-            </a:r>
-            <a:endParaRPr/>
-          </a:p>
-          <a:p>
-            <a:pPr>
-              <a:buClr>
-                <a:schemeClr val="accent1"/>
-              </a:buClr>
-              <a:buSzPct val="80000"/>
-              <a:buFont typeface="Wingdings"/>
-              <a:buChar char="Ø"/>
-              <a:defRPr/>
-            </a:pPr>
-            <a:r>
-              <a:rPr lang="ru-RU" sz="2000"/>
-              <a:t>Статические переменные класса – это, как правило, константы. Поэтому они часто объявляются как </a:t>
-            </a:r>
-            <a:r>
-              <a:rPr lang="en-US" sz="2000"/>
-              <a:t>static </a:t>
-            </a:r>
-            <a:r>
-              <a:rPr lang="en-US" sz="2000"/>
-              <a:t>const</a:t>
-            </a:r>
-            <a:endParaRPr lang="ru-RU" sz="2000"/>
-          </a:p>
-          <a:p>
-            <a:pPr>
-              <a:buClr>
-                <a:schemeClr val="accent1"/>
-              </a:buClr>
-              <a:buSzPct val="80000"/>
-              <a:buFont typeface="Wingdings"/>
-              <a:buChar char="Ø"/>
-              <a:defRPr/>
-            </a:pPr>
-            <a:r>
-              <a:rPr lang="ru-RU" sz="2000"/>
-              <a:t>Статические переменные </a:t>
-            </a:r>
-            <a:r>
-              <a:rPr lang="ru-RU" sz="2000"/>
-              <a:t>класса не инициализируются в конструкторе, т.к. не относятся к конкретному объекту</a:t>
-            </a:r>
-            <a:endParaRPr/>
-          </a:p>
-          <a:p>
-            <a:pPr>
-              <a:buClr>
-                <a:schemeClr val="accent1"/>
-              </a:buClr>
-              <a:buSzPct val="80000"/>
-              <a:buFont typeface="Wingdings"/>
-              <a:buChar char="Ø"/>
-              <a:defRPr/>
-            </a:pPr>
-            <a:endParaRPr lang="en-US" sz="2000"/>
-          </a:p>
-          <a:p>
-            <a:pPr>
-              <a:buClr>
-                <a:schemeClr val="accent1"/>
-              </a:buClr>
-              <a:buSzPct val="80000"/>
-              <a:buFont typeface="Wingdings"/>
-              <a:buChar char="Ø"/>
-              <a:defRPr/>
-            </a:pPr>
+              <a:t>объектов. Равенство, идентичность и имя – разные вещи. Идентичны объекты, имеющие один и тот же адрес в памяти</a:t>
+            </a:r>
             <a:endParaRPr lang="en-US" sz="2400"/>
           </a:p>
         </p:txBody>
       </p:sp>
-      <p:sp>
-        <p:nvSpPr>
-          <p:cNvPr id="6" name="TextBox 5"/>
-          <p:cNvSpPr txBox="1"/>
-          <p:nvPr/>
-        </p:nvSpPr>
-        <p:spPr bwMode="auto">
-          <a:xfrm>
-            <a:off x="576485" y="5538768"/>
-            <a:ext cx="2542683" cy="923330"/>
-          </a:xfrm>
-          <a:prstGeom prst="rect">
-            <a:avLst/>
-          </a:prstGeom>
-          <a:noFill/>
-        </p:spPr>
-        <p:txBody>
-          <a:bodyPr wrap="none" rtlCol="0">
-            <a:spAutoFit/>
-          </a:bodyPr>
-          <a:lstStyle/>
-          <a:p>
-            <a:pPr algn="ctr">
-              <a:defRPr/>
-            </a:pPr>
-            <a:r>
-              <a:rPr lang="en-US"/>
-              <a:t>cat.h</a:t>
-            </a:r>
-            <a:endParaRPr lang="ru-RU"/>
-          </a:p>
-          <a:p>
-            <a:pPr algn="ctr">
-              <a:defRPr/>
-            </a:pPr>
-            <a:r>
-              <a:rPr lang="ru-RU"/>
-              <a:t>(внутри </a:t>
-            </a:r>
-            <a:endParaRPr/>
-          </a:p>
-          <a:p>
-            <a:pPr algn="ctr">
-              <a:defRPr/>
-            </a:pPr>
-            <a:r>
-              <a:rPr lang="ru-RU"/>
-              <a:t>определения класса):</a:t>
-            </a:r>
-            <a:endParaRPr lang="en-US"/>
-          </a:p>
-        </p:txBody>
-      </p:sp>
-      <p:sp>
-        <p:nvSpPr>
-          <p:cNvPr id="7" name="TextBox 6"/>
-          <p:cNvSpPr txBox="1"/>
-          <p:nvPr/>
-        </p:nvSpPr>
-        <p:spPr bwMode="auto">
-          <a:xfrm>
-            <a:off x="7003216" y="5826384"/>
-            <a:ext cx="1051891" cy="369332"/>
-          </a:xfrm>
-          <a:prstGeom prst="rect">
-            <a:avLst/>
-          </a:prstGeom>
-          <a:noFill/>
-        </p:spPr>
-        <p:txBody>
-          <a:bodyPr wrap="none" rtlCol="0">
-            <a:spAutoFit/>
-          </a:bodyPr>
-          <a:lstStyle/>
-          <a:p>
-            <a:pPr>
-              <a:defRPr/>
-            </a:pPr>
-            <a:r>
-              <a:rPr lang="en-US"/>
-              <a:t>cat.cpp</a:t>
-            </a:r>
-            <a:r>
-              <a:rPr lang="ru-RU"/>
-              <a:t>:</a:t>
-            </a:r>
-            <a:endParaRPr lang="en-US"/>
-          </a:p>
-        </p:txBody>
-      </p:sp>
-      <p:pic>
-        <p:nvPicPr>
-          <p:cNvPr id="3" name="Рисунок 2"/>
-          <p:cNvPicPr>
-            <a:picLocks noChangeAspect="1"/>
-          </p:cNvPicPr>
-          <p:nvPr/>
-        </p:nvPicPr>
-        <p:blipFill>
-          <a:blip r:embed="rId2"/>
-          <a:stretch/>
-        </p:blipFill>
-        <p:spPr bwMode="auto">
-          <a:xfrm>
-            <a:off x="3194468" y="5808744"/>
-            <a:ext cx="2740850" cy="519320"/>
-          </a:xfrm>
-          <a:prstGeom prst="rect">
-            <a:avLst/>
-          </a:prstGeom>
-        </p:spPr>
-      </p:pic>
       <p:pic>
         <p:nvPicPr>
           <p:cNvPr id="10" name="Рисунок 9"/>
@@ -12793,13 +12590,14 @@
           <p:nvPr/>
         </p:nvPicPr>
         <p:blipFill>
-          <a:blip r:embed="rId3"/>
+          <a:blip r:embed="rId2"/>
+          <a:srcRect l="0" t="0" r="0" b="29483"/>
           <a:stretch/>
         </p:blipFill>
         <p:spPr bwMode="auto">
           <a:xfrm>
-            <a:off x="8252730" y="5747181"/>
-            <a:ext cx="3278204" cy="506503"/>
+            <a:off x="658340" y="4762051"/>
+            <a:ext cx="5570055" cy="672334"/>
           </a:xfrm>
           <a:prstGeom prst="rect">
             <a:avLst/>
@@ -12808,14 +12606,14 @@
       </p:pic>
       <p:sp>
         <p:nvSpPr>
-          <p:cNvPr id="843281296" name=""/>
+          <p:cNvPr id="11" name="TextBox 10"/>
           <p:cNvSpPr txBox="1"/>
           <p:nvPr/>
         </p:nvSpPr>
         <p:spPr bwMode="auto">
-          <a:xfrm flipH="0" flipV="0">
-            <a:off x="10110943" y="6328063"/>
-            <a:ext cx="1828211" cy="366119"/>
+          <a:xfrm>
+            <a:off x="541411" y="5506463"/>
+            <a:ext cx="5100853" cy="646331"/>
           </a:xfrm>
           <a:prstGeom prst="rect">
             <a:avLst/>
@@ -12823,21 +12621,77 @@
           <a:noFill/>
         </p:spPr>
         <p:txBody>
-          <a:bodyPr vertOverflow="overflow" horzOverflow="overflow" vert="horz" wrap="none" lIns="91440" tIns="45720" rIns="91440" bIns="45720" numCol="1" spcCol="0" rtlCol="0" fromWordArt="0" anchor="t" anchorCtr="0" forceAA="0" upright="0" compatLnSpc="0">
+          <a:bodyPr wrap="square" rtlCol="0">
             <a:spAutoFit/>
           </a:bodyPr>
-          <a:p>
-            <a:pPr>
-              <a:defRPr/>
-            </a:pPr>
-            <a:r>
-              <a:rPr/>
-              <a:t>examples/1_cat</a:t>
-            </a:r>
-            <a:endParaRPr/>
-          </a:p>
-        </p:txBody>
-      </p:sp>
+          <a:lstStyle/>
+          <a:p>
+            <a:pPr algn="ctr">
+              <a:defRPr/>
+            </a:pPr>
+            <a:r>
+              <a:rPr lang="ru-RU"/>
+              <a:t>Первая кошка такая же, как вторая кошка, но это две разные кошки</a:t>
+            </a:r>
+            <a:endParaRPr lang="en-US"/>
+          </a:p>
+        </p:txBody>
+      </p:sp>
+      <p:sp>
+        <p:nvSpPr>
+          <p:cNvPr id="13" name="TextBox 12"/>
+          <p:cNvSpPr txBox="1"/>
+          <p:nvPr/>
+        </p:nvSpPr>
+        <p:spPr bwMode="auto">
+          <a:xfrm>
+            <a:off x="6145268" y="5484962"/>
+            <a:ext cx="5412052" cy="646331"/>
+          </a:xfrm>
+          <a:prstGeom prst="rect">
+            <a:avLst/>
+          </a:prstGeom>
+          <a:noFill/>
+        </p:spPr>
+        <p:txBody>
+          <a:bodyPr wrap="square" rtlCol="0">
+            <a:spAutoFit/>
+          </a:bodyPr>
+          <a:lstStyle/>
+          <a:p>
+            <a:pPr algn="ctr">
+              <a:defRPr/>
+            </a:pPr>
+            <a:r>
+              <a:rPr lang="ru-RU"/>
+              <a:t>Первая кошка такая же, как вторая кошка, потому что это одна и та же кошка</a:t>
+            </a:r>
+            <a:endParaRPr lang="en-US"/>
+          </a:p>
+        </p:txBody>
+      </p:sp>
+      <p:pic>
+        <p:nvPicPr>
+          <p:cNvPr id="14" name="Рисунок 13"/>
+          <p:cNvPicPr>
+            <a:picLocks noChangeAspect="1"/>
+          </p:cNvPicPr>
+          <p:nvPr/>
+        </p:nvPicPr>
+        <p:blipFill>
+          <a:blip r:embed="rId3"/>
+          <a:stretch/>
+        </p:blipFill>
+        <p:spPr bwMode="auto">
+          <a:xfrm>
+            <a:off x="6247695" y="4787434"/>
+            <a:ext cx="5227365" cy="646951"/>
+          </a:xfrm>
+          <a:prstGeom prst="rect">
+            <a:avLst/>
+          </a:prstGeom>
+        </p:spPr>
+      </p:pic>
     </p:spTree>
   </p:cSld>
   <p:clrMapOvr>
@@ -12890,8 +12744,8 @@
         </p:nvSpPr>
         <p:spPr bwMode="auto">
           <a:xfrm>
-            <a:off x="283779" y="210557"/>
-            <a:ext cx="11655376" cy="1113746"/>
+            <a:off x="283779" y="169798"/>
+            <a:ext cx="11655376" cy="769909"/>
           </a:xfrm>
           <a:prstGeom prst="rect">
             <a:avLst/>
@@ -12920,7 +12774,7 @@
             </a:r>
             <a:r>
               <a:rPr lang="ru-RU" sz="2800" b="1"/>
-              <a:t>ООП в С++. Особенности методов</a:t>
+              <a:t>ООП в С++. Обращение к объектам</a:t>
             </a:r>
             <a:endParaRPr lang="en-US" sz="2800" b="1"/>
           </a:p>
@@ -12938,8 +12792,8 @@
         </p:nvSpPr>
         <p:spPr bwMode="auto">
           <a:xfrm>
-            <a:off x="283778" y="1426860"/>
-            <a:ext cx="11655377" cy="2328998"/>
+            <a:off x="283779" y="1170828"/>
+            <a:ext cx="4662293" cy="5077849"/>
           </a:xfrm>
           <a:prstGeom prst="rect">
             <a:avLst/>
@@ -12950,7 +12804,7 @@
         </p:spPr>
         <p:txBody>
           <a:bodyPr>
-            <a:normAutofit/>
+            <a:normAutofit lnSpcReduction="10000"/>
           </a:bodyPr>
           <a:lstStyle/>
           <a:p>
@@ -12965,446 +12819,97 @@
             </a:pPr>
             <a:r>
               <a:rPr lang="ru-RU" sz="2400"/>
-              <a:t>Как закрытые, так и открытые методы могут быть константными. Тогда они гарантируют, что не будут изменять никакие члены данных. По этой причине они могут вызывать только другие константные или статические методы класса. Статические методы нет смысла объявлять константными – они не имеют доступа к другим членам класса, а значит, не могут их изменить</a:t>
+              <a:t>Со стороны членов  класса:</a:t>
             </a:r>
             <a:endParaRPr/>
           </a:p>
           <a:p>
-            <a:pPr>
-              <a:buClr>
-                <a:schemeClr val="accent1"/>
-              </a:buClr>
-              <a:buSzPct val="80000"/>
-              <a:buFont typeface="Wingdings"/>
-              <a:buChar char="Ø"/>
-              <a:defRPr/>
-            </a:pPr>
-            <a:endParaRPr lang="ru-RU" sz="2400"/>
-          </a:p>
-          <a:p>
-            <a:pPr>
-              <a:buClr>
-                <a:schemeClr val="accent1"/>
-              </a:buClr>
-              <a:buSzPct val="80000"/>
-              <a:buFont typeface="Wingdings"/>
-              <a:buChar char="Ø"/>
-              <a:defRPr/>
-            </a:pPr>
-            <a:endParaRPr lang="ru-RU" sz="2400"/>
-          </a:p>
-          <a:p>
-            <a:pPr>
-              <a:buClr>
-                <a:schemeClr val="accent1"/>
-              </a:buClr>
-              <a:buSzPct val="80000"/>
-              <a:buFont typeface="Wingdings"/>
-              <a:buChar char="Ø"/>
-              <a:defRPr/>
-            </a:pPr>
-            <a:endParaRPr lang="ru-RU" sz="2400"/>
-          </a:p>
-          <a:p>
-            <a:pPr>
-              <a:buClr>
-                <a:schemeClr val="accent1"/>
-              </a:buClr>
-              <a:buSzPct val="80000"/>
-              <a:buFont typeface="Wingdings"/>
-              <a:buChar char="Ø"/>
+            <a:pPr marL="519113" indent="280988">
+              <a:buFont typeface="Arial"/>
+              <a:buChar char="•"/>
+              <a:defRPr/>
+            </a:pPr>
+            <a:r>
+              <a:rPr lang="ru-RU" sz="2400"/>
+              <a:t>Из </a:t>
+            </a:r>
+            <a:r>
+              <a:rPr lang="ru-RU" sz="2400"/>
+              <a:t>методов </a:t>
+            </a:r>
+            <a:r>
+              <a:rPr lang="ru-RU" sz="2400"/>
+              <a:t>класса можно обращаться </a:t>
+            </a:r>
+            <a:r>
+              <a:rPr lang="ru-RU" sz="2400"/>
+              <a:t>к любым </a:t>
+            </a:r>
+            <a:r>
+              <a:rPr lang="ru-RU" sz="2400"/>
+              <a:t>другим свойствам и методам </a:t>
+            </a:r>
+            <a:r>
+              <a:rPr lang="ru-RU" sz="2400"/>
+              <a:t>класса (открытым, закрытым, статическим</a:t>
+            </a:r>
+            <a:r>
+              <a:rPr lang="ru-RU" sz="2400"/>
+              <a:t>, </a:t>
+            </a:r>
+            <a:r>
+              <a:rPr lang="ru-RU" sz="2400"/>
+              <a:t>нестатическим</a:t>
+            </a:r>
+            <a:r>
+              <a:rPr lang="ru-RU" sz="2400"/>
+              <a:t> </a:t>
+            </a:r>
+            <a:r>
+              <a:rPr lang="ru-RU" sz="2400"/>
+              <a:t>– любым) </a:t>
+            </a:r>
+            <a:r>
+              <a:rPr lang="ru-RU" sz="2400"/>
+              <a:t>напрямую по </a:t>
+            </a:r>
+            <a:r>
+              <a:rPr lang="ru-RU" sz="2400"/>
+              <a:t>имени</a:t>
+            </a:r>
+            <a:endParaRPr/>
+          </a:p>
+          <a:p>
+            <a:pPr marL="519113" indent="280988">
+              <a:buFont typeface="Arial"/>
+              <a:buChar char="•"/>
+              <a:defRPr/>
+            </a:pPr>
+            <a:r>
+              <a:rPr lang="ru-RU" sz="2400"/>
+              <a:t>Это верно за исключением ограничений, связанных со статическими и константными методами</a:t>
+            </a:r>
+            <a:endParaRPr/>
+          </a:p>
+          <a:p>
+            <a:pPr marL="0" indent="0">
+              <a:buNone/>
               <a:defRPr/>
             </a:pPr>
             <a:endParaRPr lang="en-US" sz="2400"/>
           </a:p>
         </p:txBody>
       </p:sp>
-      <p:pic>
-        <p:nvPicPr>
-          <p:cNvPr id="6" name="Рисунок 5"/>
-          <p:cNvPicPr>
-            <a:picLocks noChangeAspect="1"/>
-          </p:cNvPicPr>
-          <p:nvPr/>
-        </p:nvPicPr>
-        <p:blipFill>
-          <a:blip r:embed="rId2"/>
-          <a:stretch/>
-        </p:blipFill>
-        <p:spPr bwMode="auto">
-          <a:xfrm>
-            <a:off x="3942965" y="3953721"/>
-            <a:ext cx="3529709" cy="687200"/>
-          </a:xfrm>
-          <a:prstGeom prst="rect">
-            <a:avLst/>
-          </a:prstGeom>
-        </p:spPr>
-      </p:pic>
-      <p:pic>
-        <p:nvPicPr>
-          <p:cNvPr id="8" name="Рисунок 7"/>
-          <p:cNvPicPr>
-            <a:picLocks noChangeAspect="1"/>
-          </p:cNvPicPr>
-          <p:nvPr/>
-        </p:nvPicPr>
-        <p:blipFill>
-          <a:blip r:embed="rId3"/>
-          <a:stretch/>
-        </p:blipFill>
-        <p:spPr bwMode="auto">
-          <a:xfrm>
-            <a:off x="3942965" y="4898218"/>
-            <a:ext cx="3760387" cy="1342995"/>
-          </a:xfrm>
-          <a:prstGeom prst="rect">
-            <a:avLst/>
-          </a:prstGeom>
-        </p:spPr>
-      </p:pic>
-      <p:sp>
-        <p:nvSpPr>
-          <p:cNvPr id="10" name="TextBox 9"/>
+      <p:sp>
+        <p:nvSpPr>
+          <p:cNvPr id="6" name="Объект 2"/>
           <p:cNvSpPr txBox="1"/>
           <p:nvPr/>
         </p:nvSpPr>
         <p:spPr bwMode="auto">
           <a:xfrm>
-            <a:off x="2317746" y="5200383"/>
-            <a:ext cx="1051891" cy="369332"/>
-          </a:xfrm>
-          <a:prstGeom prst="rect">
-            <a:avLst/>
-          </a:prstGeom>
-          <a:noFill/>
-        </p:spPr>
-        <p:txBody>
-          <a:bodyPr wrap="none" rtlCol="0">
-            <a:spAutoFit/>
-          </a:bodyPr>
-          <a:lstStyle/>
-          <a:p>
-            <a:pPr>
-              <a:defRPr/>
-            </a:pPr>
-            <a:r>
-              <a:rPr lang="en-US"/>
-              <a:t>cat.cpp</a:t>
-            </a:r>
-            <a:r>
-              <a:rPr lang="ru-RU"/>
-              <a:t>:</a:t>
-            </a:r>
-            <a:endParaRPr lang="en-US"/>
-          </a:p>
-        </p:txBody>
-      </p:sp>
-      <p:sp>
-        <p:nvSpPr>
-          <p:cNvPr id="13" name="TextBox 12"/>
-          <p:cNvSpPr txBox="1"/>
-          <p:nvPr/>
-        </p:nvSpPr>
-        <p:spPr bwMode="auto">
-          <a:xfrm>
-            <a:off x="1572351" y="3696423"/>
-            <a:ext cx="2542683" cy="923330"/>
-          </a:xfrm>
-          <a:prstGeom prst="rect">
-            <a:avLst/>
-          </a:prstGeom>
-          <a:noFill/>
-        </p:spPr>
-        <p:txBody>
-          <a:bodyPr wrap="none" rtlCol="0">
-            <a:spAutoFit/>
-          </a:bodyPr>
-          <a:lstStyle/>
-          <a:p>
-            <a:pPr algn="ctr">
-              <a:defRPr/>
-            </a:pPr>
-            <a:r>
-              <a:rPr lang="en-US"/>
-              <a:t>cat.h</a:t>
-            </a:r>
-            <a:endParaRPr lang="ru-RU"/>
-          </a:p>
-          <a:p>
-            <a:pPr algn="ctr">
-              <a:defRPr/>
-            </a:pPr>
-            <a:r>
-              <a:rPr lang="ru-RU"/>
-              <a:t>(внутри </a:t>
-            </a:r>
-            <a:endParaRPr/>
-          </a:p>
-          <a:p>
-            <a:pPr algn="ctr">
-              <a:defRPr/>
-            </a:pPr>
-            <a:r>
-              <a:rPr lang="ru-RU"/>
-              <a:t>определения класса):</a:t>
-            </a:r>
-            <a:endParaRPr lang="en-US"/>
-          </a:p>
-        </p:txBody>
-      </p:sp>
-      <p:sp>
-        <p:nvSpPr>
-          <p:cNvPr id="141583794" name=""/>
-          <p:cNvSpPr txBox="1"/>
-          <p:nvPr/>
-        </p:nvSpPr>
-        <p:spPr bwMode="auto">
-          <a:xfrm flipH="0" flipV="0">
-            <a:off x="10058268" y="6241212"/>
-            <a:ext cx="1828211" cy="366119"/>
-          </a:xfrm>
-          <a:prstGeom prst="rect">
-            <a:avLst/>
-          </a:prstGeom>
-          <a:noFill/>
-        </p:spPr>
-        <p:txBody>
-          <a:bodyPr vertOverflow="overflow" horzOverflow="overflow" vert="horz" wrap="none" lIns="91440" tIns="45720" rIns="91440" bIns="45720" numCol="1" spcCol="0" rtlCol="0" fromWordArt="0" anchor="t" anchorCtr="0" forceAA="0" upright="0" compatLnSpc="0">
-            <a:spAutoFit/>
-          </a:bodyPr>
-          <a:p>
-            <a:pPr>
-              <a:defRPr/>
-            </a:pPr>
-            <a:r>
-              <a:rPr/>
-              <a:t>examples/1_cat</a:t>
-            </a:r>
-            <a:endParaRPr/>
-          </a:p>
-        </p:txBody>
-      </p:sp>
-    </p:spTree>
-  </p:cSld>
-  <p:clrMapOvr>
-    <a:masterClrMapping/>
-  </p:clrMapOvr>
-  <mc:AlternateContent xmlns:mc="http://schemas.openxmlformats.org/markup-compatibility/2006">
-    <mc:Choice xmlns:p14="http://schemas.microsoft.com/office/powerpoint/2010/main" Requires="p14">
-      <p:transition p14:dur="2000" advClick="1"/>
-    </mc:Choice>
-    <mc:Fallback>
-      <p:transition advClick="1"/>
-    </mc:Fallback>
-  </mc:AlternateContent>
-  <p:timing>
-    <p:tnLst>
-      <p:par>
-        <p:cTn id="1" dur="indefinite" restart="never" nodeType="tmRoot"/>
-      </p:par>
-    </p:tnLst>
-  </p:timing>
-</p:sld>
-</file>
-
-<file path=ppt/slides/slide26.xml><?xml version="1.0" encoding="utf-8"?>
-<p:sld xmlns:a="http://schemas.openxmlformats.org/drawingml/2006/main" xmlns:r="http://schemas.openxmlformats.org/officeDocument/2006/relationships" xmlns:p="http://schemas.openxmlformats.org/presentationml/2006/main" xmlns:m="http://schemas.openxmlformats.org/officeDocument/2006/math" xmlns:w="http://schemas.openxmlformats.org/wordprocessingml/2006/main" showMasterPhAnim="0" show="1">
-  <p:cSld name="">
-    <p:spTree>
-      <p:nvGrpSpPr>
-        <p:cNvPr id="1" name=""/>
-        <p:cNvGrpSpPr/>
-        <p:nvPr/>
-      </p:nvGrpSpPr>
-      <p:grpSpPr bwMode="auto">
-        <a:xfrm>
-          <a:off x="0" y="0"/>
-          <a:ext cx="0" cy="0"/>
-          <a:chOff x="0" y="0"/>
-          <a:chExt cx="0" cy="0"/>
-        </a:xfrm>
-      </p:grpSpPr>
-      <p:sp>
-        <p:nvSpPr>
-          <p:cNvPr id="4" name="Заголовок 1"/>
-          <p:cNvSpPr>
-            <a:spLocks noGrp="1"/>
-          </p:cNvSpPr>
-          <p:nvPr>
-            <p:ph type="title"/>
-          </p:nvPr>
-        </p:nvSpPr>
-        <p:spPr bwMode="auto">
-          <a:xfrm>
-            <a:off x="283779" y="210557"/>
-            <a:ext cx="11655376" cy="910163"/>
-          </a:xfrm>
-          <a:prstGeom prst="rect">
-            <a:avLst/>
-          </a:prstGeom>
-          <a:solidFill>
-            <a:schemeClr val="bg1"/>
-          </a:solidFill>
-          <a:ln>
-            <a:solidFill>
-              <a:schemeClr val="tx1"/>
-            </a:solidFill>
-          </a:ln>
-        </p:spPr>
-        <p:txBody>
-          <a:bodyPr anchor="ctr" anchorCtr="0">
-            <a:normAutofit/>
-          </a:bodyPr>
-          <a:lstStyle/>
-          <a:p>
-            <a:pPr algn="ctr">
-              <a:defRPr/>
-            </a:pPr>
-            <a:r>
-              <a:rPr lang="en-US" sz="2800" b="1"/>
-              <a:t>2. </a:t>
-            </a:r>
-            <a:r>
-              <a:rPr lang="ru-RU" sz="2800" b="1"/>
-              <a:t>ООП в С++. Особенности методов</a:t>
-            </a:r>
-            <a:endParaRPr lang="en-US" sz="2800" b="1"/>
-          </a:p>
-        </p:txBody>
-      </p:sp>
-      <p:sp>
-        <p:nvSpPr>
-          <p:cNvPr id="5" name="Объект 2"/>
-          <p:cNvSpPr>
-            <a:spLocks noGrp="1"/>
-          </p:cNvSpPr>
-          <p:nvPr>
-            <p:ph idx="1"/>
-          </p:nvPr>
-        </p:nvSpPr>
-        <p:spPr bwMode="auto">
-          <a:xfrm>
-            <a:off x="283778" y="1280556"/>
-            <a:ext cx="11655377" cy="807185"/>
-          </a:xfrm>
-          <a:prstGeom prst="rect">
-            <a:avLst/>
-          </a:prstGeom>
-          <a:solidFill>
-            <a:schemeClr val="bg1"/>
-          </a:solidFill>
-        </p:spPr>
-        <p:txBody>
-          <a:bodyPr>
-            <a:normAutofit lnSpcReduction="10000"/>
-          </a:bodyPr>
-          <a:lstStyle/>
-          <a:p>
-            <a:pPr>
-              <a:buClr>
-                <a:schemeClr val="accent1"/>
-              </a:buClr>
-              <a:buSzPct val="80000"/>
-              <a:buFont typeface="Wingdings"/>
-              <a:buChar char="Ø"/>
-              <a:defRPr/>
-            </a:pPr>
-            <a:r>
-              <a:rPr lang="ru-RU" sz="2400"/>
-              <a:t>Методы могут быть встраиваемыми (</a:t>
-            </a:r>
-            <a:r>
-              <a:rPr lang="en-US" sz="2400"/>
-              <a:t>inline</a:t>
-            </a:r>
-            <a:r>
-              <a:rPr lang="ru-RU" sz="2400"/>
-              <a:t>)</a:t>
-            </a:r>
-            <a:r>
-              <a:rPr lang="en-US" sz="2400"/>
-              <a:t>. </a:t>
-            </a:r>
-            <a:r>
-              <a:rPr lang="ru-RU" sz="2400"/>
-              <a:t>Тогда они компилируются не как функции, а напрямую встраиваются в машинный код. Это быстрее</a:t>
-            </a:r>
-            <a:endParaRPr lang="en-US" sz="2400"/>
-          </a:p>
-        </p:txBody>
-      </p:sp>
-      <p:pic>
-        <p:nvPicPr>
-          <p:cNvPr id="6" name="Рисунок 5" descr="Image result for C++ стек вызова функции"/>
-          <p:cNvPicPr/>
-          <p:nvPr/>
-        </p:nvPicPr>
-        <p:blipFill>
-          <a:blip r:embed="rId2"/>
-          <a:stretch/>
-        </p:blipFill>
-        <p:spPr bwMode="auto">
-          <a:xfrm>
-            <a:off x="1039957" y="2285169"/>
-            <a:ext cx="3261879" cy="3699166"/>
-          </a:xfrm>
-          <a:prstGeom prst="rect">
-            <a:avLst/>
-          </a:prstGeom>
-          <a:noFill/>
-          <a:ln>
-            <a:noFill/>
-          </a:ln>
-        </p:spPr>
-      </p:pic>
-      <p:sp>
-        <p:nvSpPr>
-          <p:cNvPr id="7" name="TextBox 6"/>
-          <p:cNvSpPr txBox="1"/>
-          <p:nvPr/>
-        </p:nvSpPr>
-        <p:spPr bwMode="auto">
-          <a:xfrm>
-            <a:off x="768927" y="6181761"/>
-            <a:ext cx="6234544" cy="369332"/>
-          </a:xfrm>
-          <a:prstGeom prst="rect">
-            <a:avLst/>
-          </a:prstGeom>
-          <a:noFill/>
-        </p:spPr>
-        <p:txBody>
-          <a:bodyPr wrap="square" rtlCol="0">
-            <a:spAutoFit/>
-          </a:bodyPr>
-          <a:lstStyle/>
-          <a:p>
-            <a:pPr>
-              <a:defRPr/>
-            </a:pPr>
-            <a:r>
-              <a:rPr lang="ru-RU"/>
-              <a:t>Пример стека при вызове функции, если она не </a:t>
-            </a:r>
-            <a:r>
-              <a:rPr lang="en-US"/>
-              <a:t>inline</a:t>
-            </a:r>
-            <a:endParaRPr lang="en-US"/>
-          </a:p>
-        </p:txBody>
-      </p:sp>
-      <p:sp>
-        <p:nvSpPr>
-          <p:cNvPr id="9" name="Объект 2"/>
-          <p:cNvSpPr txBox="1"/>
-          <p:nvPr/>
-        </p:nvSpPr>
-        <p:spPr bwMode="auto">
-          <a:xfrm>
-            <a:off x="4668742" y="2087741"/>
-            <a:ext cx="7270413" cy="4157211"/>
+            <a:off x="5133109" y="1170828"/>
+            <a:ext cx="6806046" cy="3311395"/>
           </a:xfrm>
           <a:prstGeom prst="rect">
             <a:avLst/>
@@ -13656,31 +13161,72 @@
             </a:pPr>
             <a:r>
               <a:rPr lang="ru-RU" sz="2400"/>
-              <a:t>Как правило, встраиваемыми объявляются небольшие служебные функции. Практика показывает, что это удачный компромисс между быстродействием и объемом машинного кода</a:t>
+              <a:t>Со стороны других частей программы (внешних по отношению к классу):</a:t>
             </a:r>
             <a:endParaRPr/>
           </a:p>
           <a:p>
-            <a:pPr>
-              <a:buClr>
-                <a:schemeClr val="accent1"/>
-              </a:buClr>
-              <a:buSzPct val="80000"/>
-              <a:buFont typeface="Wingdings"/>
-              <a:buChar char="Ø"/>
+            <a:pPr marL="519113" indent="290513">
+              <a:buFont typeface="Arial"/>
+              <a:buChar char="•"/>
               <a:defRPr/>
             </a:pPr>
             <a:r>
               <a:rPr lang="ru-RU" sz="2400"/>
-              <a:t>Компилятор может делать это автоматически, но это не точно</a:t>
-            </a:r>
+              <a:t>Обращаться можно только к открытым методам (к закрытым нельзя). Открытые переменные-члены используются редко, т.к. это нарушает инкапсуляцию. Если инкапсуляция не требуется, тогда нужно ли использовать ООП?</a:t>
+            </a:r>
+            <a:endParaRPr/>
+          </a:p>
+          <a:p>
+            <a:pPr marL="519113" indent="290513">
+              <a:buFont typeface="Arial"/>
+              <a:buChar char="•"/>
+              <a:defRPr/>
+            </a:pPr>
+            <a:endParaRPr lang="ru-RU" sz="2400"/>
+          </a:p>
+          <a:p>
+            <a:pPr marL="0" indent="0">
+              <a:buNone/>
+              <a:defRPr/>
+            </a:pPr>
+            <a:endParaRPr lang="ru-RU" sz="2400"/>
+          </a:p>
+          <a:p>
+            <a:pPr marL="0" indent="0">
+              <a:buFont typeface="Wingdings 3"/>
+              <a:buNone/>
+              <a:defRPr/>
+            </a:pPr>
             <a:endParaRPr lang="en-US" sz="2400"/>
           </a:p>
         </p:txBody>
       </p:sp>
       <p:pic>
         <p:nvPicPr>
-          <p:cNvPr id="10" name="Рисунок 9"/>
+          <p:cNvPr id="7" name="Рисунок 6"/>
+          <p:cNvPicPr>
+            <a:picLocks noChangeAspect="1"/>
+          </p:cNvPicPr>
+          <p:nvPr/>
+        </p:nvPicPr>
+        <p:blipFill>
+          <a:blip r:embed="rId2"/>
+          <a:stretch/>
+        </p:blipFill>
+        <p:spPr bwMode="auto">
+          <a:xfrm>
+            <a:off x="5829963" y="4394682"/>
+            <a:ext cx="2113054" cy="924460"/>
+          </a:xfrm>
+          <a:prstGeom prst="rect">
+            <a:avLst/>
+          </a:prstGeom>
+        </p:spPr>
+      </p:pic>
+      <p:pic>
+        <p:nvPicPr>
+          <p:cNvPr id="8" name="Рисунок 7"/>
           <p:cNvPicPr>
             <a:picLocks noChangeAspect="1"/>
           </p:cNvPicPr>
@@ -13692,8 +13238,8 @@
         </p:blipFill>
         <p:spPr bwMode="auto">
           <a:xfrm>
-            <a:off x="7003472" y="4927004"/>
-            <a:ext cx="4564263" cy="1317949"/>
+            <a:off x="8733151" y="4341173"/>
+            <a:ext cx="3206004" cy="1206560"/>
           </a:xfrm>
           <a:prstGeom prst="rect">
             <a:avLst/>
@@ -13702,14 +13248,119 @@
       </p:pic>
       <p:sp>
         <p:nvSpPr>
+          <p:cNvPr id="9" name="TextBox 8"/>
+          <p:cNvSpPr txBox="1"/>
+          <p:nvPr/>
+        </p:nvSpPr>
+        <p:spPr bwMode="auto">
+          <a:xfrm>
+            <a:off x="8733151" y="5387115"/>
+            <a:ext cx="3206038" cy="365795"/>
+          </a:xfrm>
+          <a:prstGeom prst="rect">
+            <a:avLst/>
+          </a:prstGeom>
+          <a:solidFill>
+            <a:schemeClr val="bg1"/>
+          </a:solidFill>
+        </p:spPr>
+        <p:txBody>
+          <a:bodyPr wrap="square" rtlCol="0">
+            <a:spAutoFit/>
+          </a:bodyPr>
+          <a:lstStyle/>
+          <a:p>
+            <a:pPr>
+              <a:defRPr/>
+            </a:pPr>
+            <a:r>
+              <a:rPr lang="ru-RU"/>
+              <a:t>	На куче</a:t>
+            </a:r>
+            <a:endParaRPr lang="en-US"/>
+          </a:p>
+        </p:txBody>
+      </p:sp>
+      <p:sp>
+        <p:nvSpPr>
+          <p:cNvPr id="10" name="TextBox 9"/>
+          <p:cNvSpPr txBox="1"/>
+          <p:nvPr/>
+        </p:nvSpPr>
+        <p:spPr bwMode="auto">
+          <a:xfrm>
+            <a:off x="6228517" y="5387116"/>
+            <a:ext cx="1714500" cy="369332"/>
+          </a:xfrm>
+          <a:prstGeom prst="rect">
+            <a:avLst/>
+          </a:prstGeom>
+          <a:solidFill>
+            <a:schemeClr val="bg1"/>
+          </a:solidFill>
+        </p:spPr>
+        <p:txBody>
+          <a:bodyPr wrap="square" rtlCol="0">
+            <a:spAutoFit/>
+          </a:bodyPr>
+          <a:lstStyle/>
+          <a:p>
+            <a:pPr>
+              <a:defRPr/>
+            </a:pPr>
+            <a:r>
+              <a:rPr lang="ru-RU"/>
+              <a:t>На стеке</a:t>
+            </a:r>
+            <a:endParaRPr lang="en-US"/>
+          </a:p>
+        </p:txBody>
+      </p:sp>
+      <p:sp>
+        <p:nvSpPr>
           <p:cNvPr id="11" name="TextBox 10"/>
           <p:cNvSpPr txBox="1"/>
           <p:nvPr/>
         </p:nvSpPr>
         <p:spPr bwMode="auto">
-          <a:xfrm>
-            <a:off x="5768128" y="5272019"/>
-            <a:ext cx="1051891" cy="369332"/>
+          <a:xfrm flipH="0" flipV="0">
+            <a:off x="5436315" y="5806294"/>
+            <a:ext cx="6502911" cy="640115"/>
+          </a:xfrm>
+          <a:prstGeom prst="rect">
+            <a:avLst/>
+          </a:prstGeom>
+          <a:solidFill>
+            <a:schemeClr val="bg1"/>
+          </a:solidFill>
+        </p:spPr>
+        <p:txBody>
+          <a:bodyPr wrap="square" rtlCol="0">
+            <a:spAutoFit/>
+          </a:bodyPr>
+          <a:lstStyle/>
+          <a:p>
+            <a:pPr>
+              <a:defRPr/>
+            </a:pPr>
+            <a:r>
+              <a:rPr lang="ru-RU"/>
+              <a:t>Весь объект, со всеми его членами размещается в той области памяти, где он был выделен</a:t>
+            </a:r>
+            <a:endParaRPr lang="en-US"/>
+          </a:p>
+        </p:txBody>
+      </p:sp>
+      <p:sp>
+        <p:nvSpPr>
+          <p:cNvPr id="207365444" name=""/>
+          <p:cNvSpPr txBox="1"/>
+          <p:nvPr/>
+        </p:nvSpPr>
+        <p:spPr bwMode="auto">
+          <a:xfrm flipH="0" flipV="0">
+            <a:off x="10110942" y="6351039"/>
+            <a:ext cx="1828211" cy="366119"/>
           </a:xfrm>
           <a:prstGeom prst="rect">
             <a:avLst/>
@@ -13717,36 +13368,306 @@
           <a:noFill/>
         </p:spPr>
         <p:txBody>
-          <a:bodyPr wrap="none" rtlCol="0">
+          <a:bodyPr vertOverflow="overflow" horzOverflow="overflow" vert="horz" wrap="none" lIns="91440" tIns="45720" rIns="91440" bIns="45720" numCol="1" spcCol="0" rtlCol="0" fromWordArt="0" anchor="t" anchorCtr="0" forceAA="0" upright="0" compatLnSpc="0">
             <a:spAutoFit/>
           </a:bodyPr>
+          <a:p>
+            <a:pPr>
+              <a:defRPr/>
+            </a:pPr>
+            <a:r>
+              <a:rPr/>
+              <a:t>examples/1_cat</a:t>
+            </a:r>
+            <a:endParaRPr/>
+          </a:p>
+        </p:txBody>
+      </p:sp>
+    </p:spTree>
+  </p:cSld>
+  <p:clrMapOvr>
+    <a:masterClrMapping/>
+  </p:clrMapOvr>
+  <mc:AlternateContent xmlns:mc="http://schemas.openxmlformats.org/markup-compatibility/2006">
+    <mc:Choice xmlns:p14="http://schemas.microsoft.com/office/powerpoint/2010/main" Requires="p14">
+      <p:transition p14:dur="2000" advClick="1"/>
+    </mc:Choice>
+    <mc:Fallback>
+      <p:transition advClick="1"/>
+    </mc:Fallback>
+  </mc:AlternateContent>
+  <p:timing>
+    <p:tnLst>
+      <p:par>
+        <p:cTn id="1" dur="indefinite" restart="never" nodeType="tmRoot"/>
+      </p:par>
+    </p:tnLst>
+  </p:timing>
+</p:sld>
+</file>
+
+<file path=ppt/slides/slide26.xml><?xml version="1.0" encoding="utf-8"?>
+<p:sld xmlns:a="http://schemas.openxmlformats.org/drawingml/2006/main" xmlns:r="http://schemas.openxmlformats.org/officeDocument/2006/relationships" xmlns:p="http://schemas.openxmlformats.org/presentationml/2006/main" xmlns:m="http://schemas.openxmlformats.org/officeDocument/2006/math" xmlns:w="http://schemas.openxmlformats.org/wordprocessingml/2006/main" showMasterPhAnim="0" show="1">
+  <p:cSld name="">
+    <p:spTree>
+      <p:nvGrpSpPr>
+        <p:cNvPr id="1" name=""/>
+        <p:cNvGrpSpPr/>
+        <p:nvPr/>
+      </p:nvGrpSpPr>
+      <p:grpSpPr bwMode="auto">
+        <a:xfrm>
+          <a:off x="0" y="0"/>
+          <a:ext cx="0" cy="0"/>
+          <a:chOff x="0" y="0"/>
+          <a:chExt cx="0" cy="0"/>
+        </a:xfrm>
+      </p:grpSpPr>
+      <p:sp>
+        <p:nvSpPr>
+          <p:cNvPr id="4" name="Заголовок 1"/>
+          <p:cNvSpPr>
+            <a:spLocks noGrp="1"/>
+          </p:cNvSpPr>
+          <p:nvPr>
+            <p:ph type="title"/>
+          </p:nvPr>
+        </p:nvSpPr>
+        <p:spPr bwMode="auto">
+          <a:xfrm>
+            <a:off x="283779" y="210557"/>
+            <a:ext cx="11655376" cy="1113746"/>
+          </a:xfrm>
+          <a:prstGeom prst="rect">
+            <a:avLst/>
+          </a:prstGeom>
+          <a:solidFill>
+            <a:schemeClr val="bg1"/>
+          </a:solidFill>
+          <a:ln>
+            <a:solidFill>
+              <a:schemeClr val="tx1"/>
+            </a:solidFill>
+          </a:ln>
+        </p:spPr>
+        <p:txBody>
+          <a:bodyPr anchor="ctr" anchorCtr="0">
+            <a:normAutofit/>
+          </a:bodyPr>
           <a:lstStyle/>
           <a:p>
-            <a:pPr>
-              <a:defRPr/>
-            </a:pPr>
-            <a:r>
-              <a:rPr lang="en-US"/>
-              <a:t>cat.cpp</a:t>
-            </a:r>
-            <a:r>
-              <a:rPr lang="ru-RU"/>
-              <a:t>:</a:t>
-            </a:r>
-            <a:endParaRPr lang="en-US"/>
-          </a:p>
-        </p:txBody>
-      </p:sp>
-      <p:sp>
-        <p:nvSpPr>
-          <p:cNvPr id="1811917201" name=""/>
+            <a:pPr algn="ctr">
+              <a:defRPr/>
+            </a:pPr>
+            <a:r>
+              <a:rPr lang="en-US" sz="2800" b="1"/>
+              <a:t>2. </a:t>
+            </a:r>
+            <a:r>
+              <a:rPr lang="ru-RU" sz="2800" b="1"/>
+              <a:t>ООП в С++. </a:t>
+            </a:r>
+            <a:r>
+              <a:rPr lang="ru-RU" sz="2800" b="1"/>
+              <a:t>Деинициализация</a:t>
+            </a:r>
+            <a:r>
+              <a:rPr lang="ru-RU" sz="2800" b="1"/>
+              <a:t> объекта</a:t>
+            </a:r>
+            <a:endParaRPr lang="en-US" sz="2800" b="1"/>
+          </a:p>
+        </p:txBody>
+      </p:sp>
+      <p:sp>
+        <p:nvSpPr>
+          <p:cNvPr id="5" name="Объект 2"/>
+          <p:cNvSpPr>
+            <a:spLocks noGrp="1"/>
+          </p:cNvSpPr>
+          <p:nvPr>
+            <p:ph idx="1"/>
+          </p:nvPr>
+        </p:nvSpPr>
+        <p:spPr bwMode="auto">
+          <a:xfrm flipH="0" flipV="0">
+            <a:off x="4544567" y="1417716"/>
+            <a:ext cx="7394586" cy="4830683"/>
+          </a:xfrm>
+          <a:prstGeom prst="rect">
+            <a:avLst/>
+          </a:prstGeom>
+          <a:solidFill>
+            <a:schemeClr val="bg1"/>
+          </a:solidFill>
+        </p:spPr>
+        <p:txBody>
+          <a:bodyPr vertOverflow="overflow" horzOverflow="overflow" vert="horz" wrap="square" lIns="91440" tIns="45720" rIns="91440" bIns="45720" numCol="1" spcCol="0" rtlCol="0" fromWordArt="0" anchor="t" anchorCtr="0" forceAA="0" upright="0" compatLnSpc="0">
+            <a:normAutofit fontScale="80000" lnSpcReduction="4000"/>
+          </a:bodyPr>
+          <a:lstStyle/>
+          <a:p>
+            <a:pPr>
+              <a:buClr>
+                <a:schemeClr val="accent1"/>
+              </a:buClr>
+              <a:buSzPct val="80000"/>
+              <a:buFont typeface="Wingdings"/>
+              <a:buChar char="Ø"/>
+              <a:defRPr/>
+            </a:pPr>
+            <a:r>
+              <a:rPr lang="ru-RU" sz="2600"/>
+              <a:t>Деструктор — это функция, которая вызывается при деинициализации («разрушении») </a:t>
+            </a:r>
+            <a:r>
+              <a:rPr lang="ru-RU" sz="2600"/>
+              <a:t>объекта</a:t>
+            </a:r>
+            <a:endParaRPr lang="ru-RU" sz="2600"/>
+          </a:p>
+          <a:p>
+            <a:pPr>
+              <a:buClr>
+                <a:schemeClr val="accent1"/>
+              </a:buClr>
+              <a:buSzPct val="80000"/>
+              <a:buFont typeface="Wingdings"/>
+              <a:buChar char="Ø"/>
+              <a:defRPr/>
+            </a:pPr>
+            <a:r>
+              <a:rPr lang="ru-RU" sz="2600"/>
+              <a:t>Деструктор используется только для </a:t>
+            </a:r>
+            <a:r>
+              <a:rPr lang="ru-RU" sz="2600"/>
+              <a:t>деинициализации</a:t>
+            </a:r>
+            <a:r>
+              <a:rPr lang="ru-RU" sz="2600"/>
+              <a:t> объекта – во </a:t>
+            </a:r>
+            <a:r>
+              <a:rPr lang="ru-RU" sz="2600"/>
+              <a:t>многих случаях при </a:t>
+            </a:r>
+            <a:r>
+              <a:rPr lang="ru-RU" sz="2600"/>
+              <a:t>завершении работы объекту </a:t>
+            </a:r>
+            <a:r>
+              <a:rPr lang="ru-RU" sz="2600"/>
+              <a:t>необходимо выполнить </a:t>
+            </a:r>
+            <a:r>
+              <a:rPr lang="ru-RU" sz="2600"/>
+              <a:t>некоторую </a:t>
+            </a:r>
+            <a:r>
+              <a:rPr lang="ru-RU" sz="2600"/>
+              <a:t>последовательность </a:t>
+            </a:r>
+            <a:r>
+              <a:rPr lang="ru-RU" sz="2600"/>
+              <a:t>действий. Например, освободить память или другие ресурсы, которые объект использовал</a:t>
+            </a:r>
+            <a:endParaRPr lang="ru-RU" sz="2600"/>
+          </a:p>
+          <a:p>
+            <a:pPr>
+              <a:buClr>
+                <a:schemeClr val="accent1"/>
+              </a:buClr>
+              <a:buSzPct val="80000"/>
+              <a:buFont typeface="Wingdings"/>
+              <a:buChar char="Ø"/>
+              <a:defRPr/>
+            </a:pPr>
+            <a:r>
+              <a:rPr lang="ru-RU" sz="2600"/>
+              <a:t>Деструктор имеет имя класса, предварённое «</a:t>
+            </a:r>
+            <a:r>
+              <a:rPr lang="en-US" sz="2600"/>
+              <a:t>~</a:t>
+            </a:r>
+            <a:r>
+              <a:rPr lang="ru-RU" sz="2600"/>
+              <a:t>»</a:t>
+            </a:r>
+            <a:r>
+              <a:rPr lang="en-US" sz="2600"/>
+              <a:t>: ~Cat(), </a:t>
+            </a:r>
+            <a:r>
+              <a:rPr lang="ru-RU" sz="2600"/>
+              <a:t>не принимает аргументов и не возвращает значения (даже </a:t>
+            </a:r>
+            <a:r>
+              <a:rPr lang="en-US" sz="2600"/>
+              <a:t>void </a:t>
+            </a:r>
+            <a:r>
+              <a:rPr lang="ru-RU" sz="2600"/>
+              <a:t>не возвращает)</a:t>
+            </a:r>
+            <a:endParaRPr sz="2000"/>
+          </a:p>
+          <a:p>
+            <a:pPr>
+              <a:buClr>
+                <a:schemeClr val="accent1"/>
+              </a:buClr>
+              <a:buSzPct val="80000"/>
+              <a:buFont typeface="Wingdings"/>
+              <a:buChar char="Ø"/>
+              <a:defRPr/>
+            </a:pPr>
+            <a:r>
+              <a:rPr lang="ru-RU" sz="2600"/>
+              <a:t>Если никаких действий при удалении объекта не требуется, деструктор можно не </a:t>
+            </a:r>
+            <a:r>
+              <a:rPr lang="ru-RU" sz="2600"/>
+              <a:t>определять – компилятор сгенерирует его сам</a:t>
+            </a:r>
+            <a:endParaRPr lang="en-US" sz="2600"/>
+          </a:p>
+        </p:txBody>
+      </p:sp>
+      <p:pic>
+        <p:nvPicPr>
+          <p:cNvPr id="2" name="Рисунок 1"/>
+          <p:cNvPicPr>
+            <a:picLocks noChangeAspect="1"/>
+          </p:cNvPicPr>
+          <p:nvPr/>
+        </p:nvPicPr>
+        <p:blipFill>
+          <a:blip r:embed="rId2"/>
+          <a:stretch/>
+        </p:blipFill>
+        <p:spPr bwMode="auto">
+          <a:xfrm>
+            <a:off x="370220" y="2456653"/>
+            <a:ext cx="3944985" cy="1228379"/>
+          </a:xfrm>
+          <a:prstGeom prst="rect">
+            <a:avLst/>
+          </a:prstGeom>
+        </p:spPr>
+      </p:pic>
+      <p:sp>
+        <p:nvSpPr>
+          <p:cNvPr id="84046984" name=""/>
           <p:cNvSpPr txBox="1"/>
           <p:nvPr/>
         </p:nvSpPr>
         <p:spPr bwMode="auto">
           <a:xfrm flipH="0" flipV="0">
-            <a:off x="10110943" y="6351039"/>
-            <a:ext cx="1828211" cy="366119"/>
+            <a:off x="8301132" y="6117156"/>
+            <a:ext cx="3638022" cy="640440"/>
           </a:xfrm>
           <a:prstGeom prst="rect">
             <a:avLst/>
@@ -13764,6 +13685,16 @@
             <a:r>
               <a:rPr/>
               <a:t>examples/1_cat</a:t>
+            </a:r>
+            <a:endParaRPr/>
+          </a:p>
+          <a:p>
+            <a:pPr>
+              <a:defRPr/>
+            </a:pPr>
+            <a:r>
+              <a:rPr/>
+              <a:t>examples/2_default_construction</a:t>
             </a:r>
             <a:endParaRPr/>
           </a:p>
@@ -13811,6 +13742,119 @@
       </p:grpSpPr>
       <p:sp>
         <p:nvSpPr>
+          <p:cNvPr id="3" name="Объект 2"/>
+          <p:cNvSpPr>
+            <a:spLocks noGrp="1"/>
+          </p:cNvSpPr>
+          <p:nvPr>
+            <p:ph idx="1"/>
+          </p:nvPr>
+        </p:nvSpPr>
+        <p:spPr bwMode="auto">
+          <a:xfrm flipH="0" flipV="0">
+            <a:off x="5011150" y="1316735"/>
+            <a:ext cx="6928003" cy="4988813"/>
+          </a:xfrm>
+          <a:prstGeom prst="rect">
+            <a:avLst/>
+          </a:prstGeom>
+          <a:solidFill>
+            <a:schemeClr val="bg1"/>
+          </a:solidFill>
+        </p:spPr>
+        <p:txBody>
+          <a:bodyPr vertOverflow="overflow" horzOverflow="overflow" vert="horz" wrap="square" lIns="91440" tIns="45720" rIns="91440" bIns="45720" numCol="1" spcCol="0" rtlCol="0" fromWordArt="0" anchor="t" anchorCtr="0" forceAA="0" upright="0" compatLnSpc="0">
+            <a:normAutofit fontScale="95000" lnSpcReduction="1000"/>
+          </a:bodyPr>
+          <a:lstStyle/>
+          <a:p>
+            <a:pPr>
+              <a:buClr>
+                <a:schemeClr val="accent1"/>
+              </a:buClr>
+              <a:buSzPct val="80000"/>
+              <a:buFont typeface="Wingdings"/>
+              <a:buChar char="Ø"/>
+              <a:defRPr/>
+            </a:pPr>
+            <a:r>
+              <a:rPr lang="ru-RU"/>
+              <a:t>Для простой инициализации членов данных объекта предусмотрен список инициализации</a:t>
+            </a:r>
+            <a:endParaRPr/>
+          </a:p>
+          <a:p>
+            <a:pPr>
+              <a:buClr>
+                <a:schemeClr val="accent1"/>
+              </a:buClr>
+              <a:buSzPct val="80000"/>
+              <a:buFont typeface="Wingdings"/>
+              <a:buChar char="Ø"/>
+              <a:defRPr/>
+            </a:pPr>
+            <a:r>
+              <a:rPr lang="ru-RU"/>
+              <a:t>Члены данных, не инициализированные в списке инициализации, сначала создаются при помощи конструкторов по умолчанию (если это объекты, а не переменные встроенных типов), и только потом поток выполнения переходит в конструктор</a:t>
+            </a:r>
+            <a:endParaRPr/>
+          </a:p>
+          <a:p>
+            <a:pPr>
+              <a:buClr>
+                <a:schemeClr val="accent1"/>
+              </a:buClr>
+              <a:buSzPct val="80000"/>
+              <a:buFont typeface="Wingdings"/>
+              <a:buChar char="Ø"/>
+              <a:defRPr/>
+            </a:pPr>
+            <a:r>
+              <a:rPr lang="ru-RU"/>
+              <a:t>При инициализации в списке инициализации предварительного создания объекта-члена данных с конструктором по умолчанию не происходит</a:t>
+            </a:r>
+            <a:endParaRPr/>
+          </a:p>
+          <a:p>
+            <a:pPr>
+              <a:buClr>
+                <a:schemeClr val="accent1"/>
+              </a:buClr>
+              <a:buSzPct val="80000"/>
+              <a:buFont typeface="Wingdings"/>
+              <a:buChar char="Ø"/>
+              <a:defRPr/>
+            </a:pPr>
+            <a:r>
+              <a:rPr lang="ru-RU"/>
+              <a:t>Если для инициализации объекта-члена данных класса достаточно конструктора по умолчанию указанного объекта-члена данных, в явном виде вызывать его конструктор не нужно</a:t>
+            </a:r>
+            <a:endParaRPr/>
+          </a:p>
+          <a:p>
+            <a:pPr>
+              <a:buClr>
+                <a:schemeClr val="accent1"/>
+              </a:buClr>
+              <a:buSzPct val="80000"/>
+              <a:buFont typeface="Wingdings"/>
+              <a:buChar char="Ø"/>
+              <a:defRPr/>
+            </a:pPr>
+            <a:r>
+              <a:rPr lang="ru-RU"/>
+              <a:t>Ч</a:t>
+            </a:r>
+            <a:r>
+              <a:rPr lang="ru-RU"/>
+              <a:t>лены данных, являющиеся нестатическими константами (см. дальше), могут быть инициализированы с параметрами только в списке инициализации</a:t>
+            </a:r>
+            <a:endParaRPr lang="en-US"/>
+          </a:p>
+        </p:txBody>
+      </p:sp>
+      <p:sp>
+        <p:nvSpPr>
           <p:cNvPr id="4" name="Заголовок 1"/>
           <p:cNvSpPr>
             <a:spLocks noGrp="1"/>
@@ -13821,8 +13865,8 @@
         </p:nvSpPr>
         <p:spPr bwMode="auto">
           <a:xfrm>
-            <a:off x="283779" y="169798"/>
-            <a:ext cx="11655376" cy="769909"/>
+            <a:off x="283779" y="210557"/>
+            <a:ext cx="11655376" cy="984398"/>
           </a:xfrm>
           <a:prstGeom prst="rect">
             <a:avLst/>
@@ -13851,7 +13895,360 @@
             </a:r>
             <a:r>
               <a:rPr lang="ru-RU" sz="2800" b="1"/>
-              <a:t>ООП в С++. Обращение к объектам</a:t>
+              <a:t>ООП в С++. Список инициализации</a:t>
+            </a:r>
+            <a:endParaRPr lang="en-US" sz="2800" b="1"/>
+          </a:p>
+        </p:txBody>
+      </p:sp>
+      <p:pic>
+        <p:nvPicPr>
+          <p:cNvPr id="5" name="Рисунок 4"/>
+          <p:cNvPicPr>
+            <a:picLocks noChangeAspect="1"/>
+          </p:cNvPicPr>
+          <p:nvPr/>
+        </p:nvPicPr>
+        <p:blipFill>
+          <a:blip r:embed="rId2"/>
+          <a:stretch/>
+        </p:blipFill>
+        <p:spPr bwMode="auto">
+          <a:xfrm>
+            <a:off x="613263" y="2073302"/>
+            <a:ext cx="4214708" cy="2882746"/>
+          </a:xfrm>
+          <a:prstGeom prst="rect">
+            <a:avLst/>
+          </a:prstGeom>
+        </p:spPr>
+      </p:pic>
+      <p:sp>
+        <p:nvSpPr>
+          <p:cNvPr id="6" name="Прямоугольник 5"/>
+          <p:cNvSpPr/>
+          <p:nvPr/>
+        </p:nvSpPr>
+        <p:spPr bwMode="auto">
+          <a:xfrm>
+            <a:off x="1207008" y="2304287"/>
+            <a:ext cx="2340864" cy="512065"/>
+          </a:xfrm>
+          <a:prstGeom prst="rect">
+            <a:avLst/>
+          </a:prstGeom>
+          <a:noFill/>
+        </p:spPr>
+        <p:style>
+          <a:lnRef idx="2">
+            <a:schemeClr val="accent1">
+              <a:shade val="50000"/>
+            </a:schemeClr>
+          </a:lnRef>
+          <a:fillRef idx="1">
+            <a:schemeClr val="accent1"/>
+          </a:fillRef>
+          <a:effectRef idx="0">
+            <a:schemeClr val="accent1"/>
+          </a:effectRef>
+          <a:fontRef idx="minor">
+            <a:schemeClr val="lt1"/>
+          </a:fontRef>
+        </p:style>
+        <p:txBody>
+          <a:bodyPr rtlCol="0" anchor="ctr"/>
+          <a:lstStyle/>
+          <a:p>
+            <a:pPr algn="ctr">
+              <a:defRPr/>
+            </a:pPr>
+            <a:endParaRPr lang="en-US"/>
+          </a:p>
+        </p:txBody>
+      </p:sp>
+      <p:sp>
+        <p:nvSpPr>
+          <p:cNvPr id="7" name="Прямоугольник 6"/>
+          <p:cNvSpPr/>
+          <p:nvPr/>
+        </p:nvSpPr>
+        <p:spPr bwMode="auto">
+          <a:xfrm>
+            <a:off x="1207008" y="3764280"/>
+            <a:ext cx="3529584" cy="512064"/>
+          </a:xfrm>
+          <a:prstGeom prst="rect">
+            <a:avLst/>
+          </a:prstGeom>
+          <a:noFill/>
+        </p:spPr>
+        <p:style>
+          <a:lnRef idx="2">
+            <a:schemeClr val="accent1">
+              <a:shade val="50000"/>
+            </a:schemeClr>
+          </a:lnRef>
+          <a:fillRef idx="1">
+            <a:schemeClr val="accent1"/>
+          </a:fillRef>
+          <a:effectRef idx="0">
+            <a:schemeClr val="accent1"/>
+          </a:effectRef>
+          <a:fontRef idx="minor">
+            <a:schemeClr val="lt1"/>
+          </a:fontRef>
+        </p:style>
+        <p:txBody>
+          <a:bodyPr rtlCol="0" anchor="ctr"/>
+          <a:lstStyle/>
+          <a:p>
+            <a:pPr algn="ctr">
+              <a:defRPr/>
+            </a:pPr>
+            <a:endParaRPr lang="en-US"/>
+          </a:p>
+        </p:txBody>
+      </p:sp>
+      <p:cxnSp>
+        <p:nvCxnSpPr>
+          <p:cNvPr id="9" name="Прямая соединительная линия 8"/>
+          <p:cNvCxnSpPr>
+            <a:cxnSpLocks/>
+          </p:cNvCxnSpPr>
+          <p:nvPr/>
+        </p:nvCxnSpPr>
+        <p:spPr bwMode="auto">
+          <a:xfrm flipH="1">
+            <a:off x="430083" y="2304288"/>
+            <a:ext cx="776926" cy="0"/>
+          </a:xfrm>
+          <a:prstGeom prst="line">
+            <a:avLst/>
+          </a:prstGeom>
+          <a:ln w="19050"/>
+        </p:spPr>
+        <p:style>
+          <a:lnRef idx="1">
+            <a:schemeClr val="accent1"/>
+          </a:lnRef>
+          <a:fillRef idx="0">
+            <a:schemeClr val="accent1"/>
+          </a:fillRef>
+          <a:effectRef idx="0">
+            <a:schemeClr val="accent1"/>
+          </a:effectRef>
+          <a:fontRef idx="minor">
+            <a:schemeClr val="tx1"/>
+          </a:fontRef>
+        </p:style>
+      </p:cxnSp>
+      <p:cxnSp>
+        <p:nvCxnSpPr>
+          <p:cNvPr id="11" name="Прямая соединительная линия 10"/>
+          <p:cNvCxnSpPr>
+            <a:cxnSpLocks/>
+          </p:cNvCxnSpPr>
+          <p:nvPr/>
+        </p:nvCxnSpPr>
+        <p:spPr bwMode="auto">
+          <a:xfrm>
+            <a:off x="430083" y="2304288"/>
+            <a:ext cx="0" cy="3182112"/>
+          </a:xfrm>
+          <a:prstGeom prst="line">
+            <a:avLst/>
+          </a:prstGeom>
+          <a:ln w="19050"/>
+        </p:spPr>
+        <p:style>
+          <a:lnRef idx="1">
+            <a:schemeClr val="accent1"/>
+          </a:lnRef>
+          <a:fillRef idx="0">
+            <a:schemeClr val="accent1"/>
+          </a:fillRef>
+          <a:effectRef idx="0">
+            <a:schemeClr val="accent1"/>
+          </a:effectRef>
+          <a:fontRef idx="minor">
+            <a:schemeClr val="tx1"/>
+          </a:fontRef>
+        </p:style>
+      </p:cxnSp>
+      <p:cxnSp>
+        <p:nvCxnSpPr>
+          <p:cNvPr id="13" name="Прямая соединительная линия 12"/>
+          <p:cNvCxnSpPr>
+            <a:cxnSpLocks/>
+          </p:cNvCxnSpPr>
+          <p:nvPr/>
+        </p:nvCxnSpPr>
+        <p:spPr bwMode="auto">
+          <a:xfrm flipH="1">
+            <a:off x="430083" y="3764280"/>
+            <a:ext cx="776926" cy="0"/>
+          </a:xfrm>
+          <a:prstGeom prst="line">
+            <a:avLst/>
+          </a:prstGeom>
+          <a:ln w="19050"/>
+        </p:spPr>
+        <p:style>
+          <a:lnRef idx="1">
+            <a:schemeClr val="accent1"/>
+          </a:lnRef>
+          <a:fillRef idx="0">
+            <a:schemeClr val="accent1"/>
+          </a:fillRef>
+          <a:effectRef idx="0">
+            <a:schemeClr val="accent1"/>
+          </a:effectRef>
+          <a:fontRef idx="minor">
+            <a:schemeClr val="tx1"/>
+          </a:fontRef>
+        </p:style>
+      </p:cxnSp>
+      <p:sp>
+        <p:nvSpPr>
+          <p:cNvPr id="17" name="TextBox 16"/>
+          <p:cNvSpPr txBox="1"/>
+          <p:nvPr/>
+        </p:nvSpPr>
+        <p:spPr bwMode="auto">
+          <a:xfrm>
+            <a:off x="430083" y="5373099"/>
+            <a:ext cx="2648482" cy="369332"/>
+          </a:xfrm>
+          <a:prstGeom prst="rect">
+            <a:avLst/>
+          </a:prstGeom>
+          <a:noFill/>
+        </p:spPr>
+        <p:txBody>
+          <a:bodyPr wrap="none" rtlCol="0">
+            <a:spAutoFit/>
+          </a:bodyPr>
+          <a:lstStyle/>
+          <a:p>
+            <a:pPr>
+              <a:defRPr/>
+            </a:pPr>
+            <a:r>
+              <a:rPr lang="ru-RU"/>
+              <a:t>Список инициализации</a:t>
+            </a:r>
+            <a:endParaRPr lang="en-US"/>
+          </a:p>
+        </p:txBody>
+      </p:sp>
+      <p:sp>
+        <p:nvSpPr>
+          <p:cNvPr id="567220444" name=""/>
+          <p:cNvSpPr txBox="1"/>
+          <p:nvPr/>
+        </p:nvSpPr>
+        <p:spPr bwMode="auto">
+          <a:xfrm flipH="0" flipV="0">
+            <a:off x="8286618" y="6305549"/>
+            <a:ext cx="3638022" cy="366119"/>
+          </a:xfrm>
+          <a:prstGeom prst="rect">
+            <a:avLst/>
+          </a:prstGeom>
+          <a:noFill/>
+        </p:spPr>
+        <p:txBody>
+          <a:bodyPr vertOverflow="overflow" horzOverflow="overflow" vert="horz" wrap="none" lIns="91440" tIns="45720" rIns="91440" bIns="45720" numCol="1" spcCol="0" rtlCol="0" fromWordArt="0" anchor="t" anchorCtr="0" forceAA="0" upright="0" compatLnSpc="0">
+            <a:spAutoFit/>
+          </a:bodyPr>
+          <a:p>
+            <a:pPr>
+              <a:defRPr/>
+            </a:pPr>
+            <a:r>
+              <a:rPr/>
+              <a:t>examples/2_default_construction</a:t>
+            </a:r>
+            <a:endParaRPr/>
+          </a:p>
+        </p:txBody>
+      </p:sp>
+    </p:spTree>
+  </p:cSld>
+  <p:clrMapOvr>
+    <a:masterClrMapping/>
+  </p:clrMapOvr>
+  <mc:AlternateContent xmlns:mc="http://schemas.openxmlformats.org/markup-compatibility/2006">
+    <mc:Choice xmlns:p14="http://schemas.microsoft.com/office/powerpoint/2010/main" Requires="p14">
+      <p:transition p14:dur="2000" advClick="1"/>
+    </mc:Choice>
+    <mc:Fallback>
+      <p:transition advClick="1"/>
+    </mc:Fallback>
+  </mc:AlternateContent>
+</p:sld>
+</file>
+
+<file path=ppt/slides/slide28.xml><?xml version="1.0" encoding="utf-8"?>
+<p:sld xmlns:a="http://schemas.openxmlformats.org/drawingml/2006/main" xmlns:r="http://schemas.openxmlformats.org/officeDocument/2006/relationships" xmlns:p="http://schemas.openxmlformats.org/presentationml/2006/main" xmlns:m="http://schemas.openxmlformats.org/officeDocument/2006/math" xmlns:w="http://schemas.openxmlformats.org/wordprocessingml/2006/main" showMasterPhAnim="0" show="1">
+  <p:cSld name="">
+    <p:spTree>
+      <p:nvGrpSpPr>
+        <p:cNvPr id="1" name=""/>
+        <p:cNvGrpSpPr/>
+        <p:nvPr/>
+      </p:nvGrpSpPr>
+      <p:grpSpPr bwMode="auto">
+        <a:xfrm>
+          <a:off x="0" y="0"/>
+          <a:ext cx="0" cy="0"/>
+          <a:chOff x="0" y="0"/>
+          <a:chExt cx="0" cy="0"/>
+        </a:xfrm>
+      </p:grpSpPr>
+      <p:sp>
+        <p:nvSpPr>
+          <p:cNvPr id="4" name="Заголовок 1"/>
+          <p:cNvSpPr>
+            <a:spLocks noGrp="1"/>
+          </p:cNvSpPr>
+          <p:nvPr>
+            <p:ph type="title"/>
+          </p:nvPr>
+        </p:nvSpPr>
+        <p:spPr bwMode="auto">
+          <a:xfrm>
+            <a:off x="283779" y="210557"/>
+            <a:ext cx="11655376" cy="1113746"/>
+          </a:xfrm>
+          <a:prstGeom prst="rect">
+            <a:avLst/>
+          </a:prstGeom>
+          <a:solidFill>
+            <a:schemeClr val="bg1"/>
+          </a:solidFill>
+          <a:ln>
+            <a:solidFill>
+              <a:schemeClr val="tx1"/>
+            </a:solidFill>
+          </a:ln>
+        </p:spPr>
+        <p:txBody>
+          <a:bodyPr anchor="ctr" anchorCtr="0">
+            <a:normAutofit/>
+          </a:bodyPr>
+          <a:lstStyle/>
+          <a:p>
+            <a:pPr algn="ctr">
+              <a:defRPr/>
+            </a:pPr>
+            <a:r>
+              <a:rPr lang="en-US" sz="2800" b="1"/>
+              <a:t>2. </a:t>
+            </a:r>
+            <a:r>
+              <a:rPr lang="ru-RU" sz="2800" b="1"/>
+              <a:t>ООП в С++. Особенности методов</a:t>
             </a:r>
             <a:endParaRPr lang="en-US" sz="2800" b="1"/>
           </a:p>
@@ -13869,8 +14266,8 @@
         </p:nvSpPr>
         <p:spPr bwMode="auto">
           <a:xfrm>
-            <a:off x="283779" y="1170828"/>
-            <a:ext cx="4662293" cy="5077849"/>
+            <a:off x="283778" y="1426860"/>
+            <a:ext cx="11655377" cy="2328998"/>
           </a:xfrm>
           <a:prstGeom prst="rect">
             <a:avLst/>
@@ -13881,7 +14278,7 @@
         </p:spPr>
         <p:txBody>
           <a:bodyPr>
-            <a:normAutofit lnSpcReduction="10000"/>
+            <a:normAutofit/>
           </a:bodyPr>
           <a:lstStyle/>
           <a:p>
@@ -13896,97 +14293,446 @@
             </a:pPr>
             <a:r>
               <a:rPr lang="ru-RU" sz="2400"/>
-              <a:t>Со стороны членов  класса:</a:t>
+              <a:t>Как закрытые, так и открытые методы могут быть константными. Тогда они гарантируют, что не будут изменять никакие члены данных. По этой причине они могут вызывать только другие константные или статические методы класса. Статические методы нет смысла объявлять константными – они не имеют доступа к другим членам класса, а значит, не могут их изменить</a:t>
             </a:r>
             <a:endParaRPr/>
           </a:p>
           <a:p>
-            <a:pPr marL="519113" indent="280988">
-              <a:buFont typeface="Arial"/>
-              <a:buChar char="•"/>
-              <a:defRPr/>
-            </a:pPr>
-            <a:r>
-              <a:rPr lang="ru-RU" sz="2400"/>
-              <a:t>Из </a:t>
-            </a:r>
-            <a:r>
-              <a:rPr lang="ru-RU" sz="2400"/>
-              <a:t>методов </a:t>
-            </a:r>
-            <a:r>
-              <a:rPr lang="ru-RU" sz="2400"/>
-              <a:t>класса можно обращаться </a:t>
-            </a:r>
-            <a:r>
-              <a:rPr lang="ru-RU" sz="2400"/>
-              <a:t>к любым </a:t>
-            </a:r>
-            <a:r>
-              <a:rPr lang="ru-RU" sz="2400"/>
-              <a:t>другим свойствам и методам </a:t>
-            </a:r>
-            <a:r>
-              <a:rPr lang="ru-RU" sz="2400"/>
-              <a:t>класса (открытым, закрытым, статическим</a:t>
-            </a:r>
-            <a:r>
-              <a:rPr lang="ru-RU" sz="2400"/>
-              <a:t>, </a:t>
-            </a:r>
-            <a:r>
-              <a:rPr lang="ru-RU" sz="2400"/>
-              <a:t>нестатическим</a:t>
-            </a:r>
-            <a:r>
-              <a:rPr lang="ru-RU" sz="2400"/>
-              <a:t> </a:t>
-            </a:r>
-            <a:r>
-              <a:rPr lang="ru-RU" sz="2400"/>
-              <a:t>– любым) </a:t>
-            </a:r>
-            <a:r>
-              <a:rPr lang="ru-RU" sz="2400"/>
-              <a:t>напрямую по </a:t>
-            </a:r>
-            <a:r>
-              <a:rPr lang="ru-RU" sz="2400"/>
-              <a:t>имени</a:t>
-            </a:r>
-            <a:endParaRPr/>
-          </a:p>
-          <a:p>
-            <a:pPr marL="519113" indent="280988">
-              <a:buFont typeface="Arial"/>
-              <a:buChar char="•"/>
-              <a:defRPr/>
-            </a:pPr>
-            <a:r>
-              <a:rPr lang="ru-RU" sz="2400"/>
-              <a:t>Это верно за исключением ограничений, связанных со статическими и константными методами</a:t>
-            </a:r>
-            <a:endParaRPr/>
-          </a:p>
-          <a:p>
-            <a:pPr marL="0" indent="0">
-              <a:buNone/>
+            <a:pPr>
+              <a:buClr>
+                <a:schemeClr val="accent1"/>
+              </a:buClr>
+              <a:buSzPct val="80000"/>
+              <a:buFont typeface="Wingdings"/>
+              <a:buChar char="Ø"/>
+              <a:defRPr/>
+            </a:pPr>
+            <a:endParaRPr lang="ru-RU" sz="2400"/>
+          </a:p>
+          <a:p>
+            <a:pPr>
+              <a:buClr>
+                <a:schemeClr val="accent1"/>
+              </a:buClr>
+              <a:buSzPct val="80000"/>
+              <a:buFont typeface="Wingdings"/>
+              <a:buChar char="Ø"/>
+              <a:defRPr/>
+            </a:pPr>
+            <a:endParaRPr lang="ru-RU" sz="2400"/>
+          </a:p>
+          <a:p>
+            <a:pPr>
+              <a:buClr>
+                <a:schemeClr val="accent1"/>
+              </a:buClr>
+              <a:buSzPct val="80000"/>
+              <a:buFont typeface="Wingdings"/>
+              <a:buChar char="Ø"/>
+              <a:defRPr/>
+            </a:pPr>
+            <a:endParaRPr lang="ru-RU" sz="2400"/>
+          </a:p>
+          <a:p>
+            <a:pPr>
+              <a:buClr>
+                <a:schemeClr val="accent1"/>
+              </a:buClr>
+              <a:buSzPct val="80000"/>
+              <a:buFont typeface="Wingdings"/>
+              <a:buChar char="Ø"/>
               <a:defRPr/>
             </a:pPr>
             <a:endParaRPr lang="en-US" sz="2400"/>
           </a:p>
         </p:txBody>
       </p:sp>
-      <p:sp>
-        <p:nvSpPr>
-          <p:cNvPr id="6" name="Объект 2"/>
+      <p:pic>
+        <p:nvPicPr>
+          <p:cNvPr id="6" name="Рисунок 5"/>
+          <p:cNvPicPr>
+            <a:picLocks noChangeAspect="1"/>
+          </p:cNvPicPr>
+          <p:nvPr/>
+        </p:nvPicPr>
+        <p:blipFill>
+          <a:blip r:embed="rId2"/>
+          <a:stretch/>
+        </p:blipFill>
+        <p:spPr bwMode="auto">
+          <a:xfrm>
+            <a:off x="3942965" y="3953721"/>
+            <a:ext cx="3529709" cy="687200"/>
+          </a:xfrm>
+          <a:prstGeom prst="rect">
+            <a:avLst/>
+          </a:prstGeom>
+        </p:spPr>
+      </p:pic>
+      <p:pic>
+        <p:nvPicPr>
+          <p:cNvPr id="8" name="Рисунок 7"/>
+          <p:cNvPicPr>
+            <a:picLocks noChangeAspect="1"/>
+          </p:cNvPicPr>
+          <p:nvPr/>
+        </p:nvPicPr>
+        <p:blipFill>
+          <a:blip r:embed="rId3"/>
+          <a:stretch/>
+        </p:blipFill>
+        <p:spPr bwMode="auto">
+          <a:xfrm>
+            <a:off x="3942965" y="4898218"/>
+            <a:ext cx="3760387" cy="1342995"/>
+          </a:xfrm>
+          <a:prstGeom prst="rect">
+            <a:avLst/>
+          </a:prstGeom>
+        </p:spPr>
+      </p:pic>
+      <p:sp>
+        <p:nvSpPr>
+          <p:cNvPr id="10" name="TextBox 9"/>
           <p:cNvSpPr txBox="1"/>
           <p:nvPr/>
         </p:nvSpPr>
         <p:spPr bwMode="auto">
           <a:xfrm>
-            <a:off x="5133109" y="1170828"/>
-            <a:ext cx="6806046" cy="3311395"/>
+            <a:off x="2317746" y="5200383"/>
+            <a:ext cx="1051891" cy="369332"/>
+          </a:xfrm>
+          <a:prstGeom prst="rect">
+            <a:avLst/>
+          </a:prstGeom>
+          <a:noFill/>
+        </p:spPr>
+        <p:txBody>
+          <a:bodyPr wrap="none" rtlCol="0">
+            <a:spAutoFit/>
+          </a:bodyPr>
+          <a:lstStyle/>
+          <a:p>
+            <a:pPr>
+              <a:defRPr/>
+            </a:pPr>
+            <a:r>
+              <a:rPr lang="en-US"/>
+              <a:t>cat.cpp</a:t>
+            </a:r>
+            <a:r>
+              <a:rPr lang="ru-RU"/>
+              <a:t>:</a:t>
+            </a:r>
+            <a:endParaRPr lang="en-US"/>
+          </a:p>
+        </p:txBody>
+      </p:sp>
+      <p:sp>
+        <p:nvSpPr>
+          <p:cNvPr id="13" name="TextBox 12"/>
+          <p:cNvSpPr txBox="1"/>
+          <p:nvPr/>
+        </p:nvSpPr>
+        <p:spPr bwMode="auto">
+          <a:xfrm>
+            <a:off x="1572351" y="3696423"/>
+            <a:ext cx="2542683" cy="923330"/>
+          </a:xfrm>
+          <a:prstGeom prst="rect">
+            <a:avLst/>
+          </a:prstGeom>
+          <a:noFill/>
+        </p:spPr>
+        <p:txBody>
+          <a:bodyPr wrap="none" rtlCol="0">
+            <a:spAutoFit/>
+          </a:bodyPr>
+          <a:lstStyle/>
+          <a:p>
+            <a:pPr algn="ctr">
+              <a:defRPr/>
+            </a:pPr>
+            <a:r>
+              <a:rPr lang="en-US"/>
+              <a:t>cat.h</a:t>
+            </a:r>
+            <a:endParaRPr lang="ru-RU"/>
+          </a:p>
+          <a:p>
+            <a:pPr algn="ctr">
+              <a:defRPr/>
+            </a:pPr>
+            <a:r>
+              <a:rPr lang="ru-RU"/>
+              <a:t>(внутри </a:t>
+            </a:r>
+            <a:endParaRPr/>
+          </a:p>
+          <a:p>
+            <a:pPr algn="ctr">
+              <a:defRPr/>
+            </a:pPr>
+            <a:r>
+              <a:rPr lang="ru-RU"/>
+              <a:t>определения класса):</a:t>
+            </a:r>
+            <a:endParaRPr lang="en-US"/>
+          </a:p>
+        </p:txBody>
+      </p:sp>
+      <p:sp>
+        <p:nvSpPr>
+          <p:cNvPr id="141583794" name=""/>
+          <p:cNvSpPr txBox="1"/>
+          <p:nvPr/>
+        </p:nvSpPr>
+        <p:spPr bwMode="auto">
+          <a:xfrm flipH="0" flipV="0">
+            <a:off x="10058268" y="6241212"/>
+            <a:ext cx="1828211" cy="366119"/>
+          </a:xfrm>
+          <a:prstGeom prst="rect">
+            <a:avLst/>
+          </a:prstGeom>
+          <a:noFill/>
+        </p:spPr>
+        <p:txBody>
+          <a:bodyPr vertOverflow="overflow" horzOverflow="overflow" vert="horz" wrap="none" lIns="91440" tIns="45720" rIns="91440" bIns="45720" numCol="1" spcCol="0" rtlCol="0" fromWordArt="0" anchor="t" anchorCtr="0" forceAA="0" upright="0" compatLnSpc="0">
+            <a:spAutoFit/>
+          </a:bodyPr>
+          <a:p>
+            <a:pPr>
+              <a:defRPr/>
+            </a:pPr>
+            <a:r>
+              <a:rPr/>
+              <a:t>examples/1_cat</a:t>
+            </a:r>
+            <a:endParaRPr/>
+          </a:p>
+        </p:txBody>
+      </p:sp>
+    </p:spTree>
+  </p:cSld>
+  <p:clrMapOvr>
+    <a:masterClrMapping/>
+  </p:clrMapOvr>
+  <mc:AlternateContent xmlns:mc="http://schemas.openxmlformats.org/markup-compatibility/2006">
+    <mc:Choice xmlns:p14="http://schemas.microsoft.com/office/powerpoint/2010/main" Requires="p14">
+      <p:transition p14:dur="2000" advClick="1"/>
+    </mc:Choice>
+    <mc:Fallback>
+      <p:transition advClick="1"/>
+    </mc:Fallback>
+  </mc:AlternateContent>
+  <p:timing>
+    <p:tnLst>
+      <p:par>
+        <p:cTn id="1" dur="indefinite" restart="never" nodeType="tmRoot"/>
+      </p:par>
+    </p:tnLst>
+  </p:timing>
+</p:sld>
+</file>
+
+<file path=ppt/slides/slide29.xml><?xml version="1.0" encoding="utf-8"?>
+<p:sld xmlns:a="http://schemas.openxmlformats.org/drawingml/2006/main" xmlns:r="http://schemas.openxmlformats.org/officeDocument/2006/relationships" xmlns:p="http://schemas.openxmlformats.org/presentationml/2006/main" xmlns:m="http://schemas.openxmlformats.org/officeDocument/2006/math" xmlns:w="http://schemas.openxmlformats.org/wordprocessingml/2006/main" showMasterPhAnim="0" show="1">
+  <p:cSld name="">
+    <p:spTree>
+      <p:nvGrpSpPr>
+        <p:cNvPr id="1" name=""/>
+        <p:cNvGrpSpPr/>
+        <p:nvPr/>
+      </p:nvGrpSpPr>
+      <p:grpSpPr bwMode="auto">
+        <a:xfrm>
+          <a:off x="0" y="0"/>
+          <a:ext cx="0" cy="0"/>
+          <a:chOff x="0" y="0"/>
+          <a:chExt cx="0" cy="0"/>
+        </a:xfrm>
+      </p:grpSpPr>
+      <p:sp>
+        <p:nvSpPr>
+          <p:cNvPr id="4" name="Заголовок 1"/>
+          <p:cNvSpPr>
+            <a:spLocks noGrp="1"/>
+          </p:cNvSpPr>
+          <p:nvPr>
+            <p:ph type="title"/>
+          </p:nvPr>
+        </p:nvSpPr>
+        <p:spPr bwMode="auto">
+          <a:xfrm>
+            <a:off x="283779" y="210557"/>
+            <a:ext cx="11655376" cy="910163"/>
+          </a:xfrm>
+          <a:prstGeom prst="rect">
+            <a:avLst/>
+          </a:prstGeom>
+          <a:solidFill>
+            <a:schemeClr val="bg1"/>
+          </a:solidFill>
+          <a:ln>
+            <a:solidFill>
+              <a:schemeClr val="tx1"/>
+            </a:solidFill>
+          </a:ln>
+        </p:spPr>
+        <p:txBody>
+          <a:bodyPr anchor="ctr" anchorCtr="0">
+            <a:normAutofit/>
+          </a:bodyPr>
+          <a:lstStyle/>
+          <a:p>
+            <a:pPr algn="ctr">
+              <a:defRPr/>
+            </a:pPr>
+            <a:r>
+              <a:rPr lang="en-US" sz="2800" b="1"/>
+              <a:t>2. </a:t>
+            </a:r>
+            <a:r>
+              <a:rPr lang="ru-RU" sz="2800" b="1"/>
+              <a:t>ООП в С++. Особенности методов</a:t>
+            </a:r>
+            <a:endParaRPr lang="en-US" sz="2800" b="1"/>
+          </a:p>
+        </p:txBody>
+      </p:sp>
+      <p:sp>
+        <p:nvSpPr>
+          <p:cNvPr id="5" name="Объект 2"/>
+          <p:cNvSpPr>
+            <a:spLocks noGrp="1"/>
+          </p:cNvSpPr>
+          <p:nvPr>
+            <p:ph idx="1"/>
+          </p:nvPr>
+        </p:nvSpPr>
+        <p:spPr bwMode="auto">
+          <a:xfrm>
+            <a:off x="283778" y="1280556"/>
+            <a:ext cx="11655377" cy="807185"/>
+          </a:xfrm>
+          <a:prstGeom prst="rect">
+            <a:avLst/>
+          </a:prstGeom>
+          <a:solidFill>
+            <a:schemeClr val="bg1"/>
+          </a:solidFill>
+        </p:spPr>
+        <p:txBody>
+          <a:bodyPr>
+            <a:normAutofit lnSpcReduction="10000"/>
+          </a:bodyPr>
+          <a:lstStyle/>
+          <a:p>
+            <a:pPr>
+              <a:buClr>
+                <a:schemeClr val="accent1"/>
+              </a:buClr>
+              <a:buSzPct val="80000"/>
+              <a:buFont typeface="Wingdings"/>
+              <a:buChar char="Ø"/>
+              <a:defRPr/>
+            </a:pPr>
+            <a:r>
+              <a:rPr lang="ru-RU" sz="2400"/>
+              <a:t>Методы могут быть встраиваемыми (</a:t>
+            </a:r>
+            <a:r>
+              <a:rPr lang="en-US" sz="2400"/>
+              <a:t>inline</a:t>
+            </a:r>
+            <a:r>
+              <a:rPr lang="ru-RU" sz="2400"/>
+              <a:t>)</a:t>
+            </a:r>
+            <a:r>
+              <a:rPr lang="en-US" sz="2400"/>
+              <a:t>. </a:t>
+            </a:r>
+            <a:r>
+              <a:rPr lang="ru-RU" sz="2400"/>
+              <a:t>Тогда они компилируются не как функции, а напрямую встраиваются в машинный код. Это быстрее</a:t>
+            </a:r>
+            <a:endParaRPr lang="en-US" sz="2400"/>
+          </a:p>
+        </p:txBody>
+      </p:sp>
+      <p:pic>
+        <p:nvPicPr>
+          <p:cNvPr id="6" name="Рисунок 5" descr="Image result for C++ стек вызова функции"/>
+          <p:cNvPicPr/>
+          <p:nvPr/>
+        </p:nvPicPr>
+        <p:blipFill>
+          <a:blip r:embed="rId2"/>
+          <a:stretch/>
+        </p:blipFill>
+        <p:spPr bwMode="auto">
+          <a:xfrm>
+            <a:off x="1039957" y="2285169"/>
+            <a:ext cx="3261879" cy="3699166"/>
+          </a:xfrm>
+          <a:prstGeom prst="rect">
+            <a:avLst/>
+          </a:prstGeom>
+          <a:noFill/>
+          <a:ln>
+            <a:noFill/>
+          </a:ln>
+        </p:spPr>
+      </p:pic>
+      <p:sp>
+        <p:nvSpPr>
+          <p:cNvPr id="7" name="TextBox 6"/>
+          <p:cNvSpPr txBox="1"/>
+          <p:nvPr/>
+        </p:nvSpPr>
+        <p:spPr bwMode="auto">
+          <a:xfrm>
+            <a:off x="768927" y="6181761"/>
+            <a:ext cx="6234544" cy="369332"/>
+          </a:xfrm>
+          <a:prstGeom prst="rect">
+            <a:avLst/>
+          </a:prstGeom>
+          <a:noFill/>
+        </p:spPr>
+        <p:txBody>
+          <a:bodyPr wrap="square" rtlCol="0">
+            <a:spAutoFit/>
+          </a:bodyPr>
+          <a:lstStyle/>
+          <a:p>
+            <a:pPr>
+              <a:defRPr/>
+            </a:pPr>
+            <a:r>
+              <a:rPr lang="ru-RU"/>
+              <a:t>Пример стека при вызове функции, если она не </a:t>
+            </a:r>
+            <a:r>
+              <a:rPr lang="en-US"/>
+              <a:t>inline</a:t>
+            </a:r>
+            <a:endParaRPr lang="en-US"/>
+          </a:p>
+        </p:txBody>
+      </p:sp>
+      <p:sp>
+        <p:nvSpPr>
+          <p:cNvPr id="9" name="Объект 2"/>
+          <p:cNvSpPr txBox="1"/>
+          <p:nvPr/>
+        </p:nvSpPr>
+        <p:spPr bwMode="auto">
+          <a:xfrm>
+            <a:off x="4668742" y="2087741"/>
+            <a:ext cx="7270413" cy="4157211"/>
           </a:xfrm>
           <a:prstGeom prst="rect">
             <a:avLst/>
@@ -14238,72 +14984,31 @@
             </a:pPr>
             <a:r>
               <a:rPr lang="ru-RU" sz="2400"/>
-              <a:t>Со стороны других частей программы (внешних по отношению к классу):</a:t>
+              <a:t>Как правило, встраиваемыми объявляются небольшие служебные функции. Практика показывает, что это удачный компромисс между быстродействием и объемом машинного кода</a:t>
             </a:r>
             <a:endParaRPr/>
           </a:p>
           <a:p>
-            <a:pPr marL="519113" indent="290513">
-              <a:buFont typeface="Arial"/>
-              <a:buChar char="•"/>
+            <a:pPr>
+              <a:buClr>
+                <a:schemeClr val="accent1"/>
+              </a:buClr>
+              <a:buSzPct val="80000"/>
+              <a:buFont typeface="Wingdings"/>
+              <a:buChar char="Ø"/>
               <a:defRPr/>
             </a:pPr>
             <a:r>
               <a:rPr lang="ru-RU" sz="2400"/>
-              <a:t>Обращаться можно только к открытым методам (к закрытым нельзя). Открытые переменные-члены используются редко, т.к. это нарушает инкапсуляцию. Если инкапсуляция не требуется, тогда нужно ли использовать ООП?</a:t>
-            </a:r>
-            <a:endParaRPr/>
-          </a:p>
-          <a:p>
-            <a:pPr marL="519113" indent="290513">
-              <a:buFont typeface="Arial"/>
-              <a:buChar char="•"/>
-              <a:defRPr/>
-            </a:pPr>
-            <a:endParaRPr lang="ru-RU" sz="2400"/>
-          </a:p>
-          <a:p>
-            <a:pPr marL="0" indent="0">
-              <a:buNone/>
-              <a:defRPr/>
-            </a:pPr>
-            <a:endParaRPr lang="ru-RU" sz="2400"/>
-          </a:p>
-          <a:p>
-            <a:pPr marL="0" indent="0">
-              <a:buFont typeface="Wingdings 3"/>
-              <a:buNone/>
-              <a:defRPr/>
-            </a:pPr>
+              <a:t>Компилятор может делать это автоматически, но это не точно</a:t>
+            </a:r>
             <a:endParaRPr lang="en-US" sz="2400"/>
           </a:p>
         </p:txBody>
       </p:sp>
       <p:pic>
         <p:nvPicPr>
-          <p:cNvPr id="7" name="Рисунок 6"/>
-          <p:cNvPicPr>
-            <a:picLocks noChangeAspect="1"/>
-          </p:cNvPicPr>
-          <p:nvPr/>
-        </p:nvPicPr>
-        <p:blipFill>
-          <a:blip r:embed="rId2"/>
-          <a:stretch/>
-        </p:blipFill>
-        <p:spPr bwMode="auto">
-          <a:xfrm>
-            <a:off x="5829963" y="4394682"/>
-            <a:ext cx="2113054" cy="924460"/>
-          </a:xfrm>
-          <a:prstGeom prst="rect">
-            <a:avLst/>
-          </a:prstGeom>
-        </p:spPr>
-      </p:pic>
-      <p:pic>
-        <p:nvPicPr>
-          <p:cNvPr id="8" name="Рисунок 7"/>
+          <p:cNvPr id="10" name="Рисунок 9"/>
           <p:cNvPicPr>
             <a:picLocks noChangeAspect="1"/>
           </p:cNvPicPr>
@@ -14315,8 +15020,8 @@
         </p:blipFill>
         <p:spPr bwMode="auto">
           <a:xfrm>
-            <a:off x="8733151" y="4341173"/>
-            <a:ext cx="3206004" cy="1206560"/>
+            <a:off x="7003472" y="4927004"/>
+            <a:ext cx="4564263" cy="1317949"/>
           </a:xfrm>
           <a:prstGeom prst="rect">
             <a:avLst/>
@@ -14325,119 +15030,14 @@
       </p:pic>
       <p:sp>
         <p:nvSpPr>
-          <p:cNvPr id="9" name="TextBox 8"/>
-          <p:cNvSpPr txBox="1"/>
-          <p:nvPr/>
-        </p:nvSpPr>
-        <p:spPr bwMode="auto">
-          <a:xfrm>
-            <a:off x="8733151" y="5387115"/>
-            <a:ext cx="3206038" cy="365795"/>
-          </a:xfrm>
-          <a:prstGeom prst="rect">
-            <a:avLst/>
-          </a:prstGeom>
-          <a:solidFill>
-            <a:schemeClr val="bg1"/>
-          </a:solidFill>
-        </p:spPr>
-        <p:txBody>
-          <a:bodyPr wrap="square" rtlCol="0">
-            <a:spAutoFit/>
-          </a:bodyPr>
-          <a:lstStyle/>
-          <a:p>
-            <a:pPr>
-              <a:defRPr/>
-            </a:pPr>
-            <a:r>
-              <a:rPr lang="ru-RU"/>
-              <a:t>	На куче</a:t>
-            </a:r>
-            <a:endParaRPr lang="en-US"/>
-          </a:p>
-        </p:txBody>
-      </p:sp>
-      <p:sp>
-        <p:nvSpPr>
-          <p:cNvPr id="10" name="TextBox 9"/>
-          <p:cNvSpPr txBox="1"/>
-          <p:nvPr/>
-        </p:nvSpPr>
-        <p:spPr bwMode="auto">
-          <a:xfrm>
-            <a:off x="6228517" y="5387116"/>
-            <a:ext cx="1714500" cy="369332"/>
-          </a:xfrm>
-          <a:prstGeom prst="rect">
-            <a:avLst/>
-          </a:prstGeom>
-          <a:solidFill>
-            <a:schemeClr val="bg1"/>
-          </a:solidFill>
-        </p:spPr>
-        <p:txBody>
-          <a:bodyPr wrap="square" rtlCol="0">
-            <a:spAutoFit/>
-          </a:bodyPr>
-          <a:lstStyle/>
-          <a:p>
-            <a:pPr>
-              <a:defRPr/>
-            </a:pPr>
-            <a:r>
-              <a:rPr lang="ru-RU"/>
-              <a:t>На стеке</a:t>
-            </a:r>
-            <a:endParaRPr lang="en-US"/>
-          </a:p>
-        </p:txBody>
-      </p:sp>
-      <p:sp>
-        <p:nvSpPr>
           <p:cNvPr id="11" name="TextBox 10"/>
           <p:cNvSpPr txBox="1"/>
           <p:nvPr/>
         </p:nvSpPr>
         <p:spPr bwMode="auto">
-          <a:xfrm flipH="0" flipV="0">
-            <a:off x="5436315" y="5806294"/>
-            <a:ext cx="6502911" cy="640115"/>
-          </a:xfrm>
-          <a:prstGeom prst="rect">
-            <a:avLst/>
-          </a:prstGeom>
-          <a:solidFill>
-            <a:schemeClr val="bg1"/>
-          </a:solidFill>
-        </p:spPr>
-        <p:txBody>
-          <a:bodyPr wrap="square" rtlCol="0">
-            <a:spAutoFit/>
-          </a:bodyPr>
-          <a:lstStyle/>
-          <a:p>
-            <a:pPr>
-              <a:defRPr/>
-            </a:pPr>
-            <a:r>
-              <a:rPr lang="ru-RU"/>
-              <a:t>Весь объект, со всеми его членами размещается в той области памяти, где он был выделен</a:t>
-            </a:r>
-            <a:endParaRPr lang="en-US"/>
-          </a:p>
-        </p:txBody>
-      </p:sp>
-      <p:sp>
-        <p:nvSpPr>
-          <p:cNvPr id="207365444" name=""/>
-          <p:cNvSpPr txBox="1"/>
-          <p:nvPr/>
-        </p:nvSpPr>
-        <p:spPr bwMode="auto">
-          <a:xfrm flipH="0" flipV="0">
-            <a:off x="10110942" y="6351039"/>
-            <a:ext cx="1828211" cy="366119"/>
+          <a:xfrm>
+            <a:off x="5768128" y="5272019"/>
+            <a:ext cx="1051891" cy="369332"/>
           </a:xfrm>
           <a:prstGeom prst="rect">
             <a:avLst/>
@@ -14445,306 +15045,36 @@
           <a:noFill/>
         </p:spPr>
         <p:txBody>
-          <a:bodyPr vertOverflow="overflow" horzOverflow="overflow" vert="horz" wrap="none" lIns="91440" tIns="45720" rIns="91440" bIns="45720" numCol="1" spcCol="0" rtlCol="0" fromWordArt="0" anchor="t" anchorCtr="0" forceAA="0" upright="0" compatLnSpc="0">
+          <a:bodyPr wrap="none" rtlCol="0">
             <a:spAutoFit/>
           </a:bodyPr>
-          <a:p>
-            <a:pPr>
-              <a:defRPr/>
-            </a:pPr>
-            <a:r>
-              <a:rPr/>
-              <a:t>examples/1_cat</a:t>
-            </a:r>
-            <a:endParaRPr/>
-          </a:p>
-        </p:txBody>
-      </p:sp>
-    </p:spTree>
-  </p:cSld>
-  <p:clrMapOvr>
-    <a:masterClrMapping/>
-  </p:clrMapOvr>
-  <mc:AlternateContent xmlns:mc="http://schemas.openxmlformats.org/markup-compatibility/2006">
-    <mc:Choice xmlns:p14="http://schemas.microsoft.com/office/powerpoint/2010/main" Requires="p14">
-      <p:transition p14:dur="2000" advClick="1"/>
-    </mc:Choice>
-    <mc:Fallback>
-      <p:transition advClick="1"/>
-    </mc:Fallback>
-  </mc:AlternateContent>
-  <p:timing>
-    <p:tnLst>
-      <p:par>
-        <p:cTn id="1" dur="indefinite" restart="never" nodeType="tmRoot"/>
-      </p:par>
-    </p:tnLst>
-  </p:timing>
-</p:sld>
-</file>
-
-<file path=ppt/slides/slide28.xml><?xml version="1.0" encoding="utf-8"?>
-<p:sld xmlns:a="http://schemas.openxmlformats.org/drawingml/2006/main" xmlns:r="http://schemas.openxmlformats.org/officeDocument/2006/relationships" xmlns:p="http://schemas.openxmlformats.org/presentationml/2006/main" xmlns:m="http://schemas.openxmlformats.org/officeDocument/2006/math" xmlns:w="http://schemas.openxmlformats.org/wordprocessingml/2006/main" showMasterPhAnim="0" show="1">
-  <p:cSld name="">
-    <p:spTree>
-      <p:nvGrpSpPr>
-        <p:cNvPr id="1" name=""/>
-        <p:cNvGrpSpPr/>
-        <p:nvPr/>
-      </p:nvGrpSpPr>
-      <p:grpSpPr bwMode="auto">
-        <a:xfrm>
-          <a:off x="0" y="0"/>
-          <a:ext cx="0" cy="0"/>
-          <a:chOff x="0" y="0"/>
-          <a:chExt cx="0" cy="0"/>
-        </a:xfrm>
-      </p:grpSpPr>
-      <p:sp>
-        <p:nvSpPr>
-          <p:cNvPr id="4" name="Заголовок 1"/>
-          <p:cNvSpPr>
-            <a:spLocks noGrp="1"/>
-          </p:cNvSpPr>
-          <p:nvPr>
-            <p:ph type="title"/>
-          </p:nvPr>
-        </p:nvSpPr>
-        <p:spPr bwMode="auto">
-          <a:xfrm>
-            <a:off x="283779" y="210557"/>
-            <a:ext cx="11655376" cy="1113746"/>
-          </a:xfrm>
-          <a:prstGeom prst="rect">
-            <a:avLst/>
-          </a:prstGeom>
-          <a:solidFill>
-            <a:schemeClr val="bg1"/>
-          </a:solidFill>
-          <a:ln>
-            <a:solidFill>
-              <a:schemeClr val="tx1"/>
-            </a:solidFill>
-          </a:ln>
-        </p:spPr>
-        <p:txBody>
-          <a:bodyPr anchor="ctr" anchorCtr="0">
-            <a:normAutofit/>
-          </a:bodyPr>
           <a:lstStyle/>
           <a:p>
-            <a:pPr algn="ctr">
-              <a:defRPr/>
-            </a:pPr>
-            <a:r>
-              <a:rPr lang="en-US" sz="2800" b="1"/>
-              <a:t>2. </a:t>
-            </a:r>
-            <a:r>
-              <a:rPr lang="ru-RU" sz="2800" b="1"/>
-              <a:t>ООП в С++. </a:t>
-            </a:r>
-            <a:r>
-              <a:rPr lang="ru-RU" sz="2800" b="1"/>
-              <a:t>Деинициализация</a:t>
-            </a:r>
-            <a:r>
-              <a:rPr lang="ru-RU" sz="2800" b="1"/>
-              <a:t> объекта</a:t>
-            </a:r>
-            <a:endParaRPr lang="en-US" sz="2800" b="1"/>
-          </a:p>
-        </p:txBody>
-      </p:sp>
-      <p:sp>
-        <p:nvSpPr>
-          <p:cNvPr id="5" name="Объект 2"/>
-          <p:cNvSpPr>
-            <a:spLocks noGrp="1"/>
-          </p:cNvSpPr>
-          <p:nvPr>
-            <p:ph idx="1"/>
-          </p:nvPr>
-        </p:nvSpPr>
-        <p:spPr bwMode="auto">
-          <a:xfrm flipH="0" flipV="0">
-            <a:off x="4544567" y="1417716"/>
-            <a:ext cx="7394586" cy="4830683"/>
-          </a:xfrm>
-          <a:prstGeom prst="rect">
-            <a:avLst/>
-          </a:prstGeom>
-          <a:solidFill>
-            <a:schemeClr val="bg1"/>
-          </a:solidFill>
-        </p:spPr>
-        <p:txBody>
-          <a:bodyPr vertOverflow="overflow" horzOverflow="overflow" vert="horz" wrap="square" lIns="91440" tIns="45720" rIns="91440" bIns="45720" numCol="1" spcCol="0" rtlCol="0" fromWordArt="0" anchor="t" anchorCtr="0" forceAA="0" upright="0" compatLnSpc="0">
-            <a:normAutofit fontScale="80000" lnSpcReduction="4000"/>
-          </a:bodyPr>
-          <a:lstStyle/>
-          <a:p>
-            <a:pPr>
-              <a:buClr>
-                <a:schemeClr val="accent1"/>
-              </a:buClr>
-              <a:buSzPct val="80000"/>
-              <a:buFont typeface="Wingdings"/>
-              <a:buChar char="Ø"/>
-              <a:defRPr/>
-            </a:pPr>
-            <a:r>
-              <a:rPr lang="ru-RU" sz="2600"/>
-              <a:t>Деструктор — это функция, которая вызывается при разрушении </a:t>
-            </a:r>
-            <a:r>
-              <a:rPr lang="ru-RU" sz="2600"/>
-              <a:t>объекта</a:t>
-            </a:r>
-            <a:endParaRPr lang="ru-RU" sz="2600"/>
-          </a:p>
-          <a:p>
-            <a:pPr>
-              <a:buClr>
-                <a:schemeClr val="accent1"/>
-              </a:buClr>
-              <a:buSzPct val="80000"/>
-              <a:buFont typeface="Wingdings"/>
-              <a:buChar char="Ø"/>
-              <a:defRPr/>
-            </a:pPr>
-            <a:r>
-              <a:rPr lang="ru-RU" sz="2600"/>
-              <a:t>Деструктор используется только для </a:t>
-            </a:r>
-            <a:r>
-              <a:rPr lang="ru-RU" sz="2600"/>
-              <a:t>деинициализации</a:t>
-            </a:r>
-            <a:r>
-              <a:rPr lang="ru-RU" sz="2600"/>
-              <a:t> объекта – во </a:t>
-            </a:r>
-            <a:r>
-              <a:rPr lang="ru-RU" sz="2600"/>
-              <a:t>многих случаях при </a:t>
-            </a:r>
-            <a:r>
-              <a:rPr lang="ru-RU" sz="2600"/>
-              <a:t>завершении работы объекту </a:t>
-            </a:r>
-            <a:r>
-              <a:rPr lang="ru-RU" sz="2600"/>
-              <a:t>необходимо выполнить </a:t>
-            </a:r>
-            <a:r>
-              <a:rPr lang="ru-RU" sz="2600"/>
-              <a:t>некоторую </a:t>
-            </a:r>
-            <a:r>
-              <a:rPr lang="ru-RU" sz="2600"/>
-              <a:t>последовательность </a:t>
-            </a:r>
-            <a:r>
-              <a:rPr lang="ru-RU" sz="2600"/>
-              <a:t>действий. Например, освободить память или другие ресурсы, которые объект использовал</a:t>
-            </a:r>
-            <a:endParaRPr lang="ru-RU" sz="2600"/>
-          </a:p>
-          <a:p>
-            <a:pPr>
-              <a:buClr>
-                <a:schemeClr val="accent1"/>
-              </a:buClr>
-              <a:buSzPct val="80000"/>
-              <a:buFont typeface="Wingdings"/>
-              <a:buChar char="Ø"/>
-              <a:defRPr/>
-            </a:pPr>
-            <a:r>
-              <a:rPr lang="ru-RU" sz="2600"/>
-              <a:t>Деструктор имеет имя класса, предварённое «</a:t>
-            </a:r>
-            <a:r>
-              <a:rPr lang="en-US" sz="2600"/>
-              <a:t>~</a:t>
-            </a:r>
-            <a:r>
-              <a:rPr lang="ru-RU" sz="2600"/>
-              <a:t>»</a:t>
-            </a:r>
-            <a:r>
-              <a:rPr lang="en-US" sz="2600"/>
-              <a:t>: ~Cat(), </a:t>
-            </a:r>
-            <a:r>
-              <a:rPr lang="ru-RU" sz="2600"/>
-              <a:t>не принимает аргументов и не возвращает значения (даже </a:t>
-            </a:r>
-            <a:r>
-              <a:rPr lang="en-US" sz="2600"/>
-              <a:t>void </a:t>
-            </a:r>
-            <a:r>
-              <a:rPr lang="ru-RU" sz="2600"/>
-              <a:t>не возвращает)</a:t>
-            </a:r>
-            <a:endParaRPr sz="2000"/>
-          </a:p>
-          <a:p>
-            <a:pPr>
-              <a:buClr>
-                <a:schemeClr val="accent1"/>
-              </a:buClr>
-              <a:buSzPct val="80000"/>
-              <a:buFont typeface="Wingdings"/>
-              <a:buChar char="Ø"/>
-              <a:defRPr/>
-            </a:pPr>
-            <a:r>
-              <a:rPr lang="ru-RU" sz="2600"/>
-              <a:t>Если никаких действий при удалении объекта не требуется, деструктор можно не </a:t>
-            </a:r>
-            <a:r>
-              <a:rPr lang="ru-RU" sz="2600"/>
-              <a:t>определять – компилятор сгенерирует его сам</a:t>
-            </a:r>
-            <a:endParaRPr lang="en-US" sz="2600"/>
-          </a:p>
-        </p:txBody>
-      </p:sp>
-      <p:pic>
-        <p:nvPicPr>
-          <p:cNvPr id="2" name="Рисунок 1"/>
-          <p:cNvPicPr>
-            <a:picLocks noChangeAspect="1"/>
-          </p:cNvPicPr>
-          <p:nvPr/>
-        </p:nvPicPr>
-        <p:blipFill>
-          <a:blip r:embed="rId2"/>
-          <a:stretch/>
-        </p:blipFill>
-        <p:spPr bwMode="auto">
-          <a:xfrm>
-            <a:off x="370220" y="2456653"/>
-            <a:ext cx="3944985" cy="1228379"/>
-          </a:xfrm>
-          <a:prstGeom prst="rect">
-            <a:avLst/>
-          </a:prstGeom>
-        </p:spPr>
-      </p:pic>
-      <p:sp>
-        <p:nvSpPr>
-          <p:cNvPr id="84046984" name=""/>
+            <a:pPr>
+              <a:defRPr/>
+            </a:pPr>
+            <a:r>
+              <a:rPr lang="en-US"/>
+              <a:t>cat.cpp</a:t>
+            </a:r>
+            <a:r>
+              <a:rPr lang="ru-RU"/>
+              <a:t>:</a:t>
+            </a:r>
+            <a:endParaRPr lang="en-US"/>
+          </a:p>
+        </p:txBody>
+      </p:sp>
+      <p:sp>
+        <p:nvSpPr>
+          <p:cNvPr id="1811917201" name=""/>
           <p:cNvSpPr txBox="1"/>
           <p:nvPr/>
         </p:nvSpPr>
         <p:spPr bwMode="auto">
           <a:xfrm flipH="0" flipV="0">
-            <a:off x="8301132" y="6117156"/>
-            <a:ext cx="3638022" cy="640440"/>
+            <a:off x="10110943" y="6351039"/>
+            <a:ext cx="1828211" cy="366119"/>
           </a:xfrm>
           <a:prstGeom prst="rect">
             <a:avLst/>
@@ -14765,338 +15095,8 @@
             </a:r>
             <a:endParaRPr/>
           </a:p>
-          <a:p>
-            <a:pPr>
-              <a:defRPr/>
-            </a:pPr>
-            <a:r>
-              <a:rPr/>
-              <a:t>examples/2_default_construction</a:t>
-            </a:r>
-            <a:endParaRPr/>
-          </a:p>
-        </p:txBody>
-      </p:sp>
-    </p:spTree>
-  </p:cSld>
-  <p:clrMapOvr>
-    <a:masterClrMapping/>
-  </p:clrMapOvr>
-  <mc:AlternateContent xmlns:mc="http://schemas.openxmlformats.org/markup-compatibility/2006">
-    <mc:Choice xmlns:p14="http://schemas.microsoft.com/office/powerpoint/2010/main" Requires="p14">
-      <p:transition p14:dur="2000" advClick="1"/>
-    </mc:Choice>
-    <mc:Fallback>
-      <p:transition advClick="1"/>
-    </mc:Fallback>
-  </mc:AlternateContent>
-  <p:timing>
-    <p:tnLst>
-      <p:par>
-        <p:cTn id="1" dur="indefinite" restart="never" nodeType="tmRoot"/>
-      </p:par>
-    </p:tnLst>
-  </p:timing>
-</p:sld>
-</file>
-
-<file path=ppt/slides/slide29.xml><?xml version="1.0" encoding="utf-8"?>
-<p:sld xmlns:a="http://schemas.openxmlformats.org/drawingml/2006/main" xmlns:r="http://schemas.openxmlformats.org/officeDocument/2006/relationships" xmlns:p="http://schemas.openxmlformats.org/presentationml/2006/main" xmlns:m="http://schemas.openxmlformats.org/officeDocument/2006/math" xmlns:w="http://schemas.openxmlformats.org/wordprocessingml/2006/main" showMasterPhAnim="0" show="1">
-  <p:cSld name="">
-    <p:spTree>
-      <p:nvGrpSpPr>
-        <p:cNvPr id="1" name=""/>
-        <p:cNvGrpSpPr/>
-        <p:nvPr/>
-      </p:nvGrpSpPr>
-      <p:grpSpPr bwMode="auto">
-        <a:xfrm>
-          <a:off x="0" y="0"/>
-          <a:ext cx="0" cy="0"/>
-          <a:chOff x="0" y="0"/>
-          <a:chExt cx="0" cy="0"/>
-        </a:xfrm>
-      </p:grpSpPr>
-      <p:sp>
-        <p:nvSpPr>
-          <p:cNvPr id="4" name="Заголовок 1"/>
-          <p:cNvSpPr>
-            <a:spLocks noGrp="1"/>
-          </p:cNvSpPr>
-          <p:nvPr>
-            <p:ph type="title"/>
-          </p:nvPr>
-        </p:nvSpPr>
-        <p:spPr bwMode="auto">
-          <a:xfrm>
-            <a:off x="283779" y="210557"/>
-            <a:ext cx="11655376" cy="822715"/>
-          </a:xfrm>
-          <a:prstGeom prst="rect">
-            <a:avLst/>
-          </a:prstGeom>
-          <a:solidFill>
-            <a:schemeClr val="bg1"/>
-          </a:solidFill>
-          <a:ln>
-            <a:solidFill>
-              <a:schemeClr val="tx1"/>
-            </a:solidFill>
-          </a:ln>
-        </p:spPr>
-        <p:txBody>
-          <a:bodyPr anchor="ctr" anchorCtr="0">
-            <a:normAutofit/>
-          </a:bodyPr>
-          <a:lstStyle/>
-          <a:p>
-            <a:pPr algn="ctr">
-              <a:defRPr/>
-            </a:pPr>
-            <a:r>
-              <a:rPr lang="en-US" sz="2800" b="1"/>
-              <a:t>2. </a:t>
-            </a:r>
-            <a:r>
-              <a:rPr lang="ru-RU" sz="2800" b="1"/>
-              <a:t>ООП в С++. Характеристики объекта</a:t>
-            </a:r>
-            <a:endParaRPr lang="en-US" sz="2800" b="1"/>
-          </a:p>
-        </p:txBody>
-      </p:sp>
-      <p:sp>
-        <p:nvSpPr>
-          <p:cNvPr id="5" name="Объект 2"/>
-          <p:cNvSpPr>
-            <a:spLocks noGrp="1"/>
-          </p:cNvSpPr>
-          <p:nvPr>
-            <p:ph idx="1"/>
-          </p:nvPr>
-        </p:nvSpPr>
-        <p:spPr bwMode="auto">
-          <a:xfrm>
-            <a:off x="283778" y="1234441"/>
-            <a:ext cx="11655377" cy="5405350"/>
-          </a:xfrm>
-          <a:prstGeom prst="rect">
-            <a:avLst/>
-          </a:prstGeom>
-          <a:solidFill>
-            <a:schemeClr val="bg1"/>
-          </a:solidFill>
-        </p:spPr>
-        <p:txBody>
-          <a:bodyPr>
-            <a:normAutofit/>
-          </a:bodyPr>
-          <a:lstStyle/>
-          <a:p>
-            <a:pPr>
-              <a:buClr>
-                <a:schemeClr val="accent1"/>
-              </a:buClr>
-              <a:buSzPct val="80000"/>
-              <a:buFont typeface="Wingdings"/>
-              <a:buChar char="Ø"/>
-              <a:defRPr/>
-            </a:pPr>
-            <a:r>
-              <a:rPr lang="ru-RU" sz="2000"/>
-              <a:t>Состояние объекта </a:t>
-            </a:r>
-            <a:r>
-              <a:rPr lang="ru-RU" sz="2000"/>
-              <a:t>характеризуется перечнем </a:t>
-            </a:r>
-            <a:r>
-              <a:rPr lang="ru-RU" sz="2000"/>
-              <a:t>всех </a:t>
-            </a:r>
-            <a:r>
-              <a:rPr lang="ru-RU" sz="2000"/>
-              <a:t>свойств данного объекта и текущими </a:t>
-            </a:r>
-            <a:r>
-              <a:rPr lang="ru-RU" sz="2000"/>
-              <a:t>значениями </a:t>
-            </a:r>
-            <a:r>
-              <a:rPr lang="ru-RU" sz="2000"/>
-              <a:t>каждого из этих </a:t>
-            </a:r>
-            <a:r>
-              <a:rPr lang="ru-RU" sz="2000"/>
-              <a:t>свойств, т.е. отражает его «историю»</a:t>
-            </a:r>
-            <a:endParaRPr/>
-          </a:p>
-          <a:p>
-            <a:pPr>
-              <a:buClr>
-                <a:schemeClr val="accent1"/>
-              </a:buClr>
-              <a:buSzPct val="80000"/>
-              <a:buFont typeface="Wingdings"/>
-              <a:buChar char="Ø"/>
-              <a:defRPr/>
-            </a:pPr>
-            <a:r>
-              <a:rPr lang="ru-RU" sz="2000"/>
-              <a:t>Поведение </a:t>
-            </a:r>
-            <a:r>
-              <a:rPr lang="ru-RU" sz="2000"/>
-              <a:t>объекта - это его наблюдаемая и проверяемая извне </a:t>
-            </a:r>
-            <a:r>
-              <a:rPr lang="ru-RU" sz="2000"/>
-              <a:t>деятельность. </a:t>
-            </a:r>
-            <a:r>
-              <a:rPr lang="ru-RU" sz="2000"/>
-              <a:t>Объекты не существуют изолированно, а подвергаются воздействию или сами воздействуют на другие </a:t>
-            </a:r>
-            <a:r>
-              <a:rPr lang="ru-RU" sz="2000"/>
-              <a:t>объекты. То, что объекты могут делать и то, что можно делать с ними, определяется реализацией его открытых функций-членов (публичных методов) и его состоянием</a:t>
-            </a:r>
-            <a:endParaRPr/>
-          </a:p>
-          <a:p>
-            <a:pPr>
-              <a:buClr>
-                <a:schemeClr val="accent1"/>
-              </a:buClr>
-              <a:buSzPct val="80000"/>
-              <a:buFont typeface="Wingdings"/>
-              <a:buChar char="Ø"/>
-              <a:defRPr/>
-            </a:pPr>
-            <a:r>
-              <a:rPr lang="ru-RU" sz="2000"/>
-              <a:t>Идентичность (уникальность) – это такое свойство объекта, которое отличает его от всех других </a:t>
-            </a:r>
-            <a:r>
-              <a:rPr lang="ru-RU" sz="2000"/>
-              <a:t>объектов. Равенство, идентичность и имя – разные вещи. Идентичны объекты, имеющие один и тот же адрес в памяти</a:t>
-            </a:r>
-            <a:endParaRPr lang="en-US" sz="2400"/>
-          </a:p>
-        </p:txBody>
-      </p:sp>
-      <p:pic>
-        <p:nvPicPr>
-          <p:cNvPr id="10" name="Рисунок 9"/>
-          <p:cNvPicPr>
-            <a:picLocks noChangeAspect="1"/>
-          </p:cNvPicPr>
-          <p:nvPr/>
-        </p:nvPicPr>
-        <p:blipFill>
-          <a:blip r:embed="rId2"/>
-          <a:srcRect l="0" t="0" r="0" b="29483"/>
-          <a:stretch/>
-        </p:blipFill>
-        <p:spPr bwMode="auto">
-          <a:xfrm>
-            <a:off x="658340" y="4762051"/>
-            <a:ext cx="5570055" cy="672334"/>
-          </a:xfrm>
-          <a:prstGeom prst="rect">
-            <a:avLst/>
-          </a:prstGeom>
-        </p:spPr>
-      </p:pic>
-      <p:sp>
-        <p:nvSpPr>
-          <p:cNvPr id="11" name="TextBox 10"/>
-          <p:cNvSpPr txBox="1"/>
-          <p:nvPr/>
-        </p:nvSpPr>
-        <p:spPr bwMode="auto">
-          <a:xfrm>
-            <a:off x="541411" y="5506463"/>
-            <a:ext cx="5100853" cy="646331"/>
-          </a:xfrm>
-          <a:prstGeom prst="rect">
-            <a:avLst/>
-          </a:prstGeom>
-          <a:noFill/>
-        </p:spPr>
-        <p:txBody>
-          <a:bodyPr wrap="square" rtlCol="0">
-            <a:spAutoFit/>
-          </a:bodyPr>
-          <a:lstStyle/>
-          <a:p>
-            <a:pPr algn="ctr">
-              <a:defRPr/>
-            </a:pPr>
-            <a:r>
-              <a:rPr lang="ru-RU"/>
-              <a:t>Первая кошка такая же, как вторая кошка, но это две разные кошки</a:t>
-            </a:r>
-            <a:endParaRPr lang="en-US"/>
-          </a:p>
-        </p:txBody>
-      </p:sp>
-      <p:sp>
-        <p:nvSpPr>
-          <p:cNvPr id="13" name="TextBox 12"/>
-          <p:cNvSpPr txBox="1"/>
-          <p:nvPr/>
-        </p:nvSpPr>
-        <p:spPr bwMode="auto">
-          <a:xfrm>
-            <a:off x="6145268" y="5484962"/>
-            <a:ext cx="5412052" cy="646331"/>
-          </a:xfrm>
-          <a:prstGeom prst="rect">
-            <a:avLst/>
-          </a:prstGeom>
-          <a:noFill/>
-        </p:spPr>
-        <p:txBody>
-          <a:bodyPr wrap="square" rtlCol="0">
-            <a:spAutoFit/>
-          </a:bodyPr>
-          <a:lstStyle/>
-          <a:p>
-            <a:pPr algn="ctr">
-              <a:defRPr/>
-            </a:pPr>
-            <a:r>
-              <a:rPr lang="ru-RU"/>
-              <a:t>Первая кошка такая же, как вторая кошка, потому что это одна и та же кошка</a:t>
-            </a:r>
-            <a:endParaRPr lang="en-US"/>
-          </a:p>
-        </p:txBody>
-      </p:sp>
-      <p:pic>
-        <p:nvPicPr>
-          <p:cNvPr id="14" name="Рисунок 13"/>
-          <p:cNvPicPr>
-            <a:picLocks noChangeAspect="1"/>
-          </p:cNvPicPr>
-          <p:nvPr/>
-        </p:nvPicPr>
-        <p:blipFill>
-          <a:blip r:embed="rId3"/>
-          <a:stretch/>
-        </p:blipFill>
-        <p:spPr bwMode="auto">
-          <a:xfrm>
-            <a:off x="6247695" y="4787434"/>
-            <a:ext cx="5227365" cy="646951"/>
-          </a:xfrm>
-          <a:prstGeom prst="rect">
-            <a:avLst/>
-          </a:prstGeom>
-        </p:spPr>
-      </p:pic>
+        </p:txBody>
+      </p:sp>
     </p:spTree>
   </p:cSld>
   <p:clrMapOvr>

</xml_diff>

<commit_message>
more slides for pt1/lecture1 presentation
</commit_message>
<xml_diff>
--- a/pt1/lectures/lecture1/lecture1.pptx
+++ b/pt1/lectures/lecture1/lecture1.pptx
@@ -4,38 +4,43 @@
   <p:sldMasterIdLst>
     <p:sldMasterId id="2147483648" r:id="rId1"/>
   </p:sldMasterIdLst>
+  <p:notesMasterIdLst>
+    <p:notesMasterId r:id="rId37"/>
+  </p:notesMasterIdLst>
   <p:sldIdLst>
-    <p:sldId id="256" r:id="rId3"/>
-    <p:sldId id="257" r:id="rId4"/>
-    <p:sldId id="258" r:id="rId5"/>
-    <p:sldId id="259" r:id="rId6"/>
-    <p:sldId id="260" r:id="rId7"/>
-    <p:sldId id="261" r:id="rId8"/>
-    <p:sldId id="262" r:id="rId9"/>
-    <p:sldId id="263" r:id="rId10"/>
-    <p:sldId id="264" r:id="rId11"/>
-    <p:sldId id="265" r:id="rId12"/>
-    <p:sldId id="266" r:id="rId13"/>
-    <p:sldId id="267" r:id="rId14"/>
-    <p:sldId id="268" r:id="rId15"/>
-    <p:sldId id="269" r:id="rId16"/>
-    <p:sldId id="270" r:id="rId17"/>
-    <p:sldId id="271" r:id="rId18"/>
-    <p:sldId id="272" r:id="rId19"/>
-    <p:sldId id="273" r:id="rId20"/>
-    <p:sldId id="274" r:id="rId21"/>
-    <p:sldId id="275" r:id="rId22"/>
-    <p:sldId id="276" r:id="rId23"/>
-    <p:sldId id="277" r:id="rId24"/>
-    <p:sldId id="278" r:id="rId25"/>
-    <p:sldId id="279" r:id="rId26"/>
-    <p:sldId id="280" r:id="rId27"/>
-    <p:sldId id="281" r:id="rId28"/>
-    <p:sldId id="282" r:id="rId29"/>
-    <p:sldId id="283" r:id="rId30"/>
-    <p:sldId id="284" r:id="rId31"/>
-    <p:sldId id="285" r:id="rId32"/>
-    <p:sldId id="286" r:id="rId33"/>
+    <p:sldId id="256" r:id="rId4"/>
+    <p:sldId id="257" r:id="rId5"/>
+    <p:sldId id="258" r:id="rId6"/>
+    <p:sldId id="259" r:id="rId7"/>
+    <p:sldId id="260" r:id="rId8"/>
+    <p:sldId id="261" r:id="rId9"/>
+    <p:sldId id="262" r:id="rId10"/>
+    <p:sldId id="263" r:id="rId11"/>
+    <p:sldId id="264" r:id="rId12"/>
+    <p:sldId id="265" r:id="rId13"/>
+    <p:sldId id="266" r:id="rId14"/>
+    <p:sldId id="267" r:id="rId15"/>
+    <p:sldId id="268" r:id="rId16"/>
+    <p:sldId id="269" r:id="rId17"/>
+    <p:sldId id="270" r:id="rId18"/>
+    <p:sldId id="271" r:id="rId19"/>
+    <p:sldId id="272" r:id="rId20"/>
+    <p:sldId id="273" r:id="rId21"/>
+    <p:sldId id="274" r:id="rId22"/>
+    <p:sldId id="275" r:id="rId23"/>
+    <p:sldId id="276" r:id="rId24"/>
+    <p:sldId id="277" r:id="rId25"/>
+    <p:sldId id="278" r:id="rId26"/>
+    <p:sldId id="279" r:id="rId27"/>
+    <p:sldId id="280" r:id="rId28"/>
+    <p:sldId id="281" r:id="rId29"/>
+    <p:sldId id="282" r:id="rId30"/>
+    <p:sldId id="283" r:id="rId31"/>
+    <p:sldId id="284" r:id="rId32"/>
+    <p:sldId id="285" r:id="rId33"/>
+    <p:sldId id="286" r:id="rId34"/>
+    <p:sldId id="287" r:id="rId35"/>
+    <p:sldId id="288" r:id="rId36"/>
   </p:sldIdLst>
   <p:sldSz cx="12192000" cy="6858000"/>
   <p:notesSz cx="12192000" cy="6858000"/>
@@ -135,6 +140,3032 @@
     </a:lvl9pPr>
   </p:defaultTextStyle>
 </p:presentation>
+</file>
+
+<file path=ppt/notesMasters/notesMaster1.xml><?xml version="1.0" encoding="utf-8"?>
+<p:notesMaster xmlns:a="http://schemas.openxmlformats.org/drawingml/2006/main" xmlns:r="http://schemas.openxmlformats.org/officeDocument/2006/relationships" xmlns:p="http://schemas.openxmlformats.org/presentationml/2006/main">
+  <p:cSld name="">
+    <p:bg>
+      <p:bgRef idx="1001">
+        <a:schemeClr val="bg1"/>
+      </p:bgRef>
+    </p:bg>
+    <p:spTree>
+      <p:nvGrpSpPr>
+        <p:cNvPr id="1" name=""/>
+        <p:cNvGrpSpPr/>
+        <p:nvPr/>
+      </p:nvGrpSpPr>
+      <p:grpSpPr bwMode="auto">
+        <a:xfrm>
+          <a:off x="0" y="0"/>
+          <a:ext cx="0" cy="0"/>
+          <a:chOff x="0" y="0"/>
+          <a:chExt cx="0" cy="0"/>
+        </a:xfrm>
+      </p:grpSpPr>
+      <p:sp>
+        <p:nvSpPr>
+          <p:cNvPr id="2" name="Header Placeholder 1"/>
+          <p:cNvSpPr>
+            <a:spLocks noGrp="1"/>
+          </p:cNvSpPr>
+          <p:nvPr>
+            <p:ph type="hdr" sz="quarter"/>
+          </p:nvPr>
+        </p:nvSpPr>
+        <p:spPr bwMode="auto">
+          <a:xfrm>
+            <a:off x="0" y="0"/>
+            <a:ext cx="2971800" cy="458788"/>
+          </a:xfrm>
+          <a:prstGeom prst="rect">
+            <a:avLst/>
+          </a:prstGeom>
+        </p:spPr>
+        <p:txBody>
+          <a:bodyPr vert="horz" lIns="91440" tIns="45720" rIns="91440" bIns="45720" rtlCol="0" anchor="ctr"/>
+          <a:lstStyle>
+            <a:lvl1pPr algn="l">
+              <a:defRPr sz="1200"/>
+            </a:lvl1pPr>
+          </a:lstStyle>
+          <a:p>
+            <a:pPr>
+              <a:defRPr/>
+            </a:pPr>
+            <a:endParaRPr/>
+          </a:p>
+        </p:txBody>
+      </p:sp>
+      <p:sp>
+        <p:nvSpPr>
+          <p:cNvPr id="3" name="Date Placeholder 2"/>
+          <p:cNvSpPr>
+            <a:spLocks noGrp="1"/>
+          </p:cNvSpPr>
+          <p:nvPr>
+            <p:ph type="dt" idx="2"/>
+          </p:nvPr>
+        </p:nvSpPr>
+        <p:spPr bwMode="auto">
+          <a:xfrm>
+            <a:off x="3884613" y="0"/>
+            <a:ext cx="2971800" cy="458788"/>
+          </a:xfrm>
+          <a:prstGeom prst="rect">
+            <a:avLst/>
+          </a:prstGeom>
+        </p:spPr>
+        <p:txBody>
+          <a:bodyPr vert="horz" lIns="91440" tIns="45720" rIns="91440" bIns="45720" rtlCol="0" anchor="ctr"/>
+          <a:lstStyle>
+            <a:lvl1pPr algn="r">
+              <a:defRPr sz="1200"/>
+            </a:lvl1pPr>
+          </a:lstStyle>
+          <a:p>
+            <a:pPr>
+              <a:defRPr/>
+            </a:pPr>
+            <a:endParaRPr/>
+          </a:p>
+        </p:txBody>
+      </p:sp>
+      <p:sp>
+        <p:nvSpPr>
+          <p:cNvPr id="3" name="Date Placeholder 2"/>
+          <p:cNvSpPr>
+            <a:spLocks noGrp="1"/>
+          </p:cNvSpPr>
+          <p:nvPr>
+            <p:ph type="dt" idx="3"/>
+          </p:nvPr>
+        </p:nvSpPr>
+        <p:spPr bwMode="auto">
+          <a:xfrm>
+            <a:off x="3884613" y="0"/>
+            <a:ext cx="2971800" cy="458788"/>
+          </a:xfrm>
+          <a:prstGeom prst="rect">
+            <a:avLst/>
+          </a:prstGeom>
+        </p:spPr>
+        <p:txBody>
+          <a:bodyPr vert="horz" lIns="91440" tIns="45720" rIns="91440" bIns="45720" rtlCol="0" anchor="ctr"/>
+          <a:lstStyle>
+            <a:lvl1pPr algn="r">
+              <a:defRPr sz="1200"/>
+            </a:lvl1pPr>
+          </a:lstStyle>
+          <a:p>
+            <a:pPr>
+              <a:defRPr/>
+            </a:pPr>
+            <a:endParaRPr/>
+          </a:p>
+        </p:txBody>
+      </p:sp>
+      <p:sp>
+        <p:nvSpPr>
+          <p:cNvPr id="5" name="Notes Placeholder 4"/>
+          <p:cNvSpPr>
+            <a:spLocks noGrp="1"/>
+          </p:cNvSpPr>
+          <p:nvPr>
+            <p:ph type="body" sz="quarter" idx="1"/>
+          </p:nvPr>
+        </p:nvSpPr>
+        <p:spPr bwMode="auto">
+          <a:xfrm>
+            <a:off x="685800" y="4400550"/>
+            <a:ext cx="5486400" cy="3600450"/>
+          </a:xfrm>
+          <a:prstGeom prst="rect">
+            <a:avLst/>
+          </a:prstGeom>
+        </p:spPr>
+        <p:txBody>
+          <a:bodyPr vert="horz" lIns="91440" tIns="45720" rIns="91440" bIns="45720" rtlCol="0" anchor="ctr"/>
+          <a:lstStyle/>
+          <a:p>
+            <a:pPr>
+              <a:defRPr/>
+            </a:pPr>
+            <a:endParaRPr/>
+          </a:p>
+        </p:txBody>
+      </p:sp>
+      <p:sp>
+        <p:nvSpPr>
+          <p:cNvPr id="6" name="Footer Placeholder 5"/>
+          <p:cNvSpPr>
+            <a:spLocks noGrp="1"/>
+          </p:cNvSpPr>
+          <p:nvPr>
+            <p:ph type="ftr" sz="quarter" idx="4"/>
+          </p:nvPr>
+        </p:nvSpPr>
+        <p:spPr bwMode="auto">
+          <a:xfrm>
+            <a:off x="0" y="8685213"/>
+            <a:ext cx="2971800" cy="458787"/>
+          </a:xfrm>
+          <a:prstGeom prst="rect">
+            <a:avLst/>
+          </a:prstGeom>
+        </p:spPr>
+        <p:txBody>
+          <a:bodyPr vert="horz" lIns="91440" tIns="45720" rIns="91440" bIns="45720" rtlCol="0" anchor="b"/>
+          <a:lstStyle>
+            <a:lvl1pPr algn="l">
+              <a:defRPr sz="1200"/>
+            </a:lvl1pPr>
+          </a:lstStyle>
+          <a:p>
+            <a:pPr>
+              <a:defRPr/>
+            </a:pPr>
+            <a:endParaRPr/>
+          </a:p>
+        </p:txBody>
+      </p:sp>
+      <p:sp>
+        <p:nvSpPr>
+          <p:cNvPr id="7" name="Slide Number Placeholder 6"/>
+          <p:cNvSpPr>
+            <a:spLocks noGrp="1"/>
+          </p:cNvSpPr>
+          <p:nvPr>
+            <p:ph type="sldNum" sz="quarter" idx="10"/>
+          </p:nvPr>
+        </p:nvSpPr>
+        <p:spPr bwMode="auto">
+          <a:xfrm>
+            <a:off x="3884613" y="8685213"/>
+            <a:ext cx="2971800" cy="458787"/>
+          </a:xfrm>
+          <a:prstGeom prst="rect">
+            <a:avLst/>
+          </a:prstGeom>
+        </p:spPr>
+        <p:txBody>
+          <a:bodyPr vert="horz" lIns="91440" tIns="45720" rIns="91440" bIns="45720" rtlCol="0" anchor="b"/>
+          <a:lstStyle>
+            <a:lvl1pPr algn="r">
+              <a:defRPr sz="1200"/>
+            </a:lvl1pPr>
+          </a:lstStyle>
+          <a:p>
+            <a:pPr>
+              <a:defRPr/>
+            </a:pPr>
+            <a:endParaRPr/>
+          </a:p>
+        </p:txBody>
+      </p:sp>
+    </p:spTree>
+  </p:cSld>
+  <p:clrMap bg1="lt1" tx1="dk1" bg2="lt2" tx2="dk2" accent1="accent1" accent2="accent2" accent3="accent3" accent4="accent4" accent5="accent5" accent6="accent6" hlink="hlink" folHlink="folHlink"/>
+  <p:notesStyle>
+    <a:lvl1pPr marL="0" algn="l" defTabSz="914400">
+      <a:defRPr sz="1200">
+        <a:solidFill>
+          <a:schemeClr val="tx1"/>
+        </a:solidFill>
+        <a:latin typeface="+mn-lt"/>
+        <a:ea typeface="+mn-ea"/>
+        <a:cs typeface="+mn-cs"/>
+      </a:defRPr>
+    </a:lvl1pPr>
+    <a:lvl2pPr marL="457200" algn="l" defTabSz="914400">
+      <a:defRPr sz="1200">
+        <a:solidFill>
+          <a:schemeClr val="tx1"/>
+        </a:solidFill>
+        <a:latin typeface="+mn-lt"/>
+        <a:ea typeface="+mn-ea"/>
+        <a:cs typeface="+mn-cs"/>
+      </a:defRPr>
+    </a:lvl2pPr>
+    <a:lvl3pPr marL="914400" algn="l" defTabSz="914400">
+      <a:defRPr sz="1200">
+        <a:solidFill>
+          <a:schemeClr val="tx1"/>
+        </a:solidFill>
+        <a:latin typeface="+mn-lt"/>
+        <a:ea typeface="+mn-ea"/>
+        <a:cs typeface="+mn-cs"/>
+      </a:defRPr>
+    </a:lvl3pPr>
+    <a:lvl4pPr marL="1371600" algn="l" defTabSz="914400">
+      <a:defRPr sz="1200">
+        <a:solidFill>
+          <a:schemeClr val="tx1"/>
+        </a:solidFill>
+        <a:latin typeface="+mn-lt"/>
+        <a:ea typeface="+mn-ea"/>
+        <a:cs typeface="+mn-cs"/>
+      </a:defRPr>
+    </a:lvl4pPr>
+    <a:lvl5pPr marL="1828800" algn="l" defTabSz="914400">
+      <a:defRPr sz="1200">
+        <a:solidFill>
+          <a:schemeClr val="tx1"/>
+        </a:solidFill>
+        <a:latin typeface="+mn-lt"/>
+        <a:ea typeface="+mn-ea"/>
+        <a:cs typeface="+mn-cs"/>
+      </a:defRPr>
+    </a:lvl5pPr>
+    <a:lvl6pPr marL="2286000" algn="l" defTabSz="914400">
+      <a:defRPr sz="1200">
+        <a:solidFill>
+          <a:schemeClr val="tx1"/>
+        </a:solidFill>
+        <a:latin typeface="+mn-lt"/>
+        <a:ea typeface="+mn-ea"/>
+        <a:cs typeface="+mn-cs"/>
+      </a:defRPr>
+    </a:lvl6pPr>
+    <a:lvl7pPr marL="2743200" algn="l" defTabSz="914400">
+      <a:defRPr sz="1200">
+        <a:solidFill>
+          <a:schemeClr val="tx1"/>
+        </a:solidFill>
+        <a:latin typeface="+mn-lt"/>
+        <a:ea typeface="+mn-ea"/>
+        <a:cs typeface="+mn-cs"/>
+      </a:defRPr>
+    </a:lvl7pPr>
+    <a:lvl8pPr marL="3200400" algn="l" defTabSz="914400">
+      <a:defRPr sz="1200">
+        <a:solidFill>
+          <a:schemeClr val="tx1"/>
+        </a:solidFill>
+        <a:latin typeface="+mn-lt"/>
+        <a:ea typeface="+mn-ea"/>
+        <a:cs typeface="+mn-cs"/>
+      </a:defRPr>
+    </a:lvl8pPr>
+    <a:lvl9pPr marL="3657600" algn="l" defTabSz="914400">
+      <a:defRPr sz="1200">
+        <a:solidFill>
+          <a:schemeClr val="tx1"/>
+        </a:solidFill>
+        <a:latin typeface="+mn-lt"/>
+        <a:ea typeface="+mn-ea"/>
+        <a:cs typeface="+mn-cs"/>
+      </a:defRPr>
+    </a:lvl9pPr>
+  </p:notesStyle>
+</p:notesMaster>
+</file>
+
+<file path=ppt/notesSlides/notesSlide1.xml><?xml version="1.0" encoding="utf-8"?>
+<p:notes xmlns:a="http://schemas.openxmlformats.org/drawingml/2006/main" xmlns:r="http://schemas.openxmlformats.org/officeDocument/2006/relationships" xmlns:p="http://schemas.openxmlformats.org/presentationml/2006/main" xmlns:m="http://schemas.openxmlformats.org/officeDocument/2006/math" xmlns:w="http://schemas.openxmlformats.org/wordprocessingml/2006/main">
+  <p:cSld name="">
+    <p:spTree>
+      <p:nvGrpSpPr>
+        <p:cNvPr id="1" name=""/>
+        <p:cNvGrpSpPr/>
+        <p:nvPr/>
+      </p:nvGrpSpPr>
+      <p:grpSpPr bwMode="auto">
+        <a:xfrm>
+          <a:off x="0" y="0"/>
+          <a:ext cx="0" cy="0"/>
+          <a:chOff x="0" y="0"/>
+          <a:chExt cx="0" cy="0"/>
+        </a:xfrm>
+      </p:grpSpPr>
+      <p:sp>
+        <p:nvSpPr>
+          <p:cNvPr id="2" name="Slide Image Placeholder 1"/>
+          <p:cNvSpPr>
+            <a:spLocks noChangeAspect="1" noGrp="1" noRot="1"/>
+          </p:cNvSpPr>
+          <p:nvPr>
+            <p:ph type="sldImg"/>
+          </p:nvPr>
+        </p:nvSpPr>
+        <p:spPr bwMode="auto"/>
+      </p:sp>
+      <p:sp>
+        <p:nvSpPr>
+          <p:cNvPr id="3" name="Notes Placeholder 2"/>
+          <p:cNvSpPr>
+            <a:spLocks noGrp="1"/>
+          </p:cNvSpPr>
+          <p:nvPr>
+            <p:ph type="body" idx="1"/>
+          </p:nvPr>
+        </p:nvSpPr>
+        <p:spPr bwMode="auto"/>
+        <p:txBody>
+          <a:bodyPr/>
+          <a:lstStyle/>
+          <a:p>
+            <a:pPr>
+              <a:defRPr/>
+            </a:pPr>
+            <a:endParaRPr/>
+          </a:p>
+        </p:txBody>
+      </p:sp>
+      <p:sp>
+        <p:nvSpPr>
+          <p:cNvPr id="4" name="Slide Number Placeholder 3"/>
+          <p:cNvSpPr>
+            <a:spLocks noGrp="1"/>
+          </p:cNvSpPr>
+          <p:nvPr>
+            <p:ph type="sldNum" sz="quarter" idx="10"/>
+          </p:nvPr>
+        </p:nvSpPr>
+        <p:spPr bwMode="auto"/>
+        <p:txBody>
+          <a:bodyPr/>
+          <a:lstStyle/>
+          <a:p>
+            <a:pPr>
+              <a:defRPr/>
+            </a:pPr>
+            <a:fld id="{E2128D9B-779F-6554-246C-31267A0FE629}" type="slidenum">
+              <a:rPr/>
+              <a:t/>
+            </a:fld>
+            <a:endParaRPr/>
+          </a:p>
+        </p:txBody>
+      </p:sp>
+    </p:spTree>
+  </p:cSld>
+</p:notes>
+</file>
+
+<file path=ppt/notesSlides/notesSlide10.xml><?xml version="1.0" encoding="utf-8"?>
+<p:notes xmlns:a="http://schemas.openxmlformats.org/drawingml/2006/main" xmlns:r="http://schemas.openxmlformats.org/officeDocument/2006/relationships" xmlns:p="http://schemas.openxmlformats.org/presentationml/2006/main" xmlns:m="http://schemas.openxmlformats.org/officeDocument/2006/math" xmlns:w="http://schemas.openxmlformats.org/wordprocessingml/2006/main">
+  <p:cSld name="">
+    <p:spTree>
+      <p:nvGrpSpPr>
+        <p:cNvPr id="1" name=""/>
+        <p:cNvGrpSpPr/>
+        <p:nvPr/>
+      </p:nvGrpSpPr>
+      <p:grpSpPr bwMode="auto">
+        <a:xfrm>
+          <a:off x="0" y="0"/>
+          <a:ext cx="0" cy="0"/>
+          <a:chOff x="0" y="0"/>
+          <a:chExt cx="0" cy="0"/>
+        </a:xfrm>
+      </p:grpSpPr>
+      <p:sp>
+        <p:nvSpPr>
+          <p:cNvPr id="2" name="Slide Image Placeholder 1"/>
+          <p:cNvSpPr>
+            <a:spLocks noChangeAspect="1" noGrp="1" noRot="1"/>
+          </p:cNvSpPr>
+          <p:nvPr>
+            <p:ph type="sldImg"/>
+          </p:nvPr>
+        </p:nvSpPr>
+        <p:spPr bwMode="auto"/>
+      </p:sp>
+      <p:sp>
+        <p:nvSpPr>
+          <p:cNvPr id="3" name="Notes Placeholder 2"/>
+          <p:cNvSpPr>
+            <a:spLocks noGrp="1"/>
+          </p:cNvSpPr>
+          <p:nvPr>
+            <p:ph type="body" idx="1"/>
+          </p:nvPr>
+        </p:nvSpPr>
+        <p:spPr bwMode="auto"/>
+        <p:txBody>
+          <a:bodyPr/>
+          <a:lstStyle/>
+          <a:p>
+            <a:pPr>
+              <a:defRPr/>
+            </a:pPr>
+            <a:endParaRPr/>
+          </a:p>
+        </p:txBody>
+      </p:sp>
+      <p:sp>
+        <p:nvSpPr>
+          <p:cNvPr id="4" name="Slide Number Placeholder 3"/>
+          <p:cNvSpPr>
+            <a:spLocks noGrp="1"/>
+          </p:cNvSpPr>
+          <p:nvPr>
+            <p:ph type="sldNum" sz="quarter" idx="10"/>
+          </p:nvPr>
+        </p:nvSpPr>
+        <p:spPr bwMode="auto"/>
+        <p:txBody>
+          <a:bodyPr/>
+          <a:lstStyle/>
+          <a:p>
+            <a:pPr>
+              <a:defRPr/>
+            </a:pPr>
+            <a:fld id="{E3633A0F-4E1F-0DC1-31A9-59DB8B4117AC}" type="slidenum">
+              <a:rPr/>
+              <a:t/>
+            </a:fld>
+            <a:endParaRPr/>
+          </a:p>
+        </p:txBody>
+      </p:sp>
+    </p:spTree>
+  </p:cSld>
+</p:notes>
+</file>
+
+<file path=ppt/notesSlides/notesSlide11.xml><?xml version="1.0" encoding="utf-8"?>
+<p:notes xmlns:a="http://schemas.openxmlformats.org/drawingml/2006/main" xmlns:r="http://schemas.openxmlformats.org/officeDocument/2006/relationships" xmlns:p="http://schemas.openxmlformats.org/presentationml/2006/main" xmlns:m="http://schemas.openxmlformats.org/officeDocument/2006/math" xmlns:w="http://schemas.openxmlformats.org/wordprocessingml/2006/main">
+  <p:cSld name="">
+    <p:spTree>
+      <p:nvGrpSpPr>
+        <p:cNvPr id="1" name=""/>
+        <p:cNvGrpSpPr/>
+        <p:nvPr/>
+      </p:nvGrpSpPr>
+      <p:grpSpPr bwMode="auto">
+        <a:xfrm>
+          <a:off x="0" y="0"/>
+          <a:ext cx="0" cy="0"/>
+          <a:chOff x="0" y="0"/>
+          <a:chExt cx="0" cy="0"/>
+        </a:xfrm>
+      </p:grpSpPr>
+      <p:sp>
+        <p:nvSpPr>
+          <p:cNvPr id="2" name="Slide Image Placeholder 1"/>
+          <p:cNvSpPr>
+            <a:spLocks noChangeAspect="1" noGrp="1" noRot="1"/>
+          </p:cNvSpPr>
+          <p:nvPr>
+            <p:ph type="sldImg"/>
+          </p:nvPr>
+        </p:nvSpPr>
+        <p:spPr bwMode="auto"/>
+      </p:sp>
+      <p:sp>
+        <p:nvSpPr>
+          <p:cNvPr id="3" name="Notes Placeholder 2"/>
+          <p:cNvSpPr>
+            <a:spLocks noGrp="1"/>
+          </p:cNvSpPr>
+          <p:nvPr>
+            <p:ph type="body" idx="1"/>
+          </p:nvPr>
+        </p:nvSpPr>
+        <p:spPr bwMode="auto"/>
+        <p:txBody>
+          <a:bodyPr/>
+          <a:lstStyle/>
+          <a:p>
+            <a:pPr>
+              <a:defRPr/>
+            </a:pPr>
+            <a:endParaRPr/>
+          </a:p>
+        </p:txBody>
+      </p:sp>
+      <p:sp>
+        <p:nvSpPr>
+          <p:cNvPr id="4" name="Slide Number Placeholder 3"/>
+          <p:cNvSpPr>
+            <a:spLocks noGrp="1"/>
+          </p:cNvSpPr>
+          <p:nvPr>
+            <p:ph type="sldNum" sz="quarter" idx="10"/>
+          </p:nvPr>
+        </p:nvSpPr>
+        <p:spPr bwMode="auto"/>
+        <p:txBody>
+          <a:bodyPr/>
+          <a:lstStyle/>
+          <a:p>
+            <a:pPr>
+              <a:defRPr/>
+            </a:pPr>
+            <a:fld id="{C9CB5158-2561-D829-5BD1-940F3CDD34D3}" type="slidenum">
+              <a:rPr/>
+              <a:t/>
+            </a:fld>
+            <a:endParaRPr/>
+          </a:p>
+        </p:txBody>
+      </p:sp>
+    </p:spTree>
+  </p:cSld>
+</p:notes>
+</file>
+
+<file path=ppt/notesSlides/notesSlide12.xml><?xml version="1.0" encoding="utf-8"?>
+<p:notes xmlns:a="http://schemas.openxmlformats.org/drawingml/2006/main" xmlns:r="http://schemas.openxmlformats.org/officeDocument/2006/relationships" xmlns:p="http://schemas.openxmlformats.org/presentationml/2006/main" xmlns:m="http://schemas.openxmlformats.org/officeDocument/2006/math" xmlns:w="http://schemas.openxmlformats.org/wordprocessingml/2006/main">
+  <p:cSld name="">
+    <p:spTree>
+      <p:nvGrpSpPr>
+        <p:cNvPr id="1" name=""/>
+        <p:cNvGrpSpPr/>
+        <p:nvPr/>
+      </p:nvGrpSpPr>
+      <p:grpSpPr bwMode="auto">
+        <a:xfrm>
+          <a:off x="0" y="0"/>
+          <a:ext cx="0" cy="0"/>
+          <a:chOff x="0" y="0"/>
+          <a:chExt cx="0" cy="0"/>
+        </a:xfrm>
+      </p:grpSpPr>
+      <p:sp>
+        <p:nvSpPr>
+          <p:cNvPr id="2" name="Slide Image Placeholder 1"/>
+          <p:cNvSpPr>
+            <a:spLocks noChangeAspect="1" noGrp="1" noRot="1"/>
+          </p:cNvSpPr>
+          <p:nvPr>
+            <p:ph type="sldImg"/>
+          </p:nvPr>
+        </p:nvSpPr>
+        <p:spPr bwMode="auto"/>
+      </p:sp>
+      <p:sp>
+        <p:nvSpPr>
+          <p:cNvPr id="3" name="Notes Placeholder 2"/>
+          <p:cNvSpPr>
+            <a:spLocks noGrp="1"/>
+          </p:cNvSpPr>
+          <p:nvPr>
+            <p:ph type="body" idx="1"/>
+          </p:nvPr>
+        </p:nvSpPr>
+        <p:spPr bwMode="auto"/>
+        <p:txBody>
+          <a:bodyPr/>
+          <a:lstStyle/>
+          <a:p>
+            <a:pPr>
+              <a:defRPr/>
+            </a:pPr>
+            <a:endParaRPr/>
+          </a:p>
+        </p:txBody>
+      </p:sp>
+      <p:sp>
+        <p:nvSpPr>
+          <p:cNvPr id="4" name="Slide Number Placeholder 3"/>
+          <p:cNvSpPr>
+            <a:spLocks noGrp="1"/>
+          </p:cNvSpPr>
+          <p:nvPr>
+            <p:ph type="sldNum" sz="quarter" idx="10"/>
+          </p:nvPr>
+        </p:nvSpPr>
+        <p:spPr bwMode="auto"/>
+        <p:txBody>
+          <a:bodyPr/>
+          <a:lstStyle/>
+          <a:p>
+            <a:pPr>
+              <a:defRPr/>
+            </a:pPr>
+            <a:fld id="{5F5802A3-99A3-46C3-33FA-AA17986FD060}" type="slidenum">
+              <a:rPr/>
+              <a:t/>
+            </a:fld>
+            <a:endParaRPr/>
+          </a:p>
+        </p:txBody>
+      </p:sp>
+    </p:spTree>
+  </p:cSld>
+</p:notes>
+</file>
+
+<file path=ppt/notesSlides/notesSlide13.xml><?xml version="1.0" encoding="utf-8"?>
+<p:notes xmlns:a="http://schemas.openxmlformats.org/drawingml/2006/main" xmlns:r="http://schemas.openxmlformats.org/officeDocument/2006/relationships" xmlns:p="http://schemas.openxmlformats.org/presentationml/2006/main" xmlns:m="http://schemas.openxmlformats.org/officeDocument/2006/math" xmlns:w="http://schemas.openxmlformats.org/wordprocessingml/2006/main">
+  <p:cSld name="">
+    <p:spTree>
+      <p:nvGrpSpPr>
+        <p:cNvPr id="1" name=""/>
+        <p:cNvGrpSpPr/>
+        <p:nvPr/>
+      </p:nvGrpSpPr>
+      <p:grpSpPr bwMode="auto">
+        <a:xfrm>
+          <a:off x="0" y="0"/>
+          <a:ext cx="0" cy="0"/>
+          <a:chOff x="0" y="0"/>
+          <a:chExt cx="0" cy="0"/>
+        </a:xfrm>
+      </p:grpSpPr>
+      <p:sp>
+        <p:nvSpPr>
+          <p:cNvPr id="2" name="Slide Image Placeholder 1"/>
+          <p:cNvSpPr>
+            <a:spLocks noChangeAspect="1" noGrp="1" noRot="1"/>
+          </p:cNvSpPr>
+          <p:nvPr>
+            <p:ph type="sldImg"/>
+          </p:nvPr>
+        </p:nvSpPr>
+        <p:spPr bwMode="auto"/>
+      </p:sp>
+      <p:sp>
+        <p:nvSpPr>
+          <p:cNvPr id="3" name="Notes Placeholder 2"/>
+          <p:cNvSpPr>
+            <a:spLocks noGrp="1"/>
+          </p:cNvSpPr>
+          <p:nvPr>
+            <p:ph type="body" idx="1"/>
+          </p:nvPr>
+        </p:nvSpPr>
+        <p:spPr bwMode="auto"/>
+        <p:txBody>
+          <a:bodyPr/>
+          <a:lstStyle/>
+          <a:p>
+            <a:pPr>
+              <a:defRPr/>
+            </a:pPr>
+            <a:endParaRPr/>
+          </a:p>
+        </p:txBody>
+      </p:sp>
+      <p:sp>
+        <p:nvSpPr>
+          <p:cNvPr id="4" name="Slide Number Placeholder 3"/>
+          <p:cNvSpPr>
+            <a:spLocks noGrp="1"/>
+          </p:cNvSpPr>
+          <p:nvPr>
+            <p:ph type="sldNum" sz="quarter" idx="10"/>
+          </p:nvPr>
+        </p:nvSpPr>
+        <p:spPr bwMode="auto"/>
+        <p:txBody>
+          <a:bodyPr/>
+          <a:lstStyle/>
+          <a:p>
+            <a:pPr>
+              <a:defRPr/>
+            </a:pPr>
+            <a:fld id="{B7B23856-C211-5BDF-959C-A7E5564E16D0}" type="slidenum">
+              <a:rPr/>
+              <a:t/>
+            </a:fld>
+            <a:endParaRPr/>
+          </a:p>
+        </p:txBody>
+      </p:sp>
+    </p:spTree>
+  </p:cSld>
+</p:notes>
+</file>
+
+<file path=ppt/notesSlides/notesSlide14.xml><?xml version="1.0" encoding="utf-8"?>
+<p:notes xmlns:a="http://schemas.openxmlformats.org/drawingml/2006/main" xmlns:r="http://schemas.openxmlformats.org/officeDocument/2006/relationships" xmlns:p="http://schemas.openxmlformats.org/presentationml/2006/main" xmlns:m="http://schemas.openxmlformats.org/officeDocument/2006/math" xmlns:w="http://schemas.openxmlformats.org/wordprocessingml/2006/main">
+  <p:cSld name="">
+    <p:spTree>
+      <p:nvGrpSpPr>
+        <p:cNvPr id="1" name=""/>
+        <p:cNvGrpSpPr/>
+        <p:nvPr/>
+      </p:nvGrpSpPr>
+      <p:grpSpPr bwMode="auto">
+        <a:xfrm>
+          <a:off x="0" y="0"/>
+          <a:ext cx="0" cy="0"/>
+          <a:chOff x="0" y="0"/>
+          <a:chExt cx="0" cy="0"/>
+        </a:xfrm>
+      </p:grpSpPr>
+      <p:sp>
+        <p:nvSpPr>
+          <p:cNvPr id="2" name="Slide Image Placeholder 1"/>
+          <p:cNvSpPr>
+            <a:spLocks noChangeAspect="1" noGrp="1" noRot="1"/>
+          </p:cNvSpPr>
+          <p:nvPr>
+            <p:ph type="sldImg"/>
+          </p:nvPr>
+        </p:nvSpPr>
+        <p:spPr bwMode="auto"/>
+      </p:sp>
+      <p:sp>
+        <p:nvSpPr>
+          <p:cNvPr id="3" name="Notes Placeholder 2"/>
+          <p:cNvSpPr>
+            <a:spLocks noGrp="1"/>
+          </p:cNvSpPr>
+          <p:nvPr>
+            <p:ph type="body" idx="1"/>
+          </p:nvPr>
+        </p:nvSpPr>
+        <p:spPr bwMode="auto"/>
+        <p:txBody>
+          <a:bodyPr/>
+          <a:lstStyle/>
+          <a:p>
+            <a:pPr>
+              <a:defRPr/>
+            </a:pPr>
+            <a:endParaRPr/>
+          </a:p>
+        </p:txBody>
+      </p:sp>
+      <p:sp>
+        <p:nvSpPr>
+          <p:cNvPr id="4" name="Slide Number Placeholder 3"/>
+          <p:cNvSpPr>
+            <a:spLocks noGrp="1"/>
+          </p:cNvSpPr>
+          <p:nvPr>
+            <p:ph type="sldNum" sz="quarter" idx="10"/>
+          </p:nvPr>
+        </p:nvSpPr>
+        <p:spPr bwMode="auto"/>
+        <p:txBody>
+          <a:bodyPr/>
+          <a:lstStyle/>
+          <a:p>
+            <a:pPr>
+              <a:defRPr/>
+            </a:pPr>
+            <a:fld id="{BB8FB19A-81CC-55C2-7BC1-22E03DC56969}" type="slidenum">
+              <a:rPr/>
+              <a:t/>
+            </a:fld>
+            <a:endParaRPr/>
+          </a:p>
+        </p:txBody>
+      </p:sp>
+    </p:spTree>
+  </p:cSld>
+</p:notes>
+</file>
+
+<file path=ppt/notesSlides/notesSlide15.xml><?xml version="1.0" encoding="utf-8"?>
+<p:notes xmlns:a="http://schemas.openxmlformats.org/drawingml/2006/main" xmlns:r="http://schemas.openxmlformats.org/officeDocument/2006/relationships" xmlns:p="http://schemas.openxmlformats.org/presentationml/2006/main" xmlns:m="http://schemas.openxmlformats.org/officeDocument/2006/math" xmlns:w="http://schemas.openxmlformats.org/wordprocessingml/2006/main">
+  <p:cSld name="">
+    <p:spTree>
+      <p:nvGrpSpPr>
+        <p:cNvPr id="1" name=""/>
+        <p:cNvGrpSpPr/>
+        <p:nvPr/>
+      </p:nvGrpSpPr>
+      <p:grpSpPr bwMode="auto">
+        <a:xfrm>
+          <a:off x="0" y="0"/>
+          <a:ext cx="0" cy="0"/>
+          <a:chOff x="0" y="0"/>
+          <a:chExt cx="0" cy="0"/>
+        </a:xfrm>
+      </p:grpSpPr>
+      <p:sp>
+        <p:nvSpPr>
+          <p:cNvPr id="2" name="Slide Image Placeholder 1"/>
+          <p:cNvSpPr>
+            <a:spLocks noChangeAspect="1" noGrp="1" noRot="1"/>
+          </p:cNvSpPr>
+          <p:nvPr>
+            <p:ph type="sldImg"/>
+          </p:nvPr>
+        </p:nvSpPr>
+        <p:spPr bwMode="auto"/>
+      </p:sp>
+      <p:sp>
+        <p:nvSpPr>
+          <p:cNvPr id="3" name="Notes Placeholder 2"/>
+          <p:cNvSpPr>
+            <a:spLocks noGrp="1"/>
+          </p:cNvSpPr>
+          <p:nvPr>
+            <p:ph type="body" idx="1"/>
+          </p:nvPr>
+        </p:nvSpPr>
+        <p:spPr bwMode="auto"/>
+        <p:txBody>
+          <a:bodyPr/>
+          <a:lstStyle/>
+          <a:p>
+            <a:pPr>
+              <a:defRPr/>
+            </a:pPr>
+            <a:endParaRPr/>
+          </a:p>
+        </p:txBody>
+      </p:sp>
+      <p:sp>
+        <p:nvSpPr>
+          <p:cNvPr id="4" name="Slide Number Placeholder 3"/>
+          <p:cNvSpPr>
+            <a:spLocks noGrp="1"/>
+          </p:cNvSpPr>
+          <p:nvPr>
+            <p:ph type="sldNum" sz="quarter" idx="10"/>
+          </p:nvPr>
+        </p:nvSpPr>
+        <p:spPr bwMode="auto"/>
+        <p:txBody>
+          <a:bodyPr/>
+          <a:lstStyle/>
+          <a:p>
+            <a:pPr>
+              <a:defRPr/>
+            </a:pPr>
+            <a:fld id="{6708F357-57BB-8BD8-F369-80DB553AE166}" type="slidenum">
+              <a:rPr/>
+              <a:t/>
+            </a:fld>
+            <a:endParaRPr/>
+          </a:p>
+        </p:txBody>
+      </p:sp>
+    </p:spTree>
+  </p:cSld>
+</p:notes>
+</file>
+
+<file path=ppt/notesSlides/notesSlide16.xml><?xml version="1.0" encoding="utf-8"?>
+<p:notes xmlns:a="http://schemas.openxmlformats.org/drawingml/2006/main" xmlns:r="http://schemas.openxmlformats.org/officeDocument/2006/relationships" xmlns:p="http://schemas.openxmlformats.org/presentationml/2006/main" xmlns:m="http://schemas.openxmlformats.org/officeDocument/2006/math" xmlns:w="http://schemas.openxmlformats.org/wordprocessingml/2006/main">
+  <p:cSld name="">
+    <p:spTree>
+      <p:nvGrpSpPr>
+        <p:cNvPr id="1" name=""/>
+        <p:cNvGrpSpPr/>
+        <p:nvPr/>
+      </p:nvGrpSpPr>
+      <p:grpSpPr bwMode="auto">
+        <a:xfrm>
+          <a:off x="0" y="0"/>
+          <a:ext cx="0" cy="0"/>
+          <a:chOff x="0" y="0"/>
+          <a:chExt cx="0" cy="0"/>
+        </a:xfrm>
+      </p:grpSpPr>
+      <p:sp>
+        <p:nvSpPr>
+          <p:cNvPr id="2" name="Slide Image Placeholder 1"/>
+          <p:cNvSpPr>
+            <a:spLocks noChangeAspect="1" noGrp="1" noRot="1"/>
+          </p:cNvSpPr>
+          <p:nvPr>
+            <p:ph type="sldImg"/>
+          </p:nvPr>
+        </p:nvSpPr>
+        <p:spPr bwMode="auto"/>
+      </p:sp>
+      <p:sp>
+        <p:nvSpPr>
+          <p:cNvPr id="3" name="Notes Placeholder 2"/>
+          <p:cNvSpPr>
+            <a:spLocks noGrp="1"/>
+          </p:cNvSpPr>
+          <p:nvPr>
+            <p:ph type="body" idx="1"/>
+          </p:nvPr>
+        </p:nvSpPr>
+        <p:spPr bwMode="auto"/>
+        <p:txBody>
+          <a:bodyPr/>
+          <a:lstStyle/>
+          <a:p>
+            <a:pPr>
+              <a:defRPr/>
+            </a:pPr>
+            <a:endParaRPr/>
+          </a:p>
+        </p:txBody>
+      </p:sp>
+      <p:sp>
+        <p:nvSpPr>
+          <p:cNvPr id="4" name="Slide Number Placeholder 3"/>
+          <p:cNvSpPr>
+            <a:spLocks noGrp="1"/>
+          </p:cNvSpPr>
+          <p:nvPr>
+            <p:ph type="sldNum" sz="quarter" idx="10"/>
+          </p:nvPr>
+        </p:nvSpPr>
+        <p:spPr bwMode="auto"/>
+        <p:txBody>
+          <a:bodyPr/>
+          <a:lstStyle/>
+          <a:p>
+            <a:pPr>
+              <a:defRPr/>
+            </a:pPr>
+            <a:fld id="{7C36E588-1396-7C22-0D1B-2EA7DB9B92E4}" type="slidenum">
+              <a:rPr/>
+              <a:t/>
+            </a:fld>
+            <a:endParaRPr/>
+          </a:p>
+        </p:txBody>
+      </p:sp>
+    </p:spTree>
+  </p:cSld>
+</p:notes>
+</file>
+
+<file path=ppt/notesSlides/notesSlide17.xml><?xml version="1.0" encoding="utf-8"?>
+<p:notes xmlns:a="http://schemas.openxmlformats.org/drawingml/2006/main" xmlns:r="http://schemas.openxmlformats.org/officeDocument/2006/relationships" xmlns:p="http://schemas.openxmlformats.org/presentationml/2006/main" xmlns:m="http://schemas.openxmlformats.org/officeDocument/2006/math" xmlns:w="http://schemas.openxmlformats.org/wordprocessingml/2006/main">
+  <p:cSld name="">
+    <p:spTree>
+      <p:nvGrpSpPr>
+        <p:cNvPr id="1" name=""/>
+        <p:cNvGrpSpPr/>
+        <p:nvPr/>
+      </p:nvGrpSpPr>
+      <p:grpSpPr bwMode="auto">
+        <a:xfrm>
+          <a:off x="0" y="0"/>
+          <a:ext cx="0" cy="0"/>
+          <a:chOff x="0" y="0"/>
+          <a:chExt cx="0" cy="0"/>
+        </a:xfrm>
+      </p:grpSpPr>
+      <p:sp>
+        <p:nvSpPr>
+          <p:cNvPr id="2" name="Slide Image Placeholder 1"/>
+          <p:cNvSpPr>
+            <a:spLocks noChangeAspect="1" noGrp="1" noRot="1"/>
+          </p:cNvSpPr>
+          <p:nvPr>
+            <p:ph type="sldImg"/>
+          </p:nvPr>
+        </p:nvSpPr>
+        <p:spPr bwMode="auto"/>
+      </p:sp>
+      <p:sp>
+        <p:nvSpPr>
+          <p:cNvPr id="3" name="Notes Placeholder 2"/>
+          <p:cNvSpPr>
+            <a:spLocks noGrp="1"/>
+          </p:cNvSpPr>
+          <p:nvPr>
+            <p:ph type="body" idx="1"/>
+          </p:nvPr>
+        </p:nvSpPr>
+        <p:spPr bwMode="auto"/>
+        <p:txBody>
+          <a:bodyPr/>
+          <a:lstStyle/>
+          <a:p>
+            <a:pPr>
+              <a:defRPr/>
+            </a:pPr>
+            <a:endParaRPr/>
+          </a:p>
+        </p:txBody>
+      </p:sp>
+      <p:sp>
+        <p:nvSpPr>
+          <p:cNvPr id="4" name="Slide Number Placeholder 3"/>
+          <p:cNvSpPr>
+            <a:spLocks noGrp="1"/>
+          </p:cNvSpPr>
+          <p:nvPr>
+            <p:ph type="sldNum" sz="quarter" idx="10"/>
+          </p:nvPr>
+        </p:nvSpPr>
+        <p:spPr bwMode="auto"/>
+        <p:txBody>
+          <a:bodyPr/>
+          <a:lstStyle/>
+          <a:p>
+            <a:pPr>
+              <a:defRPr/>
+            </a:pPr>
+            <a:fld id="{C1EB5809-1053-0E62-1B7F-8E8BA2BC1D0D}" type="slidenum">
+              <a:rPr/>
+              <a:t/>
+            </a:fld>
+            <a:endParaRPr/>
+          </a:p>
+        </p:txBody>
+      </p:sp>
+    </p:spTree>
+  </p:cSld>
+</p:notes>
+</file>
+
+<file path=ppt/notesSlides/notesSlide18.xml><?xml version="1.0" encoding="utf-8"?>
+<p:notes xmlns:a="http://schemas.openxmlformats.org/drawingml/2006/main" xmlns:r="http://schemas.openxmlformats.org/officeDocument/2006/relationships" xmlns:p="http://schemas.openxmlformats.org/presentationml/2006/main" xmlns:m="http://schemas.openxmlformats.org/officeDocument/2006/math" xmlns:w="http://schemas.openxmlformats.org/wordprocessingml/2006/main">
+  <p:cSld name="">
+    <p:spTree>
+      <p:nvGrpSpPr>
+        <p:cNvPr id="1" name=""/>
+        <p:cNvGrpSpPr/>
+        <p:nvPr/>
+      </p:nvGrpSpPr>
+      <p:grpSpPr bwMode="auto">
+        <a:xfrm>
+          <a:off x="0" y="0"/>
+          <a:ext cx="0" cy="0"/>
+          <a:chOff x="0" y="0"/>
+          <a:chExt cx="0" cy="0"/>
+        </a:xfrm>
+      </p:grpSpPr>
+      <p:sp>
+        <p:nvSpPr>
+          <p:cNvPr id="2" name="Slide Image Placeholder 1"/>
+          <p:cNvSpPr>
+            <a:spLocks noChangeAspect="1" noGrp="1" noRot="1"/>
+          </p:cNvSpPr>
+          <p:nvPr>
+            <p:ph type="sldImg"/>
+          </p:nvPr>
+        </p:nvSpPr>
+        <p:spPr bwMode="auto"/>
+      </p:sp>
+      <p:sp>
+        <p:nvSpPr>
+          <p:cNvPr id="3" name="Notes Placeholder 2"/>
+          <p:cNvSpPr>
+            <a:spLocks noGrp="1"/>
+          </p:cNvSpPr>
+          <p:nvPr>
+            <p:ph type="body" idx="1"/>
+          </p:nvPr>
+        </p:nvSpPr>
+        <p:spPr bwMode="auto"/>
+        <p:txBody>
+          <a:bodyPr/>
+          <a:lstStyle/>
+          <a:p>
+            <a:pPr>
+              <a:defRPr/>
+            </a:pPr>
+            <a:endParaRPr/>
+          </a:p>
+        </p:txBody>
+      </p:sp>
+      <p:sp>
+        <p:nvSpPr>
+          <p:cNvPr id="4" name="Slide Number Placeholder 3"/>
+          <p:cNvSpPr>
+            <a:spLocks noGrp="1"/>
+          </p:cNvSpPr>
+          <p:nvPr>
+            <p:ph type="sldNum" sz="quarter" idx="10"/>
+          </p:nvPr>
+        </p:nvSpPr>
+        <p:spPr bwMode="auto"/>
+        <p:txBody>
+          <a:bodyPr/>
+          <a:lstStyle/>
+          <a:p>
+            <a:pPr>
+              <a:defRPr/>
+            </a:pPr>
+            <a:fld id="{3A6B045A-84BF-E18F-6E22-2AB7D768185D}" type="slidenum">
+              <a:rPr/>
+              <a:t/>
+            </a:fld>
+            <a:endParaRPr/>
+          </a:p>
+        </p:txBody>
+      </p:sp>
+    </p:spTree>
+  </p:cSld>
+</p:notes>
+</file>
+
+<file path=ppt/notesSlides/notesSlide19.xml><?xml version="1.0" encoding="utf-8"?>
+<p:notes xmlns:a="http://schemas.openxmlformats.org/drawingml/2006/main" xmlns:r="http://schemas.openxmlformats.org/officeDocument/2006/relationships" xmlns:p="http://schemas.openxmlformats.org/presentationml/2006/main" xmlns:m="http://schemas.openxmlformats.org/officeDocument/2006/math" xmlns:w="http://schemas.openxmlformats.org/wordprocessingml/2006/main">
+  <p:cSld name="">
+    <p:spTree>
+      <p:nvGrpSpPr>
+        <p:cNvPr id="1" name=""/>
+        <p:cNvGrpSpPr/>
+        <p:nvPr/>
+      </p:nvGrpSpPr>
+      <p:grpSpPr bwMode="auto">
+        <a:xfrm>
+          <a:off x="0" y="0"/>
+          <a:ext cx="0" cy="0"/>
+          <a:chOff x="0" y="0"/>
+          <a:chExt cx="0" cy="0"/>
+        </a:xfrm>
+      </p:grpSpPr>
+      <p:sp>
+        <p:nvSpPr>
+          <p:cNvPr id="2" name="Slide Image Placeholder 1"/>
+          <p:cNvSpPr>
+            <a:spLocks noChangeAspect="1" noGrp="1" noRot="1"/>
+          </p:cNvSpPr>
+          <p:nvPr>
+            <p:ph type="sldImg"/>
+          </p:nvPr>
+        </p:nvSpPr>
+        <p:spPr bwMode="auto"/>
+      </p:sp>
+      <p:sp>
+        <p:nvSpPr>
+          <p:cNvPr id="3" name="Notes Placeholder 2"/>
+          <p:cNvSpPr>
+            <a:spLocks noGrp="1"/>
+          </p:cNvSpPr>
+          <p:nvPr>
+            <p:ph type="body" idx="1"/>
+          </p:nvPr>
+        </p:nvSpPr>
+        <p:spPr bwMode="auto"/>
+        <p:txBody>
+          <a:bodyPr/>
+          <a:lstStyle/>
+          <a:p>
+            <a:pPr>
+              <a:defRPr/>
+            </a:pPr>
+            <a:endParaRPr/>
+          </a:p>
+        </p:txBody>
+      </p:sp>
+      <p:sp>
+        <p:nvSpPr>
+          <p:cNvPr id="4" name="Slide Number Placeholder 3"/>
+          <p:cNvSpPr>
+            <a:spLocks noGrp="1"/>
+          </p:cNvSpPr>
+          <p:nvPr>
+            <p:ph type="sldNum" sz="quarter" idx="10"/>
+          </p:nvPr>
+        </p:nvSpPr>
+        <p:spPr bwMode="auto"/>
+        <p:txBody>
+          <a:bodyPr/>
+          <a:lstStyle/>
+          <a:p>
+            <a:pPr>
+              <a:defRPr/>
+            </a:pPr>
+            <a:fld id="{6746B87C-D96B-DD7F-63B0-ABE3C0E9E3D1}" type="slidenum">
+              <a:rPr/>
+              <a:t/>
+            </a:fld>
+            <a:endParaRPr/>
+          </a:p>
+        </p:txBody>
+      </p:sp>
+    </p:spTree>
+  </p:cSld>
+</p:notes>
+</file>
+
+<file path=ppt/notesSlides/notesSlide2.xml><?xml version="1.0" encoding="utf-8"?>
+<p:notes xmlns:a="http://schemas.openxmlformats.org/drawingml/2006/main" xmlns:r="http://schemas.openxmlformats.org/officeDocument/2006/relationships" xmlns:p="http://schemas.openxmlformats.org/presentationml/2006/main" xmlns:m="http://schemas.openxmlformats.org/officeDocument/2006/math" xmlns:w="http://schemas.openxmlformats.org/wordprocessingml/2006/main">
+  <p:cSld name="">
+    <p:spTree>
+      <p:nvGrpSpPr>
+        <p:cNvPr id="1" name=""/>
+        <p:cNvGrpSpPr/>
+        <p:nvPr/>
+      </p:nvGrpSpPr>
+      <p:grpSpPr bwMode="auto">
+        <a:xfrm>
+          <a:off x="0" y="0"/>
+          <a:ext cx="0" cy="0"/>
+          <a:chOff x="0" y="0"/>
+          <a:chExt cx="0" cy="0"/>
+        </a:xfrm>
+      </p:grpSpPr>
+      <p:sp>
+        <p:nvSpPr>
+          <p:cNvPr id="2" name="Slide Image Placeholder 1"/>
+          <p:cNvSpPr>
+            <a:spLocks noChangeAspect="1" noGrp="1" noRot="1"/>
+          </p:cNvSpPr>
+          <p:nvPr>
+            <p:ph type="sldImg"/>
+          </p:nvPr>
+        </p:nvSpPr>
+        <p:spPr bwMode="auto"/>
+      </p:sp>
+      <p:sp>
+        <p:nvSpPr>
+          <p:cNvPr id="3" name="Notes Placeholder 2"/>
+          <p:cNvSpPr>
+            <a:spLocks noGrp="1"/>
+          </p:cNvSpPr>
+          <p:nvPr>
+            <p:ph type="body" idx="1"/>
+          </p:nvPr>
+        </p:nvSpPr>
+        <p:spPr bwMode="auto"/>
+        <p:txBody>
+          <a:bodyPr/>
+          <a:lstStyle/>
+          <a:p>
+            <a:pPr>
+              <a:defRPr/>
+            </a:pPr>
+            <a:endParaRPr/>
+          </a:p>
+        </p:txBody>
+      </p:sp>
+      <p:sp>
+        <p:nvSpPr>
+          <p:cNvPr id="4" name="Slide Number Placeholder 3"/>
+          <p:cNvSpPr>
+            <a:spLocks noGrp="1"/>
+          </p:cNvSpPr>
+          <p:nvPr>
+            <p:ph type="sldNum" sz="quarter" idx="10"/>
+          </p:nvPr>
+        </p:nvSpPr>
+        <p:spPr bwMode="auto"/>
+        <p:txBody>
+          <a:bodyPr/>
+          <a:lstStyle/>
+          <a:p>
+            <a:pPr>
+              <a:defRPr/>
+            </a:pPr>
+            <a:fld id="{A97403C1-385B-A316-6A3A-EFC12E68130C}" type="slidenum">
+              <a:rPr/>
+              <a:t/>
+            </a:fld>
+            <a:endParaRPr/>
+          </a:p>
+        </p:txBody>
+      </p:sp>
+    </p:spTree>
+  </p:cSld>
+</p:notes>
+</file>
+
+<file path=ppt/notesSlides/notesSlide20.xml><?xml version="1.0" encoding="utf-8"?>
+<p:notes xmlns:a="http://schemas.openxmlformats.org/drawingml/2006/main" xmlns:r="http://schemas.openxmlformats.org/officeDocument/2006/relationships" xmlns:p="http://schemas.openxmlformats.org/presentationml/2006/main" xmlns:m="http://schemas.openxmlformats.org/officeDocument/2006/math" xmlns:w="http://schemas.openxmlformats.org/wordprocessingml/2006/main">
+  <p:cSld name="">
+    <p:spTree>
+      <p:nvGrpSpPr>
+        <p:cNvPr id="1" name=""/>
+        <p:cNvGrpSpPr/>
+        <p:nvPr/>
+      </p:nvGrpSpPr>
+      <p:grpSpPr bwMode="auto">
+        <a:xfrm>
+          <a:off x="0" y="0"/>
+          <a:ext cx="0" cy="0"/>
+          <a:chOff x="0" y="0"/>
+          <a:chExt cx="0" cy="0"/>
+        </a:xfrm>
+      </p:grpSpPr>
+      <p:sp>
+        <p:nvSpPr>
+          <p:cNvPr id="2" name="Slide Image Placeholder 1"/>
+          <p:cNvSpPr>
+            <a:spLocks noChangeAspect="1" noGrp="1" noRot="1"/>
+          </p:cNvSpPr>
+          <p:nvPr>
+            <p:ph type="sldImg"/>
+          </p:nvPr>
+        </p:nvSpPr>
+        <p:spPr bwMode="auto"/>
+      </p:sp>
+      <p:sp>
+        <p:nvSpPr>
+          <p:cNvPr id="3" name="Notes Placeholder 2"/>
+          <p:cNvSpPr>
+            <a:spLocks noGrp="1"/>
+          </p:cNvSpPr>
+          <p:nvPr>
+            <p:ph type="body" idx="1"/>
+          </p:nvPr>
+        </p:nvSpPr>
+        <p:spPr bwMode="auto"/>
+        <p:txBody>
+          <a:bodyPr/>
+          <a:lstStyle/>
+          <a:p>
+            <a:pPr>
+              <a:defRPr/>
+            </a:pPr>
+            <a:endParaRPr/>
+          </a:p>
+        </p:txBody>
+      </p:sp>
+      <p:sp>
+        <p:nvSpPr>
+          <p:cNvPr id="4" name="Slide Number Placeholder 3"/>
+          <p:cNvSpPr>
+            <a:spLocks noGrp="1"/>
+          </p:cNvSpPr>
+          <p:nvPr>
+            <p:ph type="sldNum" sz="quarter" idx="10"/>
+          </p:nvPr>
+        </p:nvSpPr>
+        <p:spPr bwMode="auto"/>
+        <p:txBody>
+          <a:bodyPr/>
+          <a:lstStyle/>
+          <a:p>
+            <a:pPr>
+              <a:defRPr/>
+            </a:pPr>
+            <a:fld id="{AB9D8703-8696-91C5-AF6B-F1B25C4D8ADA}" type="slidenum">
+              <a:rPr/>
+              <a:t/>
+            </a:fld>
+            <a:endParaRPr/>
+          </a:p>
+        </p:txBody>
+      </p:sp>
+    </p:spTree>
+  </p:cSld>
+</p:notes>
+</file>
+
+<file path=ppt/notesSlides/notesSlide21.xml><?xml version="1.0" encoding="utf-8"?>
+<p:notes xmlns:a="http://schemas.openxmlformats.org/drawingml/2006/main" xmlns:r="http://schemas.openxmlformats.org/officeDocument/2006/relationships" xmlns:p="http://schemas.openxmlformats.org/presentationml/2006/main" xmlns:m="http://schemas.openxmlformats.org/officeDocument/2006/math" xmlns:w="http://schemas.openxmlformats.org/wordprocessingml/2006/main">
+  <p:cSld name="">
+    <p:spTree>
+      <p:nvGrpSpPr>
+        <p:cNvPr id="1" name=""/>
+        <p:cNvGrpSpPr/>
+        <p:nvPr/>
+      </p:nvGrpSpPr>
+      <p:grpSpPr bwMode="auto">
+        <a:xfrm>
+          <a:off x="0" y="0"/>
+          <a:ext cx="0" cy="0"/>
+          <a:chOff x="0" y="0"/>
+          <a:chExt cx="0" cy="0"/>
+        </a:xfrm>
+      </p:grpSpPr>
+      <p:sp>
+        <p:nvSpPr>
+          <p:cNvPr id="2" name="Slide Image Placeholder 1"/>
+          <p:cNvSpPr>
+            <a:spLocks noChangeAspect="1" noGrp="1" noRot="1"/>
+          </p:cNvSpPr>
+          <p:nvPr>
+            <p:ph type="sldImg"/>
+          </p:nvPr>
+        </p:nvSpPr>
+        <p:spPr bwMode="auto"/>
+      </p:sp>
+      <p:sp>
+        <p:nvSpPr>
+          <p:cNvPr id="3" name="Notes Placeholder 2"/>
+          <p:cNvSpPr>
+            <a:spLocks noGrp="1"/>
+          </p:cNvSpPr>
+          <p:nvPr>
+            <p:ph type="body" idx="1"/>
+          </p:nvPr>
+        </p:nvSpPr>
+        <p:spPr bwMode="auto"/>
+        <p:txBody>
+          <a:bodyPr/>
+          <a:lstStyle/>
+          <a:p>
+            <a:pPr>
+              <a:defRPr/>
+            </a:pPr>
+            <a:endParaRPr/>
+          </a:p>
+        </p:txBody>
+      </p:sp>
+      <p:sp>
+        <p:nvSpPr>
+          <p:cNvPr id="4" name="Slide Number Placeholder 3"/>
+          <p:cNvSpPr>
+            <a:spLocks noGrp="1"/>
+          </p:cNvSpPr>
+          <p:nvPr>
+            <p:ph type="sldNum" sz="quarter" idx="10"/>
+          </p:nvPr>
+        </p:nvSpPr>
+        <p:spPr bwMode="auto"/>
+        <p:txBody>
+          <a:bodyPr/>
+          <a:lstStyle/>
+          <a:p>
+            <a:pPr>
+              <a:defRPr/>
+            </a:pPr>
+            <a:fld id="{2DFB50D3-3B29-A6CE-6E6F-C260F6F6685D}" type="slidenum">
+              <a:rPr/>
+              <a:t/>
+            </a:fld>
+            <a:endParaRPr/>
+          </a:p>
+        </p:txBody>
+      </p:sp>
+    </p:spTree>
+  </p:cSld>
+</p:notes>
+</file>
+
+<file path=ppt/notesSlides/notesSlide22.xml><?xml version="1.0" encoding="utf-8"?>
+<p:notes xmlns:a="http://schemas.openxmlformats.org/drawingml/2006/main" xmlns:r="http://schemas.openxmlformats.org/officeDocument/2006/relationships" xmlns:p="http://schemas.openxmlformats.org/presentationml/2006/main" xmlns:m="http://schemas.openxmlformats.org/officeDocument/2006/math" xmlns:w="http://schemas.openxmlformats.org/wordprocessingml/2006/main">
+  <p:cSld name="">
+    <p:spTree>
+      <p:nvGrpSpPr>
+        <p:cNvPr id="1" name=""/>
+        <p:cNvGrpSpPr/>
+        <p:nvPr/>
+      </p:nvGrpSpPr>
+      <p:grpSpPr bwMode="auto">
+        <a:xfrm>
+          <a:off x="0" y="0"/>
+          <a:ext cx="0" cy="0"/>
+          <a:chOff x="0" y="0"/>
+          <a:chExt cx="0" cy="0"/>
+        </a:xfrm>
+      </p:grpSpPr>
+      <p:sp>
+        <p:nvSpPr>
+          <p:cNvPr id="2" name="Slide Image Placeholder 1"/>
+          <p:cNvSpPr>
+            <a:spLocks noChangeAspect="1" noGrp="1" noRot="1"/>
+          </p:cNvSpPr>
+          <p:nvPr>
+            <p:ph type="sldImg"/>
+          </p:nvPr>
+        </p:nvSpPr>
+        <p:spPr bwMode="auto"/>
+      </p:sp>
+      <p:sp>
+        <p:nvSpPr>
+          <p:cNvPr id="3" name="Notes Placeholder 2"/>
+          <p:cNvSpPr>
+            <a:spLocks noGrp="1"/>
+          </p:cNvSpPr>
+          <p:nvPr>
+            <p:ph type="body" idx="1"/>
+          </p:nvPr>
+        </p:nvSpPr>
+        <p:spPr bwMode="auto"/>
+        <p:txBody>
+          <a:bodyPr/>
+          <a:lstStyle/>
+          <a:p>
+            <a:pPr>
+              <a:defRPr/>
+            </a:pPr>
+            <a:endParaRPr/>
+          </a:p>
+        </p:txBody>
+      </p:sp>
+      <p:sp>
+        <p:nvSpPr>
+          <p:cNvPr id="4" name="Slide Number Placeholder 3"/>
+          <p:cNvSpPr>
+            <a:spLocks noGrp="1"/>
+          </p:cNvSpPr>
+          <p:nvPr>
+            <p:ph type="sldNum" sz="quarter" idx="10"/>
+          </p:nvPr>
+        </p:nvSpPr>
+        <p:spPr bwMode="auto"/>
+        <p:txBody>
+          <a:bodyPr/>
+          <a:lstStyle/>
+          <a:p>
+            <a:pPr>
+              <a:defRPr/>
+            </a:pPr>
+            <a:fld id="{0C2834A0-F680-43FA-26A9-9722A690BDAD}" type="slidenum">
+              <a:rPr/>
+              <a:t/>
+            </a:fld>
+            <a:endParaRPr/>
+          </a:p>
+        </p:txBody>
+      </p:sp>
+    </p:spTree>
+  </p:cSld>
+</p:notes>
+</file>
+
+<file path=ppt/notesSlides/notesSlide23.xml><?xml version="1.0" encoding="utf-8"?>
+<p:notes xmlns:a="http://schemas.openxmlformats.org/drawingml/2006/main" xmlns:r="http://schemas.openxmlformats.org/officeDocument/2006/relationships" xmlns:p="http://schemas.openxmlformats.org/presentationml/2006/main" xmlns:m="http://schemas.openxmlformats.org/officeDocument/2006/math" xmlns:w="http://schemas.openxmlformats.org/wordprocessingml/2006/main">
+  <p:cSld name="">
+    <p:spTree>
+      <p:nvGrpSpPr>
+        <p:cNvPr id="1" name=""/>
+        <p:cNvGrpSpPr/>
+        <p:nvPr/>
+      </p:nvGrpSpPr>
+      <p:grpSpPr bwMode="auto">
+        <a:xfrm>
+          <a:off x="0" y="0"/>
+          <a:ext cx="0" cy="0"/>
+          <a:chOff x="0" y="0"/>
+          <a:chExt cx="0" cy="0"/>
+        </a:xfrm>
+      </p:grpSpPr>
+      <p:sp>
+        <p:nvSpPr>
+          <p:cNvPr id="2" name="Slide Image Placeholder 1"/>
+          <p:cNvSpPr>
+            <a:spLocks noChangeAspect="1" noGrp="1" noRot="1"/>
+          </p:cNvSpPr>
+          <p:nvPr>
+            <p:ph type="sldImg"/>
+          </p:nvPr>
+        </p:nvSpPr>
+        <p:spPr bwMode="auto"/>
+      </p:sp>
+      <p:sp>
+        <p:nvSpPr>
+          <p:cNvPr id="3" name="Notes Placeholder 2"/>
+          <p:cNvSpPr>
+            <a:spLocks noGrp="1"/>
+          </p:cNvSpPr>
+          <p:nvPr>
+            <p:ph type="body" idx="1"/>
+          </p:nvPr>
+        </p:nvSpPr>
+        <p:spPr bwMode="auto"/>
+        <p:txBody>
+          <a:bodyPr/>
+          <a:lstStyle/>
+          <a:p>
+            <a:pPr>
+              <a:defRPr/>
+            </a:pPr>
+            <a:endParaRPr/>
+          </a:p>
+        </p:txBody>
+      </p:sp>
+      <p:sp>
+        <p:nvSpPr>
+          <p:cNvPr id="4" name="Slide Number Placeholder 3"/>
+          <p:cNvSpPr>
+            <a:spLocks noGrp="1"/>
+          </p:cNvSpPr>
+          <p:nvPr>
+            <p:ph type="sldNum" sz="quarter" idx="10"/>
+          </p:nvPr>
+        </p:nvSpPr>
+        <p:spPr bwMode="auto"/>
+        <p:txBody>
+          <a:bodyPr/>
+          <a:lstStyle/>
+          <a:p>
+            <a:pPr>
+              <a:defRPr/>
+            </a:pPr>
+            <a:fld id="{68F86378-6F88-C84A-9366-E8580353DF62}" type="slidenum">
+              <a:rPr/>
+              <a:t/>
+            </a:fld>
+            <a:endParaRPr/>
+          </a:p>
+        </p:txBody>
+      </p:sp>
+    </p:spTree>
+  </p:cSld>
+</p:notes>
+</file>
+
+<file path=ppt/notesSlides/notesSlide24.xml><?xml version="1.0" encoding="utf-8"?>
+<p:notes xmlns:a="http://schemas.openxmlformats.org/drawingml/2006/main" xmlns:r="http://schemas.openxmlformats.org/officeDocument/2006/relationships" xmlns:p="http://schemas.openxmlformats.org/presentationml/2006/main" xmlns:m="http://schemas.openxmlformats.org/officeDocument/2006/math" xmlns:w="http://schemas.openxmlformats.org/wordprocessingml/2006/main">
+  <p:cSld name="">
+    <p:spTree>
+      <p:nvGrpSpPr>
+        <p:cNvPr id="1" name=""/>
+        <p:cNvGrpSpPr/>
+        <p:nvPr/>
+      </p:nvGrpSpPr>
+      <p:grpSpPr bwMode="auto">
+        <a:xfrm>
+          <a:off x="0" y="0"/>
+          <a:ext cx="0" cy="0"/>
+          <a:chOff x="0" y="0"/>
+          <a:chExt cx="0" cy="0"/>
+        </a:xfrm>
+      </p:grpSpPr>
+      <p:sp>
+        <p:nvSpPr>
+          <p:cNvPr id="2" name="Slide Image Placeholder 1"/>
+          <p:cNvSpPr>
+            <a:spLocks noChangeAspect="1" noGrp="1" noRot="1"/>
+          </p:cNvSpPr>
+          <p:nvPr>
+            <p:ph type="sldImg"/>
+          </p:nvPr>
+        </p:nvSpPr>
+        <p:spPr bwMode="auto"/>
+      </p:sp>
+      <p:sp>
+        <p:nvSpPr>
+          <p:cNvPr id="3" name="Notes Placeholder 2"/>
+          <p:cNvSpPr>
+            <a:spLocks noGrp="1"/>
+          </p:cNvSpPr>
+          <p:nvPr>
+            <p:ph type="body" idx="1"/>
+          </p:nvPr>
+        </p:nvSpPr>
+        <p:spPr bwMode="auto"/>
+        <p:txBody>
+          <a:bodyPr/>
+          <a:lstStyle/>
+          <a:p>
+            <a:pPr>
+              <a:defRPr/>
+            </a:pPr>
+            <a:endParaRPr/>
+          </a:p>
+        </p:txBody>
+      </p:sp>
+      <p:sp>
+        <p:nvSpPr>
+          <p:cNvPr id="4" name="Slide Number Placeholder 3"/>
+          <p:cNvSpPr>
+            <a:spLocks noGrp="1"/>
+          </p:cNvSpPr>
+          <p:nvPr>
+            <p:ph type="sldNum" sz="quarter" idx="10"/>
+          </p:nvPr>
+        </p:nvSpPr>
+        <p:spPr bwMode="auto"/>
+        <p:txBody>
+          <a:bodyPr/>
+          <a:lstStyle/>
+          <a:p>
+            <a:pPr>
+              <a:defRPr/>
+            </a:pPr>
+            <a:fld id="{BFDF3E21-EAC5-EF88-2020-77B93D42D093}" type="slidenum">
+              <a:rPr/>
+              <a:t/>
+            </a:fld>
+            <a:endParaRPr/>
+          </a:p>
+        </p:txBody>
+      </p:sp>
+    </p:spTree>
+  </p:cSld>
+</p:notes>
+</file>
+
+<file path=ppt/notesSlides/notesSlide25.xml><?xml version="1.0" encoding="utf-8"?>
+<p:notes xmlns:a="http://schemas.openxmlformats.org/drawingml/2006/main" xmlns:r="http://schemas.openxmlformats.org/officeDocument/2006/relationships" xmlns:p="http://schemas.openxmlformats.org/presentationml/2006/main" xmlns:m="http://schemas.openxmlformats.org/officeDocument/2006/math" xmlns:w="http://schemas.openxmlformats.org/wordprocessingml/2006/main">
+  <p:cSld name="">
+    <p:spTree>
+      <p:nvGrpSpPr>
+        <p:cNvPr id="1" name=""/>
+        <p:cNvGrpSpPr/>
+        <p:nvPr/>
+      </p:nvGrpSpPr>
+      <p:grpSpPr bwMode="auto">
+        <a:xfrm>
+          <a:off x="0" y="0"/>
+          <a:ext cx="0" cy="0"/>
+          <a:chOff x="0" y="0"/>
+          <a:chExt cx="0" cy="0"/>
+        </a:xfrm>
+      </p:grpSpPr>
+      <p:sp>
+        <p:nvSpPr>
+          <p:cNvPr id="2" name="Slide Image Placeholder 1"/>
+          <p:cNvSpPr>
+            <a:spLocks noChangeAspect="1" noGrp="1" noRot="1"/>
+          </p:cNvSpPr>
+          <p:nvPr>
+            <p:ph type="sldImg"/>
+          </p:nvPr>
+        </p:nvSpPr>
+        <p:spPr bwMode="auto"/>
+      </p:sp>
+      <p:sp>
+        <p:nvSpPr>
+          <p:cNvPr id="3" name="Notes Placeholder 2"/>
+          <p:cNvSpPr>
+            <a:spLocks noGrp="1"/>
+          </p:cNvSpPr>
+          <p:nvPr>
+            <p:ph type="body" idx="1"/>
+          </p:nvPr>
+        </p:nvSpPr>
+        <p:spPr bwMode="auto"/>
+        <p:txBody>
+          <a:bodyPr/>
+          <a:lstStyle/>
+          <a:p>
+            <a:pPr>
+              <a:defRPr/>
+            </a:pPr>
+            <a:endParaRPr/>
+          </a:p>
+        </p:txBody>
+      </p:sp>
+      <p:sp>
+        <p:nvSpPr>
+          <p:cNvPr id="4" name="Slide Number Placeholder 3"/>
+          <p:cNvSpPr>
+            <a:spLocks noGrp="1"/>
+          </p:cNvSpPr>
+          <p:nvPr>
+            <p:ph type="sldNum" sz="quarter" idx="10"/>
+          </p:nvPr>
+        </p:nvSpPr>
+        <p:spPr bwMode="auto"/>
+        <p:txBody>
+          <a:bodyPr/>
+          <a:lstStyle/>
+          <a:p>
+            <a:pPr>
+              <a:defRPr/>
+            </a:pPr>
+            <a:fld id="{4DCB0F82-C766-7D0C-078E-3257AEF8C039}" type="slidenum">
+              <a:rPr/>
+              <a:t/>
+            </a:fld>
+            <a:endParaRPr/>
+          </a:p>
+        </p:txBody>
+      </p:sp>
+    </p:spTree>
+  </p:cSld>
+</p:notes>
+</file>
+
+<file path=ppt/notesSlides/notesSlide26.xml><?xml version="1.0" encoding="utf-8"?>
+<p:notes xmlns:a="http://schemas.openxmlformats.org/drawingml/2006/main" xmlns:r="http://schemas.openxmlformats.org/officeDocument/2006/relationships" xmlns:p="http://schemas.openxmlformats.org/presentationml/2006/main" xmlns:m="http://schemas.openxmlformats.org/officeDocument/2006/math" xmlns:w="http://schemas.openxmlformats.org/wordprocessingml/2006/main">
+  <p:cSld name="">
+    <p:spTree>
+      <p:nvGrpSpPr>
+        <p:cNvPr id="1" name=""/>
+        <p:cNvGrpSpPr/>
+        <p:nvPr/>
+      </p:nvGrpSpPr>
+      <p:grpSpPr bwMode="auto">
+        <a:xfrm>
+          <a:off x="0" y="0"/>
+          <a:ext cx="0" cy="0"/>
+          <a:chOff x="0" y="0"/>
+          <a:chExt cx="0" cy="0"/>
+        </a:xfrm>
+      </p:grpSpPr>
+      <p:sp>
+        <p:nvSpPr>
+          <p:cNvPr id="2" name="Slide Image Placeholder 1"/>
+          <p:cNvSpPr>
+            <a:spLocks noChangeAspect="1" noGrp="1" noRot="1"/>
+          </p:cNvSpPr>
+          <p:nvPr>
+            <p:ph type="sldImg"/>
+          </p:nvPr>
+        </p:nvSpPr>
+        <p:spPr bwMode="auto"/>
+      </p:sp>
+      <p:sp>
+        <p:nvSpPr>
+          <p:cNvPr id="3" name="Notes Placeholder 2"/>
+          <p:cNvSpPr>
+            <a:spLocks noGrp="1"/>
+          </p:cNvSpPr>
+          <p:nvPr>
+            <p:ph type="body" idx="1"/>
+          </p:nvPr>
+        </p:nvSpPr>
+        <p:spPr bwMode="auto"/>
+        <p:txBody>
+          <a:bodyPr/>
+          <a:lstStyle/>
+          <a:p>
+            <a:pPr>
+              <a:defRPr/>
+            </a:pPr>
+            <a:endParaRPr/>
+          </a:p>
+        </p:txBody>
+      </p:sp>
+      <p:sp>
+        <p:nvSpPr>
+          <p:cNvPr id="4" name="Slide Number Placeholder 3"/>
+          <p:cNvSpPr>
+            <a:spLocks noGrp="1"/>
+          </p:cNvSpPr>
+          <p:nvPr>
+            <p:ph type="sldNum" sz="quarter" idx="10"/>
+          </p:nvPr>
+        </p:nvSpPr>
+        <p:spPr bwMode="auto"/>
+        <p:txBody>
+          <a:bodyPr/>
+          <a:lstStyle/>
+          <a:p>
+            <a:pPr>
+              <a:defRPr/>
+            </a:pPr>
+            <a:fld id="{10BDA484-557B-B68B-C812-8E76D673A502}" type="slidenum">
+              <a:rPr/>
+              <a:t/>
+            </a:fld>
+            <a:endParaRPr/>
+          </a:p>
+        </p:txBody>
+      </p:sp>
+    </p:spTree>
+  </p:cSld>
+</p:notes>
+</file>
+
+<file path=ppt/notesSlides/notesSlide27.xml><?xml version="1.0" encoding="utf-8"?>
+<p:notes xmlns:a="http://schemas.openxmlformats.org/drawingml/2006/main" xmlns:r="http://schemas.openxmlformats.org/officeDocument/2006/relationships" xmlns:p="http://schemas.openxmlformats.org/presentationml/2006/main" xmlns:m="http://schemas.openxmlformats.org/officeDocument/2006/math" xmlns:w="http://schemas.openxmlformats.org/wordprocessingml/2006/main">
+  <p:cSld name="">
+    <p:spTree>
+      <p:nvGrpSpPr>
+        <p:cNvPr id="1" name=""/>
+        <p:cNvGrpSpPr/>
+        <p:nvPr/>
+      </p:nvGrpSpPr>
+      <p:grpSpPr bwMode="auto">
+        <a:xfrm>
+          <a:off x="0" y="0"/>
+          <a:ext cx="0" cy="0"/>
+          <a:chOff x="0" y="0"/>
+          <a:chExt cx="0" cy="0"/>
+        </a:xfrm>
+      </p:grpSpPr>
+      <p:sp>
+        <p:nvSpPr>
+          <p:cNvPr id="2" name="Slide Image Placeholder 1"/>
+          <p:cNvSpPr>
+            <a:spLocks noChangeAspect="1" noGrp="1" noRot="1"/>
+          </p:cNvSpPr>
+          <p:nvPr>
+            <p:ph type="sldImg"/>
+          </p:nvPr>
+        </p:nvSpPr>
+        <p:spPr bwMode="auto"/>
+      </p:sp>
+      <p:sp>
+        <p:nvSpPr>
+          <p:cNvPr id="3" name="Notes Placeholder 2"/>
+          <p:cNvSpPr>
+            <a:spLocks noGrp="1"/>
+          </p:cNvSpPr>
+          <p:nvPr>
+            <p:ph type="body" idx="1"/>
+          </p:nvPr>
+        </p:nvSpPr>
+        <p:spPr bwMode="auto"/>
+        <p:txBody>
+          <a:bodyPr/>
+          <a:lstStyle/>
+          <a:p>
+            <a:pPr>
+              <a:defRPr/>
+            </a:pPr>
+            <a:endParaRPr/>
+          </a:p>
+        </p:txBody>
+      </p:sp>
+      <p:sp>
+        <p:nvSpPr>
+          <p:cNvPr id="4" name="Slide Number Placeholder 3"/>
+          <p:cNvSpPr>
+            <a:spLocks noGrp="1"/>
+          </p:cNvSpPr>
+          <p:nvPr>
+            <p:ph type="sldNum" sz="quarter" idx="10"/>
+          </p:nvPr>
+        </p:nvSpPr>
+        <p:spPr bwMode="auto"/>
+        <p:txBody>
+          <a:bodyPr/>
+          <a:lstStyle/>
+          <a:p>
+            <a:pPr>
+              <a:defRPr/>
+            </a:pPr>
+            <a:fld id="{55D2A8C9-201D-C80B-2E0C-2732A9FAE0D9}" type="slidenum">
+              <a:rPr/>
+              <a:t/>
+            </a:fld>
+            <a:endParaRPr/>
+          </a:p>
+        </p:txBody>
+      </p:sp>
+    </p:spTree>
+  </p:cSld>
+</p:notes>
+</file>
+
+<file path=ppt/notesSlides/notesSlide28.xml><?xml version="1.0" encoding="utf-8"?>
+<p:notes xmlns:a="http://schemas.openxmlformats.org/drawingml/2006/main" xmlns:r="http://schemas.openxmlformats.org/officeDocument/2006/relationships" xmlns:p="http://schemas.openxmlformats.org/presentationml/2006/main" xmlns:m="http://schemas.openxmlformats.org/officeDocument/2006/math" xmlns:w="http://schemas.openxmlformats.org/wordprocessingml/2006/main">
+  <p:cSld name="">
+    <p:spTree>
+      <p:nvGrpSpPr>
+        <p:cNvPr id="1" name=""/>
+        <p:cNvGrpSpPr/>
+        <p:nvPr/>
+      </p:nvGrpSpPr>
+      <p:grpSpPr bwMode="auto">
+        <a:xfrm>
+          <a:off x="0" y="0"/>
+          <a:ext cx="0" cy="0"/>
+          <a:chOff x="0" y="0"/>
+          <a:chExt cx="0" cy="0"/>
+        </a:xfrm>
+      </p:grpSpPr>
+      <p:sp>
+        <p:nvSpPr>
+          <p:cNvPr id="2" name="Slide Image Placeholder 1"/>
+          <p:cNvSpPr>
+            <a:spLocks noChangeAspect="1" noGrp="1" noRot="1"/>
+          </p:cNvSpPr>
+          <p:nvPr>
+            <p:ph type="sldImg"/>
+          </p:nvPr>
+        </p:nvSpPr>
+        <p:spPr bwMode="auto"/>
+      </p:sp>
+      <p:sp>
+        <p:nvSpPr>
+          <p:cNvPr id="3" name="Notes Placeholder 2"/>
+          <p:cNvSpPr>
+            <a:spLocks noGrp="1"/>
+          </p:cNvSpPr>
+          <p:nvPr>
+            <p:ph type="body" idx="1"/>
+          </p:nvPr>
+        </p:nvSpPr>
+        <p:spPr bwMode="auto"/>
+        <p:txBody>
+          <a:bodyPr/>
+          <a:lstStyle/>
+          <a:p>
+            <a:pPr>
+              <a:defRPr/>
+            </a:pPr>
+            <a:endParaRPr/>
+          </a:p>
+        </p:txBody>
+      </p:sp>
+      <p:sp>
+        <p:nvSpPr>
+          <p:cNvPr id="4" name="Slide Number Placeholder 3"/>
+          <p:cNvSpPr>
+            <a:spLocks noGrp="1"/>
+          </p:cNvSpPr>
+          <p:nvPr>
+            <p:ph type="sldNum" sz="quarter" idx="10"/>
+          </p:nvPr>
+        </p:nvSpPr>
+        <p:spPr bwMode="auto"/>
+        <p:txBody>
+          <a:bodyPr/>
+          <a:lstStyle/>
+          <a:p>
+            <a:pPr>
+              <a:defRPr/>
+            </a:pPr>
+            <a:fld id="{AA2E44DA-92DD-8CC7-CF8C-303D6B34B270}" type="slidenum">
+              <a:rPr/>
+              <a:t/>
+            </a:fld>
+            <a:endParaRPr/>
+          </a:p>
+        </p:txBody>
+      </p:sp>
+    </p:spTree>
+  </p:cSld>
+</p:notes>
+</file>
+
+<file path=ppt/notesSlides/notesSlide29.xml><?xml version="1.0" encoding="utf-8"?>
+<p:notes xmlns:a="http://schemas.openxmlformats.org/drawingml/2006/main" xmlns:r="http://schemas.openxmlformats.org/officeDocument/2006/relationships" xmlns:p="http://schemas.openxmlformats.org/presentationml/2006/main" xmlns:m="http://schemas.openxmlformats.org/officeDocument/2006/math" xmlns:w="http://schemas.openxmlformats.org/wordprocessingml/2006/main">
+  <p:cSld name="">
+    <p:spTree>
+      <p:nvGrpSpPr>
+        <p:cNvPr id="1" name=""/>
+        <p:cNvGrpSpPr/>
+        <p:nvPr/>
+      </p:nvGrpSpPr>
+      <p:grpSpPr bwMode="auto">
+        <a:xfrm>
+          <a:off x="0" y="0"/>
+          <a:ext cx="0" cy="0"/>
+          <a:chOff x="0" y="0"/>
+          <a:chExt cx="0" cy="0"/>
+        </a:xfrm>
+      </p:grpSpPr>
+      <p:sp>
+        <p:nvSpPr>
+          <p:cNvPr id="2" name="Slide Image Placeholder 1"/>
+          <p:cNvSpPr>
+            <a:spLocks noChangeAspect="1" noGrp="1" noRot="1"/>
+          </p:cNvSpPr>
+          <p:nvPr>
+            <p:ph type="sldImg"/>
+          </p:nvPr>
+        </p:nvSpPr>
+        <p:spPr bwMode="auto"/>
+      </p:sp>
+      <p:sp>
+        <p:nvSpPr>
+          <p:cNvPr id="3" name="Notes Placeholder 2"/>
+          <p:cNvSpPr>
+            <a:spLocks noGrp="1"/>
+          </p:cNvSpPr>
+          <p:nvPr>
+            <p:ph type="body" idx="1"/>
+          </p:nvPr>
+        </p:nvSpPr>
+        <p:spPr bwMode="auto"/>
+        <p:txBody>
+          <a:bodyPr/>
+          <a:lstStyle/>
+          <a:p>
+            <a:pPr>
+              <a:defRPr/>
+            </a:pPr>
+            <a:endParaRPr/>
+          </a:p>
+        </p:txBody>
+      </p:sp>
+      <p:sp>
+        <p:nvSpPr>
+          <p:cNvPr id="4" name="Slide Number Placeholder 3"/>
+          <p:cNvSpPr>
+            <a:spLocks noGrp="1"/>
+          </p:cNvSpPr>
+          <p:nvPr>
+            <p:ph type="sldNum" sz="quarter" idx="10"/>
+          </p:nvPr>
+        </p:nvSpPr>
+        <p:spPr bwMode="auto"/>
+        <p:txBody>
+          <a:bodyPr/>
+          <a:lstStyle/>
+          <a:p>
+            <a:pPr>
+              <a:defRPr/>
+            </a:pPr>
+            <a:fld id="{AD831555-04E1-A01A-C77F-24F6668D9968}" type="slidenum">
+              <a:rPr/>
+              <a:t/>
+            </a:fld>
+            <a:endParaRPr/>
+          </a:p>
+        </p:txBody>
+      </p:sp>
+    </p:spTree>
+  </p:cSld>
+</p:notes>
+</file>
+
+<file path=ppt/notesSlides/notesSlide3.xml><?xml version="1.0" encoding="utf-8"?>
+<p:notes xmlns:a="http://schemas.openxmlformats.org/drawingml/2006/main" xmlns:r="http://schemas.openxmlformats.org/officeDocument/2006/relationships" xmlns:p="http://schemas.openxmlformats.org/presentationml/2006/main" xmlns:m="http://schemas.openxmlformats.org/officeDocument/2006/math" xmlns:w="http://schemas.openxmlformats.org/wordprocessingml/2006/main">
+  <p:cSld name="">
+    <p:spTree>
+      <p:nvGrpSpPr>
+        <p:cNvPr id="1" name=""/>
+        <p:cNvGrpSpPr/>
+        <p:nvPr/>
+      </p:nvGrpSpPr>
+      <p:grpSpPr bwMode="auto">
+        <a:xfrm>
+          <a:off x="0" y="0"/>
+          <a:ext cx="0" cy="0"/>
+          <a:chOff x="0" y="0"/>
+          <a:chExt cx="0" cy="0"/>
+        </a:xfrm>
+      </p:grpSpPr>
+      <p:sp>
+        <p:nvSpPr>
+          <p:cNvPr id="2" name="Slide Image Placeholder 1"/>
+          <p:cNvSpPr>
+            <a:spLocks noChangeAspect="1" noGrp="1" noRot="1"/>
+          </p:cNvSpPr>
+          <p:nvPr>
+            <p:ph type="sldImg"/>
+          </p:nvPr>
+        </p:nvSpPr>
+        <p:spPr bwMode="auto"/>
+      </p:sp>
+      <p:sp>
+        <p:nvSpPr>
+          <p:cNvPr id="3" name="Notes Placeholder 2"/>
+          <p:cNvSpPr>
+            <a:spLocks noGrp="1"/>
+          </p:cNvSpPr>
+          <p:nvPr>
+            <p:ph type="body" idx="1"/>
+          </p:nvPr>
+        </p:nvSpPr>
+        <p:spPr bwMode="auto"/>
+        <p:txBody>
+          <a:bodyPr/>
+          <a:lstStyle/>
+          <a:p>
+            <a:pPr>
+              <a:defRPr/>
+            </a:pPr>
+            <a:endParaRPr/>
+          </a:p>
+        </p:txBody>
+      </p:sp>
+      <p:sp>
+        <p:nvSpPr>
+          <p:cNvPr id="4" name="Slide Number Placeholder 3"/>
+          <p:cNvSpPr>
+            <a:spLocks noGrp="1"/>
+          </p:cNvSpPr>
+          <p:nvPr>
+            <p:ph type="sldNum" sz="quarter" idx="10"/>
+          </p:nvPr>
+        </p:nvSpPr>
+        <p:spPr bwMode="auto"/>
+        <p:txBody>
+          <a:bodyPr/>
+          <a:lstStyle/>
+          <a:p>
+            <a:pPr>
+              <a:defRPr/>
+            </a:pPr>
+            <a:fld id="{2482DEE0-A065-95E9-18DE-40ABF10A473B}" type="slidenum">
+              <a:rPr/>
+              <a:t/>
+            </a:fld>
+            <a:endParaRPr/>
+          </a:p>
+        </p:txBody>
+      </p:sp>
+    </p:spTree>
+  </p:cSld>
+</p:notes>
+</file>
+
+<file path=ppt/notesSlides/notesSlide30.xml><?xml version="1.0" encoding="utf-8"?>
+<p:notes xmlns:a="http://schemas.openxmlformats.org/drawingml/2006/main" xmlns:r="http://schemas.openxmlformats.org/officeDocument/2006/relationships" xmlns:p="http://schemas.openxmlformats.org/presentationml/2006/main" xmlns:m="http://schemas.openxmlformats.org/officeDocument/2006/math" xmlns:w="http://schemas.openxmlformats.org/wordprocessingml/2006/main">
+  <p:cSld name="">
+    <p:spTree>
+      <p:nvGrpSpPr>
+        <p:cNvPr id="1" name=""/>
+        <p:cNvGrpSpPr/>
+        <p:nvPr/>
+      </p:nvGrpSpPr>
+      <p:grpSpPr bwMode="auto">
+        <a:xfrm>
+          <a:off x="0" y="0"/>
+          <a:ext cx="0" cy="0"/>
+          <a:chOff x="0" y="0"/>
+          <a:chExt cx="0" cy="0"/>
+        </a:xfrm>
+      </p:grpSpPr>
+      <p:sp>
+        <p:nvSpPr>
+          <p:cNvPr id="2" name="Slide Image Placeholder 1"/>
+          <p:cNvSpPr>
+            <a:spLocks noChangeAspect="1" noGrp="1" noRot="1"/>
+          </p:cNvSpPr>
+          <p:nvPr>
+            <p:ph type="sldImg"/>
+          </p:nvPr>
+        </p:nvSpPr>
+        <p:spPr bwMode="auto"/>
+      </p:sp>
+      <p:sp>
+        <p:nvSpPr>
+          <p:cNvPr id="3" name="Notes Placeholder 2"/>
+          <p:cNvSpPr>
+            <a:spLocks noGrp="1"/>
+          </p:cNvSpPr>
+          <p:nvPr>
+            <p:ph type="body" idx="1"/>
+          </p:nvPr>
+        </p:nvSpPr>
+        <p:spPr bwMode="auto"/>
+        <p:txBody>
+          <a:bodyPr/>
+          <a:lstStyle/>
+          <a:p>
+            <a:pPr>
+              <a:defRPr/>
+            </a:pPr>
+            <a:endParaRPr/>
+          </a:p>
+        </p:txBody>
+      </p:sp>
+      <p:sp>
+        <p:nvSpPr>
+          <p:cNvPr id="4" name="Slide Number Placeholder 3"/>
+          <p:cNvSpPr>
+            <a:spLocks noGrp="1"/>
+          </p:cNvSpPr>
+          <p:nvPr>
+            <p:ph type="sldNum" sz="quarter" idx="10"/>
+          </p:nvPr>
+        </p:nvSpPr>
+        <p:spPr bwMode="auto"/>
+        <p:txBody>
+          <a:bodyPr/>
+          <a:lstStyle/>
+          <a:p>
+            <a:pPr>
+              <a:defRPr/>
+            </a:pPr>
+            <a:fld id="{D6AAAE50-9A85-E21A-B6EF-CA463076942A}" type="slidenum">
+              <a:rPr/>
+              <a:t/>
+            </a:fld>
+            <a:endParaRPr/>
+          </a:p>
+        </p:txBody>
+      </p:sp>
+    </p:spTree>
+  </p:cSld>
+</p:notes>
+</file>
+
+<file path=ppt/notesSlides/notesSlide31.xml><?xml version="1.0" encoding="utf-8"?>
+<p:notes xmlns:a="http://schemas.openxmlformats.org/drawingml/2006/main" xmlns:r="http://schemas.openxmlformats.org/officeDocument/2006/relationships" xmlns:p="http://schemas.openxmlformats.org/presentationml/2006/main" xmlns:m="http://schemas.openxmlformats.org/officeDocument/2006/math" xmlns:w="http://schemas.openxmlformats.org/wordprocessingml/2006/main">
+  <p:cSld name="">
+    <p:spTree>
+      <p:nvGrpSpPr>
+        <p:cNvPr id="1" name=""/>
+        <p:cNvGrpSpPr/>
+        <p:nvPr/>
+      </p:nvGrpSpPr>
+      <p:grpSpPr bwMode="auto">
+        <a:xfrm>
+          <a:off x="0" y="0"/>
+          <a:ext cx="0" cy="0"/>
+          <a:chOff x="0" y="0"/>
+          <a:chExt cx="0" cy="0"/>
+        </a:xfrm>
+      </p:grpSpPr>
+      <p:sp>
+        <p:nvSpPr>
+          <p:cNvPr id="2" name="Slide Image Placeholder 1"/>
+          <p:cNvSpPr>
+            <a:spLocks noChangeAspect="1" noGrp="1" noRot="1"/>
+          </p:cNvSpPr>
+          <p:nvPr>
+            <p:ph type="sldImg"/>
+          </p:nvPr>
+        </p:nvSpPr>
+        <p:spPr bwMode="auto"/>
+      </p:sp>
+      <p:sp>
+        <p:nvSpPr>
+          <p:cNvPr id="3" name="Notes Placeholder 2"/>
+          <p:cNvSpPr>
+            <a:spLocks noGrp="1"/>
+          </p:cNvSpPr>
+          <p:nvPr>
+            <p:ph type="body" idx="1"/>
+          </p:nvPr>
+        </p:nvSpPr>
+        <p:spPr bwMode="auto"/>
+        <p:txBody>
+          <a:bodyPr/>
+          <a:lstStyle/>
+          <a:p>
+            <a:pPr>
+              <a:defRPr/>
+            </a:pPr>
+            <a:endParaRPr/>
+          </a:p>
+        </p:txBody>
+      </p:sp>
+      <p:sp>
+        <p:nvSpPr>
+          <p:cNvPr id="4" name="Slide Number Placeholder 3"/>
+          <p:cNvSpPr>
+            <a:spLocks noGrp="1"/>
+          </p:cNvSpPr>
+          <p:nvPr>
+            <p:ph type="sldNum" sz="quarter" idx="10"/>
+          </p:nvPr>
+        </p:nvSpPr>
+        <p:spPr bwMode="auto"/>
+        <p:txBody>
+          <a:bodyPr/>
+          <a:lstStyle/>
+          <a:p>
+            <a:pPr>
+              <a:defRPr/>
+            </a:pPr>
+            <a:fld id="{7DBD005B-0248-F75C-9939-1B9E1BD276B3}" type="slidenum">
+              <a:rPr/>
+              <a:t/>
+            </a:fld>
+            <a:endParaRPr/>
+          </a:p>
+        </p:txBody>
+      </p:sp>
+    </p:spTree>
+  </p:cSld>
+</p:notes>
+</file>
+
+<file path=ppt/notesSlides/notesSlide32.xml><?xml version="1.0" encoding="utf-8"?>
+<p:notes xmlns:a="http://schemas.openxmlformats.org/drawingml/2006/main" xmlns:r="http://schemas.openxmlformats.org/officeDocument/2006/relationships" xmlns:p="http://schemas.openxmlformats.org/presentationml/2006/main" xmlns:m="http://schemas.openxmlformats.org/officeDocument/2006/math" xmlns:w="http://schemas.openxmlformats.org/wordprocessingml/2006/main">
+  <p:cSld name="">
+    <p:spTree>
+      <p:nvGrpSpPr>
+        <p:cNvPr id="1" name=""/>
+        <p:cNvGrpSpPr/>
+        <p:nvPr/>
+      </p:nvGrpSpPr>
+      <p:grpSpPr bwMode="auto">
+        <a:xfrm>
+          <a:off x="0" y="0"/>
+          <a:ext cx="0" cy="0"/>
+          <a:chOff x="0" y="0"/>
+          <a:chExt cx="0" cy="0"/>
+        </a:xfrm>
+      </p:grpSpPr>
+      <p:sp>
+        <p:nvSpPr>
+          <p:cNvPr id="1829120400" name="Slide Image Placeholder 1"/>
+          <p:cNvSpPr>
+            <a:spLocks noChangeAspect="1" noGrp="1" noRot="1"/>
+          </p:cNvSpPr>
+          <p:nvPr>
+            <p:ph type="sldImg"/>
+          </p:nvPr>
+        </p:nvSpPr>
+        <p:spPr bwMode="auto"/>
+      </p:sp>
+      <p:sp>
+        <p:nvSpPr>
+          <p:cNvPr id="959952110" name="Notes Placeholder 2"/>
+          <p:cNvSpPr>
+            <a:spLocks noGrp="1"/>
+          </p:cNvSpPr>
+          <p:nvPr>
+            <p:ph type="body" idx="1"/>
+          </p:nvPr>
+        </p:nvSpPr>
+        <p:spPr bwMode="auto"/>
+        <p:txBody>
+          <a:bodyPr/>
+          <a:lstStyle/>
+          <a:p>
+            <a:pPr>
+              <a:defRPr/>
+            </a:pPr>
+            <a:endParaRPr/>
+          </a:p>
+        </p:txBody>
+      </p:sp>
+      <p:sp>
+        <p:nvSpPr>
+          <p:cNvPr id="1475563136" name="Slide Number Placeholder 3"/>
+          <p:cNvSpPr>
+            <a:spLocks noGrp="1"/>
+          </p:cNvSpPr>
+          <p:nvPr>
+            <p:ph type="sldNum" sz="quarter" idx="10"/>
+          </p:nvPr>
+        </p:nvSpPr>
+        <p:spPr bwMode="auto"/>
+        <p:txBody>
+          <a:bodyPr/>
+          <a:lstStyle/>
+          <a:p>
+            <a:pPr>
+              <a:defRPr/>
+            </a:pPr>
+            <a:fld id="{0F67F1F0-237B-F23E-1659-633F1480265F}" type="slidenum">
+              <a:rPr/>
+              <a:t/>
+            </a:fld>
+            <a:endParaRPr/>
+          </a:p>
+        </p:txBody>
+      </p:sp>
+    </p:spTree>
+  </p:cSld>
+</p:notes>
+</file>
+
+<file path=ppt/notesSlides/notesSlide33.xml><?xml version="1.0" encoding="utf-8"?>
+<p:notes xmlns:a="http://schemas.openxmlformats.org/drawingml/2006/main" xmlns:r="http://schemas.openxmlformats.org/officeDocument/2006/relationships" xmlns:p="http://schemas.openxmlformats.org/presentationml/2006/main" xmlns:m="http://schemas.openxmlformats.org/officeDocument/2006/math" xmlns:w="http://schemas.openxmlformats.org/wordprocessingml/2006/main">
+  <p:cSld name="">
+    <p:spTree>
+      <p:nvGrpSpPr>
+        <p:cNvPr id="1" name=""/>
+        <p:cNvGrpSpPr/>
+        <p:nvPr/>
+      </p:nvGrpSpPr>
+      <p:grpSpPr bwMode="auto">
+        <a:xfrm>
+          <a:off x="0" y="0"/>
+          <a:ext cx="0" cy="0"/>
+          <a:chOff x="0" y="0"/>
+          <a:chExt cx="0" cy="0"/>
+        </a:xfrm>
+      </p:grpSpPr>
+      <p:sp>
+        <p:nvSpPr>
+          <p:cNvPr id="2" name="Slide Image Placeholder 1"/>
+          <p:cNvSpPr>
+            <a:spLocks noChangeAspect="1" noGrp="1" noRot="1"/>
+          </p:cNvSpPr>
+          <p:nvPr>
+            <p:ph type="sldImg"/>
+          </p:nvPr>
+        </p:nvSpPr>
+        <p:spPr bwMode="auto"/>
+      </p:sp>
+      <p:sp>
+        <p:nvSpPr>
+          <p:cNvPr id="3" name="Notes Placeholder 2"/>
+          <p:cNvSpPr>
+            <a:spLocks noGrp="1"/>
+          </p:cNvSpPr>
+          <p:nvPr>
+            <p:ph type="body" idx="1"/>
+          </p:nvPr>
+        </p:nvSpPr>
+        <p:spPr bwMode="auto"/>
+        <p:txBody>
+          <a:bodyPr/>
+          <a:lstStyle/>
+          <a:p>
+            <a:pPr>
+              <a:defRPr/>
+            </a:pPr>
+            <a:endParaRPr/>
+          </a:p>
+        </p:txBody>
+      </p:sp>
+      <p:sp>
+        <p:nvSpPr>
+          <p:cNvPr id="4" name="Slide Number Placeholder 3"/>
+          <p:cNvSpPr>
+            <a:spLocks noGrp="1"/>
+          </p:cNvSpPr>
+          <p:nvPr>
+            <p:ph type="sldNum" sz="quarter" idx="10"/>
+          </p:nvPr>
+        </p:nvSpPr>
+        <p:spPr bwMode="auto"/>
+        <p:txBody>
+          <a:bodyPr/>
+          <a:lstStyle/>
+          <a:p>
+            <a:pPr>
+              <a:defRPr/>
+            </a:pPr>
+            <a:fld id="{E8B6C03C-C761-62EA-F18E-20F428FBCAFB}" type="slidenum">
+              <a:rPr/>
+              <a:t/>
+            </a:fld>
+            <a:endParaRPr/>
+          </a:p>
+        </p:txBody>
+      </p:sp>
+    </p:spTree>
+  </p:cSld>
+</p:notes>
+</file>
+
+<file path=ppt/notesSlides/notesSlide4.xml><?xml version="1.0" encoding="utf-8"?>
+<p:notes xmlns:a="http://schemas.openxmlformats.org/drawingml/2006/main" xmlns:r="http://schemas.openxmlformats.org/officeDocument/2006/relationships" xmlns:p="http://schemas.openxmlformats.org/presentationml/2006/main" xmlns:m="http://schemas.openxmlformats.org/officeDocument/2006/math" xmlns:w="http://schemas.openxmlformats.org/wordprocessingml/2006/main">
+  <p:cSld name="">
+    <p:spTree>
+      <p:nvGrpSpPr>
+        <p:cNvPr id="1" name=""/>
+        <p:cNvGrpSpPr/>
+        <p:nvPr/>
+      </p:nvGrpSpPr>
+      <p:grpSpPr bwMode="auto">
+        <a:xfrm>
+          <a:off x="0" y="0"/>
+          <a:ext cx="0" cy="0"/>
+          <a:chOff x="0" y="0"/>
+          <a:chExt cx="0" cy="0"/>
+        </a:xfrm>
+      </p:grpSpPr>
+      <p:sp>
+        <p:nvSpPr>
+          <p:cNvPr id="2" name="Slide Image Placeholder 1"/>
+          <p:cNvSpPr>
+            <a:spLocks noChangeAspect="1" noGrp="1" noRot="1"/>
+          </p:cNvSpPr>
+          <p:nvPr>
+            <p:ph type="sldImg"/>
+          </p:nvPr>
+        </p:nvSpPr>
+        <p:spPr bwMode="auto"/>
+      </p:sp>
+      <p:sp>
+        <p:nvSpPr>
+          <p:cNvPr id="3" name="Notes Placeholder 2"/>
+          <p:cNvSpPr>
+            <a:spLocks noGrp="1"/>
+          </p:cNvSpPr>
+          <p:nvPr>
+            <p:ph type="body" idx="1"/>
+          </p:nvPr>
+        </p:nvSpPr>
+        <p:spPr bwMode="auto"/>
+        <p:txBody>
+          <a:bodyPr/>
+          <a:lstStyle/>
+          <a:p>
+            <a:pPr>
+              <a:defRPr/>
+            </a:pPr>
+            <a:endParaRPr/>
+          </a:p>
+        </p:txBody>
+      </p:sp>
+      <p:sp>
+        <p:nvSpPr>
+          <p:cNvPr id="4" name="Slide Number Placeholder 3"/>
+          <p:cNvSpPr>
+            <a:spLocks noGrp="1"/>
+          </p:cNvSpPr>
+          <p:nvPr>
+            <p:ph type="sldNum" sz="quarter" idx="10"/>
+          </p:nvPr>
+        </p:nvSpPr>
+        <p:spPr bwMode="auto"/>
+        <p:txBody>
+          <a:bodyPr/>
+          <a:lstStyle/>
+          <a:p>
+            <a:pPr>
+              <a:defRPr/>
+            </a:pPr>
+            <a:fld id="{1EB9ADFF-C887-BBD4-D3A3-04412007DED5}" type="slidenum">
+              <a:rPr/>
+              <a:t/>
+            </a:fld>
+            <a:endParaRPr/>
+          </a:p>
+        </p:txBody>
+      </p:sp>
+    </p:spTree>
+  </p:cSld>
+</p:notes>
+</file>
+
+<file path=ppt/notesSlides/notesSlide5.xml><?xml version="1.0" encoding="utf-8"?>
+<p:notes xmlns:a="http://schemas.openxmlformats.org/drawingml/2006/main" xmlns:r="http://schemas.openxmlformats.org/officeDocument/2006/relationships" xmlns:p="http://schemas.openxmlformats.org/presentationml/2006/main" xmlns:m="http://schemas.openxmlformats.org/officeDocument/2006/math" xmlns:w="http://schemas.openxmlformats.org/wordprocessingml/2006/main">
+  <p:cSld name="">
+    <p:spTree>
+      <p:nvGrpSpPr>
+        <p:cNvPr id="1" name=""/>
+        <p:cNvGrpSpPr/>
+        <p:nvPr/>
+      </p:nvGrpSpPr>
+      <p:grpSpPr bwMode="auto">
+        <a:xfrm>
+          <a:off x="0" y="0"/>
+          <a:ext cx="0" cy="0"/>
+          <a:chOff x="0" y="0"/>
+          <a:chExt cx="0" cy="0"/>
+        </a:xfrm>
+      </p:grpSpPr>
+      <p:sp>
+        <p:nvSpPr>
+          <p:cNvPr id="2" name="Slide Image Placeholder 1"/>
+          <p:cNvSpPr>
+            <a:spLocks noChangeAspect="1" noGrp="1" noRot="1"/>
+          </p:cNvSpPr>
+          <p:nvPr>
+            <p:ph type="sldImg"/>
+          </p:nvPr>
+        </p:nvSpPr>
+        <p:spPr bwMode="auto"/>
+      </p:sp>
+      <p:sp>
+        <p:nvSpPr>
+          <p:cNvPr id="3" name="Notes Placeholder 2"/>
+          <p:cNvSpPr>
+            <a:spLocks noGrp="1"/>
+          </p:cNvSpPr>
+          <p:nvPr>
+            <p:ph type="body" idx="1"/>
+          </p:nvPr>
+        </p:nvSpPr>
+        <p:spPr bwMode="auto"/>
+        <p:txBody>
+          <a:bodyPr/>
+          <a:lstStyle/>
+          <a:p>
+            <a:pPr>
+              <a:defRPr/>
+            </a:pPr>
+            <a:endParaRPr/>
+          </a:p>
+        </p:txBody>
+      </p:sp>
+      <p:sp>
+        <p:nvSpPr>
+          <p:cNvPr id="4" name="Slide Number Placeholder 3"/>
+          <p:cNvSpPr>
+            <a:spLocks noGrp="1"/>
+          </p:cNvSpPr>
+          <p:nvPr>
+            <p:ph type="sldNum" sz="quarter" idx="10"/>
+          </p:nvPr>
+        </p:nvSpPr>
+        <p:spPr bwMode="auto"/>
+        <p:txBody>
+          <a:bodyPr/>
+          <a:lstStyle/>
+          <a:p>
+            <a:pPr>
+              <a:defRPr/>
+            </a:pPr>
+            <a:fld id="{1FE55000-1B94-0CE1-D5AB-A33517104B3A}" type="slidenum">
+              <a:rPr/>
+              <a:t/>
+            </a:fld>
+            <a:endParaRPr/>
+          </a:p>
+        </p:txBody>
+      </p:sp>
+    </p:spTree>
+  </p:cSld>
+</p:notes>
+</file>
+
+<file path=ppt/notesSlides/notesSlide6.xml><?xml version="1.0" encoding="utf-8"?>
+<p:notes xmlns:a="http://schemas.openxmlformats.org/drawingml/2006/main" xmlns:r="http://schemas.openxmlformats.org/officeDocument/2006/relationships" xmlns:p="http://schemas.openxmlformats.org/presentationml/2006/main" xmlns:m="http://schemas.openxmlformats.org/officeDocument/2006/math" xmlns:w="http://schemas.openxmlformats.org/wordprocessingml/2006/main">
+  <p:cSld name="">
+    <p:spTree>
+      <p:nvGrpSpPr>
+        <p:cNvPr id="1" name=""/>
+        <p:cNvGrpSpPr/>
+        <p:nvPr/>
+      </p:nvGrpSpPr>
+      <p:grpSpPr bwMode="auto">
+        <a:xfrm>
+          <a:off x="0" y="0"/>
+          <a:ext cx="0" cy="0"/>
+          <a:chOff x="0" y="0"/>
+          <a:chExt cx="0" cy="0"/>
+        </a:xfrm>
+      </p:grpSpPr>
+      <p:sp>
+        <p:nvSpPr>
+          <p:cNvPr id="2" name="Slide Image Placeholder 1"/>
+          <p:cNvSpPr>
+            <a:spLocks noChangeAspect="1" noGrp="1" noRot="1"/>
+          </p:cNvSpPr>
+          <p:nvPr>
+            <p:ph type="sldImg"/>
+          </p:nvPr>
+        </p:nvSpPr>
+        <p:spPr bwMode="auto"/>
+      </p:sp>
+      <p:sp>
+        <p:nvSpPr>
+          <p:cNvPr id="3" name="Notes Placeholder 2"/>
+          <p:cNvSpPr>
+            <a:spLocks noGrp="1"/>
+          </p:cNvSpPr>
+          <p:nvPr>
+            <p:ph type="body" idx="1"/>
+          </p:nvPr>
+        </p:nvSpPr>
+        <p:spPr bwMode="auto"/>
+        <p:txBody>
+          <a:bodyPr/>
+          <a:lstStyle/>
+          <a:p>
+            <a:pPr>
+              <a:defRPr/>
+            </a:pPr>
+            <a:endParaRPr/>
+          </a:p>
+        </p:txBody>
+      </p:sp>
+      <p:sp>
+        <p:nvSpPr>
+          <p:cNvPr id="4" name="Slide Number Placeholder 3"/>
+          <p:cNvSpPr>
+            <a:spLocks noGrp="1"/>
+          </p:cNvSpPr>
+          <p:nvPr>
+            <p:ph type="sldNum" sz="quarter" idx="10"/>
+          </p:nvPr>
+        </p:nvSpPr>
+        <p:spPr bwMode="auto"/>
+        <p:txBody>
+          <a:bodyPr/>
+          <a:lstStyle/>
+          <a:p>
+            <a:pPr>
+              <a:defRPr/>
+            </a:pPr>
+            <a:fld id="{3E2B6319-1332-584E-8E7E-37E66817A40B}" type="slidenum">
+              <a:rPr/>
+              <a:t/>
+            </a:fld>
+            <a:endParaRPr/>
+          </a:p>
+        </p:txBody>
+      </p:sp>
+    </p:spTree>
+  </p:cSld>
+</p:notes>
+</file>
+
+<file path=ppt/notesSlides/notesSlide7.xml><?xml version="1.0" encoding="utf-8"?>
+<p:notes xmlns:a="http://schemas.openxmlformats.org/drawingml/2006/main" xmlns:r="http://schemas.openxmlformats.org/officeDocument/2006/relationships" xmlns:p="http://schemas.openxmlformats.org/presentationml/2006/main" xmlns:m="http://schemas.openxmlformats.org/officeDocument/2006/math" xmlns:w="http://schemas.openxmlformats.org/wordprocessingml/2006/main">
+  <p:cSld name="">
+    <p:spTree>
+      <p:nvGrpSpPr>
+        <p:cNvPr id="1" name=""/>
+        <p:cNvGrpSpPr/>
+        <p:nvPr/>
+      </p:nvGrpSpPr>
+      <p:grpSpPr bwMode="auto">
+        <a:xfrm>
+          <a:off x="0" y="0"/>
+          <a:ext cx="0" cy="0"/>
+          <a:chOff x="0" y="0"/>
+          <a:chExt cx="0" cy="0"/>
+        </a:xfrm>
+      </p:grpSpPr>
+      <p:sp>
+        <p:nvSpPr>
+          <p:cNvPr id="2" name="Slide Image Placeholder 1"/>
+          <p:cNvSpPr>
+            <a:spLocks noChangeAspect="1" noGrp="1" noRot="1"/>
+          </p:cNvSpPr>
+          <p:nvPr>
+            <p:ph type="sldImg"/>
+          </p:nvPr>
+        </p:nvSpPr>
+        <p:spPr bwMode="auto"/>
+      </p:sp>
+      <p:sp>
+        <p:nvSpPr>
+          <p:cNvPr id="3" name="Notes Placeholder 2"/>
+          <p:cNvSpPr>
+            <a:spLocks noGrp="1"/>
+          </p:cNvSpPr>
+          <p:nvPr>
+            <p:ph type="body" idx="1"/>
+          </p:nvPr>
+        </p:nvSpPr>
+        <p:spPr bwMode="auto"/>
+        <p:txBody>
+          <a:bodyPr/>
+          <a:lstStyle/>
+          <a:p>
+            <a:pPr>
+              <a:defRPr/>
+            </a:pPr>
+            <a:endParaRPr/>
+          </a:p>
+        </p:txBody>
+      </p:sp>
+      <p:sp>
+        <p:nvSpPr>
+          <p:cNvPr id="4" name="Slide Number Placeholder 3"/>
+          <p:cNvSpPr>
+            <a:spLocks noGrp="1"/>
+          </p:cNvSpPr>
+          <p:nvPr>
+            <p:ph type="sldNum" sz="quarter" idx="10"/>
+          </p:nvPr>
+        </p:nvSpPr>
+        <p:spPr bwMode="auto"/>
+        <p:txBody>
+          <a:bodyPr/>
+          <a:lstStyle/>
+          <a:p>
+            <a:pPr>
+              <a:defRPr/>
+            </a:pPr>
+            <a:fld id="{3FA976DD-C229-8E0E-5047-E6BD556EE71C}" type="slidenum">
+              <a:rPr/>
+              <a:t/>
+            </a:fld>
+            <a:endParaRPr/>
+          </a:p>
+        </p:txBody>
+      </p:sp>
+    </p:spTree>
+  </p:cSld>
+</p:notes>
+</file>
+
+<file path=ppt/notesSlides/notesSlide8.xml><?xml version="1.0" encoding="utf-8"?>
+<p:notes xmlns:a="http://schemas.openxmlformats.org/drawingml/2006/main" xmlns:r="http://schemas.openxmlformats.org/officeDocument/2006/relationships" xmlns:p="http://schemas.openxmlformats.org/presentationml/2006/main" xmlns:m="http://schemas.openxmlformats.org/officeDocument/2006/math" xmlns:w="http://schemas.openxmlformats.org/wordprocessingml/2006/main">
+  <p:cSld name="">
+    <p:spTree>
+      <p:nvGrpSpPr>
+        <p:cNvPr id="1" name=""/>
+        <p:cNvGrpSpPr/>
+        <p:nvPr/>
+      </p:nvGrpSpPr>
+      <p:grpSpPr bwMode="auto">
+        <a:xfrm>
+          <a:off x="0" y="0"/>
+          <a:ext cx="0" cy="0"/>
+          <a:chOff x="0" y="0"/>
+          <a:chExt cx="0" cy="0"/>
+        </a:xfrm>
+      </p:grpSpPr>
+      <p:sp>
+        <p:nvSpPr>
+          <p:cNvPr id="2" name="Slide Image Placeholder 1"/>
+          <p:cNvSpPr>
+            <a:spLocks noChangeAspect="1" noGrp="1" noRot="1"/>
+          </p:cNvSpPr>
+          <p:nvPr>
+            <p:ph type="sldImg"/>
+          </p:nvPr>
+        </p:nvSpPr>
+        <p:spPr bwMode="auto"/>
+      </p:sp>
+      <p:sp>
+        <p:nvSpPr>
+          <p:cNvPr id="3" name="Notes Placeholder 2"/>
+          <p:cNvSpPr>
+            <a:spLocks noGrp="1"/>
+          </p:cNvSpPr>
+          <p:nvPr>
+            <p:ph type="body" idx="1"/>
+          </p:nvPr>
+        </p:nvSpPr>
+        <p:spPr bwMode="auto"/>
+        <p:txBody>
+          <a:bodyPr/>
+          <a:lstStyle/>
+          <a:p>
+            <a:pPr>
+              <a:defRPr/>
+            </a:pPr>
+            <a:endParaRPr/>
+          </a:p>
+        </p:txBody>
+      </p:sp>
+      <p:sp>
+        <p:nvSpPr>
+          <p:cNvPr id="4" name="Slide Number Placeholder 3"/>
+          <p:cNvSpPr>
+            <a:spLocks noGrp="1"/>
+          </p:cNvSpPr>
+          <p:nvPr>
+            <p:ph type="sldNum" sz="quarter" idx="10"/>
+          </p:nvPr>
+        </p:nvSpPr>
+        <p:spPr bwMode="auto"/>
+        <p:txBody>
+          <a:bodyPr/>
+          <a:lstStyle/>
+          <a:p>
+            <a:pPr>
+              <a:defRPr/>
+            </a:pPr>
+            <a:fld id="{6EEFC9F8-E25B-5BF3-E9BE-3F07818AFC7B}" type="slidenum">
+              <a:rPr/>
+              <a:t/>
+            </a:fld>
+            <a:endParaRPr/>
+          </a:p>
+        </p:txBody>
+      </p:sp>
+    </p:spTree>
+  </p:cSld>
+</p:notes>
+</file>
+
+<file path=ppt/notesSlides/notesSlide9.xml><?xml version="1.0" encoding="utf-8"?>
+<p:notes xmlns:a="http://schemas.openxmlformats.org/drawingml/2006/main" xmlns:r="http://schemas.openxmlformats.org/officeDocument/2006/relationships" xmlns:p="http://schemas.openxmlformats.org/presentationml/2006/main" xmlns:m="http://schemas.openxmlformats.org/officeDocument/2006/math" xmlns:w="http://schemas.openxmlformats.org/wordprocessingml/2006/main">
+  <p:cSld name="">
+    <p:spTree>
+      <p:nvGrpSpPr>
+        <p:cNvPr id="1" name=""/>
+        <p:cNvGrpSpPr/>
+        <p:nvPr/>
+      </p:nvGrpSpPr>
+      <p:grpSpPr bwMode="auto">
+        <a:xfrm>
+          <a:off x="0" y="0"/>
+          <a:ext cx="0" cy="0"/>
+          <a:chOff x="0" y="0"/>
+          <a:chExt cx="0" cy="0"/>
+        </a:xfrm>
+      </p:grpSpPr>
+      <p:sp>
+        <p:nvSpPr>
+          <p:cNvPr id="2" name="Slide Image Placeholder 1"/>
+          <p:cNvSpPr>
+            <a:spLocks noChangeAspect="1" noGrp="1" noRot="1"/>
+          </p:cNvSpPr>
+          <p:nvPr>
+            <p:ph type="sldImg"/>
+          </p:nvPr>
+        </p:nvSpPr>
+        <p:spPr bwMode="auto"/>
+      </p:sp>
+      <p:sp>
+        <p:nvSpPr>
+          <p:cNvPr id="3" name="Notes Placeholder 2"/>
+          <p:cNvSpPr>
+            <a:spLocks noGrp="1"/>
+          </p:cNvSpPr>
+          <p:nvPr>
+            <p:ph type="body" idx="1"/>
+          </p:nvPr>
+        </p:nvSpPr>
+        <p:spPr bwMode="auto"/>
+        <p:txBody>
+          <a:bodyPr/>
+          <a:lstStyle/>
+          <a:p>
+            <a:pPr>
+              <a:defRPr/>
+            </a:pPr>
+            <a:endParaRPr/>
+          </a:p>
+        </p:txBody>
+      </p:sp>
+      <p:sp>
+        <p:nvSpPr>
+          <p:cNvPr id="4" name="Slide Number Placeholder 3"/>
+          <p:cNvSpPr>
+            <a:spLocks noGrp="1"/>
+          </p:cNvSpPr>
+          <p:nvPr>
+            <p:ph type="sldNum" sz="quarter" idx="10"/>
+          </p:nvPr>
+        </p:nvSpPr>
+        <p:spPr bwMode="auto"/>
+        <p:txBody>
+          <a:bodyPr/>
+          <a:lstStyle/>
+          <a:p>
+            <a:pPr>
+              <a:defRPr/>
+            </a:pPr>
+            <a:fld id="{FA383A23-9978-7875-032B-6982204F9225}" type="slidenum">
+              <a:rPr/>
+              <a:t/>
+            </a:fld>
+            <a:endParaRPr/>
+          </a:p>
+        </p:txBody>
+      </p:sp>
+    </p:spTree>
+  </p:cSld>
+</p:notes>
 </file>
 
 <file path=ppt/slideLayouts/slideLayout1.xml><?xml version="1.0" encoding="utf-8"?>
@@ -6365,7 +9396,7 @@
     <a:masterClrMapping/>
   </p:clrMapOvr>
   <mc:AlternateContent xmlns:mc="http://schemas.openxmlformats.org/markup-compatibility/2006">
-    <mc:Choice xmlns:p14="http://schemas.microsoft.com/office/powerpoint/2010/main" Requires="p14">
+    <mc:Choice xmlns:p159="http://schemas.microsoft.com/office/powerpoint/2015/09/main" xmlns:p14="http://schemas.microsoft.com/office/powerpoint/2010/main" Requires="p159">
       <p:transition p14:dur="2000" advClick="1"/>
     </mc:Choice>
     <mc:Fallback>
@@ -6438,7 +9469,7 @@
             </a:pPr>
             <a:r>
               <a:rPr lang="ru-RU" sz="2400"/>
-              <a:t>соотносится со структурным программированием: программа разбивается на подпрограммы (процедуры, функции) в целях повторного использования кода и разграничения участков кода по смыслу (хороший тон – от общего к частному) и областям видимости </a:t>
+              <a:t>Соотносится со структурным программированием: программа разбивается на подпрограммы (процедуры, функции) в целях повторного использования кода и разграничения участков кода по смыслу (хороший тон – от общего к частному) и областям видимости </a:t>
             </a:r>
             <a:r>
               <a:rPr lang="ru-RU" sz="2400"/>
@@ -6458,7 +9489,7 @@
             </a:pPr>
             <a:r>
               <a:rPr lang="ru-RU" sz="2400"/>
-              <a:t>данные отделяются от поведения. Данные хранятся в глобальных переменных, за счет чего обеспечивается их разделение между функциями (</a:t>
+              <a:t>Данные отделяются от поведения. Данные хранятся в глобальных переменных, за счет чего обеспечивается их разделение между функциями (</a:t>
             </a:r>
             <a:r>
               <a:rPr lang="en-US" sz="2400"/>
@@ -6554,7 +9585,7 @@
     <a:masterClrMapping/>
   </p:clrMapOvr>
   <mc:AlternateContent xmlns:mc="http://schemas.openxmlformats.org/markup-compatibility/2006">
-    <mc:Choice xmlns:p14="http://schemas.microsoft.com/office/powerpoint/2010/main" Requires="p14">
+    <mc:Choice xmlns:p159="http://schemas.microsoft.com/office/powerpoint/2015/09/main" xmlns:p14="http://schemas.microsoft.com/office/powerpoint/2010/main" Requires="p159">
       <p:transition p14:dur="2000" advClick="1"/>
     </mc:Choice>
     <mc:Fallback>
@@ -6806,7 +9837,7 @@
           <p:nvPr/>
         </p:nvPicPr>
         <p:blipFill>
-          <a:blip r:embed="rId2"/>
+          <a:blip r:embed="rId3"/>
           <a:stretch/>
         </p:blipFill>
         <p:spPr bwMode="auto">
@@ -6826,7 +9857,7 @@
           <p:nvPr/>
         </p:nvPicPr>
         <p:blipFill>
-          <a:blip r:embed="rId3"/>
+          <a:blip r:embed="rId4"/>
           <a:stretch/>
         </p:blipFill>
         <p:spPr bwMode="auto">
@@ -6929,7 +9960,7 @@
     <a:masterClrMapping/>
   </p:clrMapOvr>
   <mc:AlternateContent xmlns:mc="http://schemas.openxmlformats.org/markup-compatibility/2006">
-    <mc:Choice xmlns:p14="http://schemas.microsoft.com/office/powerpoint/2010/main" Requires="p14">
+    <mc:Choice xmlns:p159="http://schemas.microsoft.com/office/powerpoint/2015/09/main" xmlns:p14="http://schemas.microsoft.com/office/powerpoint/2010/main" Requires="p159">
       <p:transition p14:dur="2000" advClick="1"/>
     </mc:Choice>
     <mc:Fallback>
@@ -7223,7 +10254,7 @@
           <p:nvPr/>
         </p:nvPicPr>
         <p:blipFill>
-          <a:blip r:embed="rId2"/>
+          <a:blip r:embed="rId3"/>
           <a:stretch/>
         </p:blipFill>
         <p:spPr bwMode="auto">
@@ -7243,7 +10274,7 @@
           <p:nvPr/>
         </p:nvPicPr>
         <p:blipFill>
-          <a:blip r:embed="rId3"/>
+          <a:blip r:embed="rId4"/>
           <a:stretch/>
         </p:blipFill>
         <p:spPr bwMode="auto">
@@ -7263,7 +10294,7 @@
           <p:nvPr/>
         </p:nvPicPr>
         <p:blipFill>
-          <a:blip r:embed="rId4"/>
+          <a:blip r:embed="rId5"/>
           <a:stretch/>
         </p:blipFill>
         <p:spPr bwMode="auto">
@@ -7391,7 +10422,7 @@
     <a:masterClrMapping/>
   </p:clrMapOvr>
   <mc:AlternateContent xmlns:mc="http://schemas.openxmlformats.org/markup-compatibility/2006">
-    <mc:Choice xmlns:p14="http://schemas.microsoft.com/office/powerpoint/2010/main" Requires="p14">
+    <mc:Choice xmlns:p159="http://schemas.microsoft.com/office/powerpoint/2015/09/main" xmlns:p14="http://schemas.microsoft.com/office/powerpoint/2010/main" Requires="p159">
       <p:transition p14:dur="2000" advClick="1"/>
     </mc:Choice>
     <mc:Fallback>
@@ -7712,7 +10743,7 @@
     <a:masterClrMapping/>
   </p:clrMapOvr>
   <mc:AlternateContent xmlns:mc="http://schemas.openxmlformats.org/markup-compatibility/2006">
-    <mc:Choice xmlns:p14="http://schemas.microsoft.com/office/powerpoint/2010/main" Requires="p14">
+    <mc:Choice xmlns:p159="http://schemas.microsoft.com/office/powerpoint/2015/09/main" xmlns:p14="http://schemas.microsoft.com/office/powerpoint/2010/main" Requires="p159">
       <p:transition p14:dur="2000" advClick="1"/>
     </mc:Choice>
     <mc:Fallback>
@@ -7993,7 +11024,7 @@
     <a:masterClrMapping/>
   </p:clrMapOvr>
   <mc:AlternateContent xmlns:mc="http://schemas.openxmlformats.org/markup-compatibility/2006">
-    <mc:Choice xmlns:p14="http://schemas.microsoft.com/office/powerpoint/2010/main" Requires="p14">
+    <mc:Choice xmlns:p159="http://schemas.microsoft.com/office/powerpoint/2015/09/main" xmlns:p14="http://schemas.microsoft.com/office/powerpoint/2010/main" Requires="p159">
       <p:transition p14:dur="2000" advClick="1"/>
     </mc:Choice>
     <mc:Fallback>
@@ -8500,7 +11531,7 @@
     <a:masterClrMapping/>
   </p:clrMapOvr>
   <mc:AlternateContent xmlns:mc="http://schemas.openxmlformats.org/markup-compatibility/2006">
-    <mc:Choice xmlns:p14="http://schemas.microsoft.com/office/powerpoint/2010/main" Requires="p14">
+    <mc:Choice xmlns:p159="http://schemas.microsoft.com/office/powerpoint/2015/09/main" xmlns:p14="http://schemas.microsoft.com/office/powerpoint/2010/main" Requires="p159">
       <p:transition p14:dur="2000" advClick="1"/>
     </mc:Choice>
     <mc:Fallback>
@@ -8561,6 +11592,12 @@
           <a:lstStyle/>
           <a:p>
             <a:pPr>
+              <a:buClr>
+                <a:schemeClr val="accent1"/>
+              </a:buClr>
+              <a:buSzPct val="80000"/>
+              <a:buFont typeface="Wingdings"/>
+              <a:buChar char="Ø"/>
               <a:defRPr/>
             </a:pPr>
             <a:r>
@@ -8664,7 +11701,7 @@
           <p:nvPr/>
         </p:nvPicPr>
         <p:blipFill>
-          <a:blip r:embed="rId2"/>
+          <a:blip r:embed="rId3"/>
           <a:stretch/>
         </p:blipFill>
         <p:spPr bwMode="auto">
@@ -8769,7 +11806,7 @@
           <p:nvPr/>
         </p:nvPicPr>
         <p:blipFill>
-          <a:blip r:embed="rId3"/>
+          <a:blip r:embed="rId4"/>
           <a:stretch/>
         </p:blipFill>
         <p:spPr bwMode="auto">
@@ -8788,7 +11825,7 @@
     <a:masterClrMapping/>
   </p:clrMapOvr>
   <mc:AlternateContent xmlns:mc="http://schemas.openxmlformats.org/markup-compatibility/2006">
-    <mc:Choice xmlns:p14="http://schemas.microsoft.com/office/powerpoint/2010/main" Requires="p14">
+    <mc:Choice xmlns:p159="http://schemas.microsoft.com/office/powerpoint/2015/09/main" xmlns:p14="http://schemas.microsoft.com/office/powerpoint/2010/main" Requires="p159">
       <p:transition p14:dur="2000" advClick="1"/>
     </mc:Choice>
     <mc:Fallback>
@@ -9127,7 +12164,7 @@
           <p:nvPr/>
         </p:nvPicPr>
         <p:blipFill>
-          <a:blip r:embed="rId2"/>
+          <a:blip r:embed="rId3"/>
           <a:stretch/>
         </p:blipFill>
         <p:spPr bwMode="auto">
@@ -9324,7 +12361,7 @@
     <a:masterClrMapping/>
   </p:clrMapOvr>
   <mc:AlternateContent xmlns:mc="http://schemas.openxmlformats.org/markup-compatibility/2006">
-    <mc:Choice xmlns:p14="http://schemas.microsoft.com/office/powerpoint/2010/main" Requires="p14">
+    <mc:Choice xmlns:p159="http://schemas.microsoft.com/office/powerpoint/2015/09/main" xmlns:p14="http://schemas.microsoft.com/office/powerpoint/2010/main" Requires="p159">
       <p:transition p14:dur="2000" advClick="1"/>
     </mc:Choice>
     <mc:Fallback>
@@ -9465,7 +12502,7 @@
           <p:nvPr/>
         </p:nvPicPr>
         <p:blipFill>
-          <a:blip r:embed="rId2"/>
+          <a:blip r:embed="rId3"/>
           <a:stretch/>
         </p:blipFill>
         <p:spPr bwMode="auto">
@@ -10165,7 +13202,7 @@
     <a:masterClrMapping/>
   </p:clrMapOvr>
   <mc:AlternateContent xmlns:mc="http://schemas.openxmlformats.org/markup-compatibility/2006">
-    <mc:Choice xmlns:p14="http://schemas.microsoft.com/office/powerpoint/2010/main" Requires="p14">
+    <mc:Choice xmlns:p159="http://schemas.microsoft.com/office/powerpoint/2015/09/main" xmlns:p14="http://schemas.microsoft.com/office/powerpoint/2010/main" Requires="p159">
       <p:transition p14:dur="2000" advClick="1"/>
     </mc:Choice>
     <mc:Fallback>
@@ -10386,7 +13423,7 @@
     <a:masterClrMapping/>
   </p:clrMapOvr>
   <mc:AlternateContent xmlns:mc="http://schemas.openxmlformats.org/markup-compatibility/2006">
-    <mc:Choice xmlns:p14="http://schemas.microsoft.com/office/powerpoint/2010/main" Requires="p14">
+    <mc:Choice xmlns:p159="http://schemas.microsoft.com/office/powerpoint/2015/09/main" xmlns:p14="http://schemas.microsoft.com/office/powerpoint/2010/main" Requires="p159">
       <p:transition p14:dur="2000" advClick="1"/>
     </mc:Choice>
     <mc:Fallback>
@@ -10593,7 +13630,7 @@
     <a:masterClrMapping/>
   </p:clrMapOvr>
   <mc:AlternateContent xmlns:mc="http://schemas.openxmlformats.org/markup-compatibility/2006">
-    <mc:Choice xmlns:p14="http://schemas.microsoft.com/office/powerpoint/2010/main" Requires="p14">
+    <mc:Choice xmlns:p159="http://schemas.microsoft.com/office/powerpoint/2015/09/main" xmlns:p14="http://schemas.microsoft.com/office/powerpoint/2010/main" Requires="p159">
       <p:transition p14:dur="2000" advClick="1"/>
     </mc:Choice>
     <mc:Fallback>
@@ -11094,7 +14131,7 @@
     <a:masterClrMapping/>
   </p:clrMapOvr>
   <mc:AlternateContent xmlns:mc="http://schemas.openxmlformats.org/markup-compatibility/2006">
-    <mc:Choice xmlns:p14="http://schemas.microsoft.com/office/powerpoint/2010/main" Requires="p14">
+    <mc:Choice xmlns:p159="http://schemas.microsoft.com/office/powerpoint/2015/09/main" xmlns:p14="http://schemas.microsoft.com/office/powerpoint/2010/main" Requires="p159">
       <p:transition p14:dur="2000" advClick="1"/>
     </mc:Choice>
     <mc:Fallback>
@@ -11341,7 +14378,7 @@
           <p:nvPr/>
         </p:nvPicPr>
         <p:blipFill>
-          <a:blip r:embed="rId2"/>
+          <a:blip r:embed="rId3"/>
           <a:srcRect l="0" t="0" r="0" b="13462"/>
           <a:stretch/>
         </p:blipFill>
@@ -11406,7 +14443,7 @@
           <p:nvPr/>
         </p:nvPicPr>
         <p:blipFill>
-          <a:blip r:embed="rId3"/>
+          <a:blip r:embed="rId4"/>
           <a:stretch/>
         </p:blipFill>
         <p:spPr bwMode="auto">
@@ -11469,7 +14506,7 @@
     <a:masterClrMapping/>
   </p:clrMapOvr>
   <mc:AlternateContent xmlns:mc="http://schemas.openxmlformats.org/markup-compatibility/2006">
-    <mc:Choice xmlns:p14="http://schemas.microsoft.com/office/powerpoint/2010/main" Requires="p14">
+    <mc:Choice xmlns:p159="http://schemas.microsoft.com/office/powerpoint/2015/09/main" xmlns:p14="http://schemas.microsoft.com/office/powerpoint/2010/main" Requires="p159">
       <p:transition p14:dur="2000" advClick="1"/>
     </mc:Choice>
     <mc:Fallback>
@@ -11753,7 +14790,7 @@
           <p:nvPr/>
         </p:nvPicPr>
         <p:blipFill>
-          <a:blip r:embed="rId2"/>
+          <a:blip r:embed="rId3"/>
           <a:stretch/>
         </p:blipFill>
         <p:spPr bwMode="auto">
@@ -11775,7 +14812,7 @@
           <p:nvPr/>
         </p:nvPicPr>
         <p:blipFill>
-          <a:blip r:embed="rId3"/>
+          <a:blip r:embed="rId4"/>
           <a:stretch/>
         </p:blipFill>
         <p:spPr bwMode="auto">
@@ -11861,7 +14898,7 @@
           <p:nvPr/>
         </p:nvPicPr>
         <p:blipFill>
-          <a:blip r:embed="rId4"/>
+          <a:blip r:embed="rId5"/>
           <a:srcRect l="0" t="45238" r="84454" b="13462"/>
           <a:stretch/>
         </p:blipFill>
@@ -11959,7 +14996,7 @@
     <a:masterClrMapping/>
   </p:clrMapOvr>
   <mc:AlternateContent xmlns:mc="http://schemas.openxmlformats.org/markup-compatibility/2006">
-    <mc:Choice xmlns:p14="http://schemas.microsoft.com/office/powerpoint/2010/main" Requires="p14">
+    <mc:Choice xmlns:p159="http://schemas.microsoft.com/office/powerpoint/2015/09/main" xmlns:p14="http://schemas.microsoft.com/office/powerpoint/2010/main" Requires="p159">
       <p:transition p14:dur="2000" advClick="1"/>
     </mc:Choice>
     <mc:Fallback>
@@ -12305,7 +15342,7 @@
           <p:nvPr/>
         </p:nvPicPr>
         <p:blipFill>
-          <a:blip r:embed="rId2"/>
+          <a:blip r:embed="rId3"/>
           <a:stretch/>
         </p:blipFill>
         <p:spPr bwMode="auto">
@@ -12327,7 +15364,7 @@
           <p:nvPr/>
         </p:nvPicPr>
         <p:blipFill>
-          <a:blip r:embed="rId3"/>
+          <a:blip r:embed="rId4"/>
           <a:stretch/>
         </p:blipFill>
         <p:spPr bwMode="auto">
@@ -12378,7 +15415,7 @@
     <a:masterClrMapping/>
   </p:clrMapOvr>
   <mc:AlternateContent xmlns:mc="http://schemas.openxmlformats.org/markup-compatibility/2006">
-    <mc:Choice xmlns:p14="http://schemas.microsoft.com/office/powerpoint/2010/main" Requires="p14">
+    <mc:Choice xmlns:p159="http://schemas.microsoft.com/office/powerpoint/2015/09/main" xmlns:p14="http://schemas.microsoft.com/office/powerpoint/2010/main" Requires="p159">
       <p:transition p14:dur="2000" advClick="1"/>
     </mc:Choice>
     <mc:Fallback>
@@ -12590,7 +15627,7 @@
           <p:nvPr/>
         </p:nvPicPr>
         <p:blipFill>
-          <a:blip r:embed="rId2"/>
+          <a:blip r:embed="rId3"/>
           <a:srcRect l="0" t="0" r="0" b="29483"/>
           <a:stretch/>
         </p:blipFill>
@@ -12679,7 +15716,7 @@
           <p:nvPr/>
         </p:nvPicPr>
         <p:blipFill>
-          <a:blip r:embed="rId3"/>
+          <a:blip r:embed="rId4"/>
           <a:stretch/>
         </p:blipFill>
         <p:spPr bwMode="auto">
@@ -12698,7 +15735,7 @@
     <a:masterClrMapping/>
   </p:clrMapOvr>
   <mc:AlternateContent xmlns:mc="http://schemas.openxmlformats.org/markup-compatibility/2006">
-    <mc:Choice xmlns:p14="http://schemas.microsoft.com/office/powerpoint/2010/main" Requires="p14">
+    <mc:Choice xmlns:p159="http://schemas.microsoft.com/office/powerpoint/2015/09/main" xmlns:p14="http://schemas.microsoft.com/office/powerpoint/2010/main" Requires="p159">
       <p:transition p14:dur="2000" advClick="1"/>
     </mc:Choice>
     <mc:Fallback>
@@ -13211,7 +16248,7 @@
           <p:nvPr/>
         </p:nvPicPr>
         <p:blipFill>
-          <a:blip r:embed="rId2"/>
+          <a:blip r:embed="rId3"/>
           <a:stretch/>
         </p:blipFill>
         <p:spPr bwMode="auto">
@@ -13233,7 +16270,7 @@
           <p:nvPr/>
         </p:nvPicPr>
         <p:blipFill>
-          <a:blip r:embed="rId3"/>
+          <a:blip r:embed="rId4"/>
           <a:stretch/>
         </p:blipFill>
         <p:spPr bwMode="auto">
@@ -13389,7 +16426,7 @@
     <a:masterClrMapping/>
   </p:clrMapOvr>
   <mc:AlternateContent xmlns:mc="http://schemas.openxmlformats.org/markup-compatibility/2006">
-    <mc:Choice xmlns:p14="http://schemas.microsoft.com/office/powerpoint/2010/main" Requires="p14">
+    <mc:Choice xmlns:p159="http://schemas.microsoft.com/office/powerpoint/2015/09/main" xmlns:p14="http://schemas.microsoft.com/office/powerpoint/2010/main" Requires="p159">
       <p:transition p14:dur="2000" advClick="1"/>
     </mc:Choice>
     <mc:Fallback>
@@ -13645,7 +16682,7 @@
           <p:nvPr/>
         </p:nvPicPr>
         <p:blipFill>
-          <a:blip r:embed="rId2"/>
+          <a:blip r:embed="rId3"/>
           <a:stretch/>
         </p:blipFill>
         <p:spPr bwMode="auto">
@@ -13706,7 +16743,7 @@
     <a:masterClrMapping/>
   </p:clrMapOvr>
   <mc:AlternateContent xmlns:mc="http://schemas.openxmlformats.org/markup-compatibility/2006">
-    <mc:Choice xmlns:p14="http://schemas.microsoft.com/office/powerpoint/2010/main" Requires="p14">
+    <mc:Choice xmlns:p159="http://schemas.microsoft.com/office/powerpoint/2015/09/main" xmlns:p14="http://schemas.microsoft.com/office/powerpoint/2010/main" Requires="p159">
       <p:transition p14:dur="2000" advClick="1"/>
     </mc:Choice>
     <mc:Fallback>
@@ -13910,7 +16947,7 @@
           <p:nvPr/>
         </p:nvPicPr>
         <p:blipFill>
-          <a:blip r:embed="rId2"/>
+          <a:blip r:embed="rId3"/>
           <a:stretch/>
         </p:blipFill>
         <p:spPr bwMode="auto">
@@ -14179,7 +17216,7 @@
     <a:masterClrMapping/>
   </p:clrMapOvr>
   <mc:AlternateContent xmlns:mc="http://schemas.openxmlformats.org/markup-compatibility/2006">
-    <mc:Choice xmlns:p14="http://schemas.microsoft.com/office/powerpoint/2010/main" Requires="p14">
+    <mc:Choice xmlns:p159="http://schemas.microsoft.com/office/powerpoint/2015/09/main" xmlns:p14="http://schemas.microsoft.com/office/powerpoint/2010/main" Requires="p159">
       <p:transition p14:dur="2000" advClick="1"/>
     </mc:Choice>
     <mc:Fallback>
@@ -14356,7 +17393,7 @@
           <p:nvPr/>
         </p:nvPicPr>
         <p:blipFill>
-          <a:blip r:embed="rId2"/>
+          <a:blip r:embed="rId3"/>
           <a:stretch/>
         </p:blipFill>
         <p:spPr bwMode="auto">
@@ -14378,7 +17415,7 @@
           <p:nvPr/>
         </p:nvPicPr>
         <p:blipFill>
-          <a:blip r:embed="rId3"/>
+          <a:blip r:embed="rId4"/>
           <a:stretch/>
         </p:blipFill>
         <p:spPr bwMode="auto">
@@ -14519,7 +17556,7 @@
     <a:masterClrMapping/>
   </p:clrMapOvr>
   <mc:AlternateContent xmlns:mc="http://schemas.openxmlformats.org/markup-compatibility/2006">
-    <mc:Choice xmlns:p14="http://schemas.microsoft.com/office/powerpoint/2010/main" Requires="p14">
+    <mc:Choice xmlns:p159="http://schemas.microsoft.com/office/powerpoint/2015/09/main" xmlns:p14="http://schemas.microsoft.com/office/powerpoint/2010/main" Requires="p159">
       <p:transition p14:dur="2000" advClick="1"/>
     </mc:Choice>
     <mc:Fallback>
@@ -14669,7 +17706,7 @@
           <p:nvPr/>
         </p:nvPicPr>
         <p:blipFill>
-          <a:blip r:embed="rId2"/>
+          <a:blip r:embed="rId3"/>
           <a:stretch/>
         </p:blipFill>
         <p:spPr bwMode="auto">
@@ -15015,7 +18052,7 @@
           <p:nvPr/>
         </p:nvPicPr>
         <p:blipFill>
-          <a:blip r:embed="rId3"/>
+          <a:blip r:embed="rId4"/>
           <a:stretch/>
         </p:blipFill>
         <p:spPr bwMode="auto">
@@ -15103,7 +18140,7 @@
     <a:masterClrMapping/>
   </p:clrMapOvr>
   <mc:AlternateContent xmlns:mc="http://schemas.openxmlformats.org/markup-compatibility/2006">
-    <mc:Choice xmlns:p14="http://schemas.microsoft.com/office/powerpoint/2010/main" Requires="p14">
+    <mc:Choice xmlns:p159="http://schemas.microsoft.com/office/powerpoint/2015/09/main" xmlns:p14="http://schemas.microsoft.com/office/powerpoint/2010/main" Requires="p159">
       <p:transition p14:dur="2000" advClick="1"/>
     </mc:Choice>
     <mc:Fallback>
@@ -15254,7 +18291,7 @@
             </a:pPr>
             <a:r>
               <a:rPr lang="ru-RU"/>
-              <a:t>Язык может поддерживать несколько парадигм программирования. На </a:t>
+              <a:t>Язык может поддерживать несколько парадигм программирования. Например, на </a:t>
             </a:r>
             <a:r>
               <a:rPr lang="en-US"/>
@@ -15299,13 +18336,13 @@
             <a:endParaRPr lang="ru-RU"/>
           </a:p>
           <a:p>
-            <a:pPr>
+            <a:pPr marL="0" indent="0">
               <a:buClr>
                 <a:schemeClr val="accent1"/>
               </a:buClr>
               <a:buSzPct val="80000"/>
               <a:buFont typeface="Wingdings"/>
-              <a:buChar char="Ø"/>
+              <a:buNone/>
               <a:defRPr/>
             </a:pPr>
             <a:r>
@@ -15382,7 +18419,7 @@
     <a:masterClrMapping/>
   </p:clrMapOvr>
   <mc:AlternateContent xmlns:mc="http://schemas.openxmlformats.org/markup-compatibility/2006">
-    <mc:Choice xmlns:p14="http://schemas.microsoft.com/office/powerpoint/2010/main" Requires="p14">
+    <mc:Choice xmlns:p159="http://schemas.microsoft.com/office/powerpoint/2015/09/main" xmlns:p14="http://schemas.microsoft.com/office/powerpoint/2010/main" Requires="p159">
       <p:transition p14:dur="2000" advClick="1"/>
     </mc:Choice>
     <mc:Fallback>
@@ -15599,7 +18636,7 @@
     <a:masterClrMapping/>
   </p:clrMapOvr>
   <mc:AlternateContent xmlns:mc="http://schemas.openxmlformats.org/markup-compatibility/2006">
-    <mc:Choice xmlns:p14="http://schemas.microsoft.com/office/powerpoint/2010/main" Requires="p14">
+    <mc:Choice xmlns:p159="http://schemas.microsoft.com/office/powerpoint/2015/09/main" xmlns:p14="http://schemas.microsoft.com/office/powerpoint/2010/main" Requires="p159">
       <p:transition p14:dur="2000" advClick="1"/>
     </mc:Choice>
     <mc:Fallback>
@@ -15617,6 +18654,190 @@
 </file>
 
 <file path=ppt/slides/slide31.xml><?xml version="1.0" encoding="utf-8"?>
+<p:sld xmlns:a="http://schemas.openxmlformats.org/drawingml/2006/main" xmlns:r="http://schemas.openxmlformats.org/officeDocument/2006/relationships" xmlns:p="http://schemas.openxmlformats.org/presentationml/2006/main" xmlns:m="http://schemas.openxmlformats.org/officeDocument/2006/math" xmlns:w="http://schemas.openxmlformats.org/wordprocessingml/2006/main" showMasterPhAnim="0" show="1">
+  <p:cSld name="">
+    <p:spTree>
+      <p:nvGrpSpPr>
+        <p:cNvPr id="1" name=""/>
+        <p:cNvGrpSpPr/>
+        <p:nvPr/>
+      </p:nvGrpSpPr>
+      <p:grpSpPr bwMode="auto">
+        <a:xfrm>
+          <a:off x="0" y="0"/>
+          <a:ext cx="0" cy="0"/>
+          <a:chOff x="0" y="0"/>
+          <a:chExt cx="0" cy="0"/>
+        </a:xfrm>
+      </p:grpSpPr>
+      <p:sp>
+        <p:nvSpPr>
+          <p:cNvPr id="1931453507" name="Title 1"/>
+          <p:cNvSpPr>
+            <a:spLocks noGrp="1"/>
+          </p:cNvSpPr>
+          <p:nvPr>
+            <p:ph type="title"/>
+          </p:nvPr>
+        </p:nvSpPr>
+        <p:spPr bwMode="auto">
+          <a:xfrm flipH="0" flipV="0">
+            <a:off x="677333" y="166576"/>
+            <a:ext cx="11288828" cy="709352"/>
+          </a:xfrm>
+        </p:spPr>
+        <p:txBody>
+          <a:bodyPr>
+            <a:normAutofit/>
+          </a:bodyPr>
+          <a:lstStyle>
+            <a:lvl1pPr>
+              <a:defRPr sz="3600"/>
+            </a:lvl1pPr>
+          </a:lstStyle>
+          <a:p>
+            <a:pPr algn="ctr">
+              <a:defRPr/>
+            </a:pPr>
+            <a:r>
+              <a:rPr/>
+              <a:t>Есть ли здесь инкапсуляция?</a:t>
+            </a:r>
+            <a:endParaRPr/>
+          </a:p>
+        </p:txBody>
+      </p:sp>
+      <p:pic>
+        <p:nvPicPr>
+          <p:cNvPr id="2010000838" name=""/>
+          <p:cNvPicPr>
+            <a:picLocks noChangeAspect="1"/>
+          </p:cNvPicPr>
+          <p:nvPr/>
+        </p:nvPicPr>
+        <p:blipFill>
+          <a:blip r:embed="rId3"/>
+          <a:stretch/>
+        </p:blipFill>
+        <p:spPr bwMode="auto">
+          <a:xfrm flipH="0" flipV="0">
+            <a:off x="775290" y="802422"/>
+            <a:ext cx="4396935" cy="5832809"/>
+          </a:xfrm>
+          <a:prstGeom prst="rect">
+            <a:avLst/>
+          </a:prstGeom>
+        </p:spPr>
+      </p:pic>
+    </p:spTree>
+  </p:cSld>
+  <p:clrMapOvr>
+    <a:masterClrMapping/>
+  </p:clrMapOvr>
+  <mc:AlternateContent xmlns:mc="http://schemas.openxmlformats.org/markup-compatibility/2006">
+    <mc:Choice xmlns:p159="http://schemas.microsoft.com/office/powerpoint/2015/09/main" xmlns:p14="http://schemas.microsoft.com/office/powerpoint/2010/main" Requires="p159">
+      <p:transition p14:dur="2000" advClick="1"/>
+    </mc:Choice>
+    <mc:Fallback>
+      <p:transition advClick="1"/>
+    </mc:Fallback>
+  </mc:AlternateContent>
+</p:sld>
+</file>
+
+<file path=ppt/slides/slide32.xml><?xml version="1.0" encoding="utf-8"?>
+<p:sld xmlns:a="http://schemas.openxmlformats.org/drawingml/2006/main" xmlns:r="http://schemas.openxmlformats.org/officeDocument/2006/relationships" xmlns:p="http://schemas.openxmlformats.org/presentationml/2006/main" xmlns:m="http://schemas.openxmlformats.org/officeDocument/2006/math" xmlns:w="http://schemas.openxmlformats.org/wordprocessingml/2006/main" showMasterPhAnim="0" show="1">
+  <p:cSld name="">
+    <p:spTree>
+      <p:nvGrpSpPr>
+        <p:cNvPr id="1" name=""/>
+        <p:cNvGrpSpPr/>
+        <p:nvPr/>
+      </p:nvGrpSpPr>
+      <p:grpSpPr bwMode="auto">
+        <a:xfrm>
+          <a:off x="0" y="0"/>
+          <a:ext cx="0" cy="0"/>
+          <a:chOff x="0" y="0"/>
+          <a:chExt cx="0" cy="0"/>
+        </a:xfrm>
+      </p:grpSpPr>
+      <p:sp>
+        <p:nvSpPr>
+          <p:cNvPr id="1821785455" name="Title 1"/>
+          <p:cNvSpPr>
+            <a:spLocks noGrp="1"/>
+          </p:cNvSpPr>
+          <p:nvPr>
+            <p:ph type="title"/>
+          </p:nvPr>
+        </p:nvSpPr>
+        <p:spPr bwMode="auto">
+          <a:xfrm flipH="0" flipV="0">
+            <a:off x="677333" y="166576"/>
+            <a:ext cx="11288828" cy="709352"/>
+          </a:xfrm>
+        </p:spPr>
+        <p:txBody>
+          <a:bodyPr>
+            <a:normAutofit/>
+          </a:bodyPr>
+          <a:lstStyle>
+            <a:lvl1pPr>
+              <a:defRPr sz="3600"/>
+            </a:lvl1pPr>
+          </a:lstStyle>
+          <a:p>
+            <a:pPr algn="ctr">
+              <a:defRPr/>
+            </a:pPr>
+            <a:r>
+              <a:rPr/>
+              <a:t>Есть ли здесь инкапсуляция?</a:t>
+            </a:r>
+            <a:endParaRPr/>
+          </a:p>
+        </p:txBody>
+      </p:sp>
+      <p:pic>
+        <p:nvPicPr>
+          <p:cNvPr id="860537426" name=""/>
+          <p:cNvPicPr>
+            <a:picLocks noChangeAspect="1"/>
+          </p:cNvPicPr>
+          <p:nvPr/>
+        </p:nvPicPr>
+        <p:blipFill>
+          <a:blip r:embed="rId3"/>
+          <a:stretch/>
+        </p:blipFill>
+        <p:spPr bwMode="auto">
+          <a:xfrm>
+            <a:off x="863895" y="1097441"/>
+            <a:ext cx="4333874" cy="5753099"/>
+          </a:xfrm>
+          <a:prstGeom prst="rect">
+            <a:avLst/>
+          </a:prstGeom>
+        </p:spPr>
+      </p:pic>
+    </p:spTree>
+  </p:cSld>
+  <p:clrMapOvr>
+    <a:masterClrMapping/>
+  </p:clrMapOvr>
+  <mc:AlternateContent xmlns:mc="http://schemas.openxmlformats.org/markup-compatibility/2006">
+    <mc:Choice xmlns:p159="http://schemas.microsoft.com/office/powerpoint/2015/09/main" xmlns:p14="http://schemas.microsoft.com/office/powerpoint/2010/main" Requires="p159">
+      <p:transition p14:dur="2000" advClick="1"/>
+    </mc:Choice>
+    <mc:Fallback>
+      <p:transition advClick="1"/>
+    </mc:Fallback>
+  </mc:AlternateContent>
+</p:sld>
+</file>
+
+<file path=ppt/slides/slide33.xml><?xml version="1.0" encoding="utf-8"?>
 <p:sld xmlns:a="http://schemas.openxmlformats.org/drawingml/2006/main" xmlns:r="http://schemas.openxmlformats.org/officeDocument/2006/relationships" xmlns:p="http://schemas.openxmlformats.org/presentationml/2006/main" xmlns:m="http://schemas.openxmlformats.org/officeDocument/2006/math" xmlns:w="http://schemas.openxmlformats.org/wordprocessingml/2006/main" showMasterPhAnim="0" show="1">
   <p:cSld name="">
     <p:spTree>
@@ -16174,7 +19395,7 @@
     <a:masterClrMapping/>
   </p:clrMapOvr>
   <mc:AlternateContent xmlns:mc="http://schemas.openxmlformats.org/markup-compatibility/2006">
-    <mc:Choice xmlns:p14="http://schemas.microsoft.com/office/powerpoint/2010/main" Requires="p14">
+    <mc:Choice xmlns:p159="http://schemas.microsoft.com/office/powerpoint/2015/09/main" xmlns:p14="http://schemas.microsoft.com/office/powerpoint/2010/main" Requires="p159">
       <p:transition p14:dur="2000" advClick="1"/>
     </mc:Choice>
     <mc:Fallback>
@@ -16540,7 +19761,7 @@
           <p:nvPr/>
         </p:nvPicPr>
         <p:blipFill>
-          <a:blip r:embed="rId2"/>
+          <a:blip r:embed="rId3"/>
           <a:stretch/>
         </p:blipFill>
         <p:spPr bwMode="auto">
@@ -16613,8 +19834,8 @@
         </p:nvSpPr>
         <p:spPr bwMode="auto">
           <a:xfrm>
-            <a:off x="420414" y="6152714"/>
-            <a:ext cx="11202625" cy="338554"/>
+            <a:off x="420413" y="6152713"/>
+            <a:ext cx="11203704" cy="335639"/>
           </a:xfrm>
           <a:prstGeom prst="rect">
             <a:avLst/>
@@ -16642,15 +19863,11 @@
             </a:r>
             <a:r>
               <a:rPr lang="ru-RU" sz="1600"/>
-              <a:t> визуальная, символьная, </a:t>
+              <a:t> визуальная, символьная </a:t>
             </a:r>
             <a:r>
               <a:rPr lang="ru-RU" sz="1600"/>
-              <a:t>метапрограммирование</a:t>
-            </a:r>
-            <a:r>
-              <a:rPr lang="ru-RU" sz="1600"/>
-              <a:t> и </a:t>
+              <a:t>и </a:t>
             </a:r>
             <a:r>
               <a:rPr lang="ru-RU" sz="1600"/>
@@ -16670,7 +19887,7 @@
     <a:masterClrMapping/>
   </p:clrMapOvr>
   <mc:AlternateContent xmlns:mc="http://schemas.openxmlformats.org/markup-compatibility/2006">
-    <mc:Choice xmlns:p14="http://schemas.microsoft.com/office/powerpoint/2010/main" Requires="p14">
+    <mc:Choice xmlns:p159="http://schemas.microsoft.com/office/powerpoint/2015/09/main" xmlns:p14="http://schemas.microsoft.com/office/powerpoint/2010/main" Requires="p159">
       <p:transition p14:dur="2000" advClick="1"/>
     </mc:Choice>
     <mc:Fallback>
@@ -16998,7 +20215,7 @@
     <a:masterClrMapping/>
   </p:clrMapOvr>
   <mc:AlternateContent xmlns:mc="http://schemas.openxmlformats.org/markup-compatibility/2006">
-    <mc:Choice xmlns:p14="http://schemas.microsoft.com/office/powerpoint/2010/main" Requires="p14">
+    <mc:Choice xmlns:p159="http://schemas.microsoft.com/office/powerpoint/2015/09/main" xmlns:p14="http://schemas.microsoft.com/office/powerpoint/2010/main" Requires="p159">
       <p:transition p14:dur="2000" advClick="1"/>
     </mc:Choice>
     <mc:Fallback>
@@ -17414,7 +20631,7 @@
     <a:masterClrMapping/>
   </p:clrMapOvr>
   <mc:AlternateContent xmlns:mc="http://schemas.openxmlformats.org/markup-compatibility/2006">
-    <mc:Choice xmlns:p14="http://schemas.microsoft.com/office/powerpoint/2010/main" Requires="p14">
+    <mc:Choice xmlns:p159="http://schemas.microsoft.com/office/powerpoint/2015/09/main" xmlns:p14="http://schemas.microsoft.com/office/powerpoint/2010/main" Requires="p159">
       <p:transition p14:dur="2000" advClick="1"/>
     </mc:Choice>
     <mc:Fallback>
@@ -17548,6 +20765,12 @@
           <a:lstStyle/>
           <a:p>
             <a:pPr>
+              <a:buClr>
+                <a:schemeClr val="accent1"/>
+              </a:buClr>
+              <a:buSzPct val="80000"/>
+              <a:buFont typeface="Wingdings"/>
+              <a:buChar char="Ø"/>
               <a:defRPr/>
             </a:pPr>
             <a:r>
@@ -17574,6 +20797,12 @@
           </a:p>
           <a:p>
             <a:pPr>
+              <a:buClr>
+                <a:schemeClr val="accent1"/>
+              </a:buClr>
+              <a:buSzPct val="80000"/>
+              <a:buFont typeface="Wingdings"/>
+              <a:buChar char="Ø"/>
               <a:defRPr/>
             </a:pPr>
             <a:r>
@@ -17603,7 +20832,7 @@
           <p:nvPr/>
         </p:nvPicPr>
         <p:blipFill>
-          <a:blip r:embed="rId2"/>
+          <a:blip r:embed="rId3"/>
           <a:stretch/>
         </p:blipFill>
         <p:spPr bwMode="auto">
@@ -17623,7 +20852,7 @@
           <p:nvPr/>
         </p:nvPicPr>
         <p:blipFill>
-          <a:blip r:embed="rId3"/>
+          <a:blip r:embed="rId4"/>
           <a:stretch/>
         </p:blipFill>
         <p:spPr bwMode="auto">
@@ -17766,7 +20995,7 @@
           <p:nvPr/>
         </p:nvPicPr>
         <p:blipFill>
-          <a:blip r:embed="rId4"/>
+          <a:blip r:embed="rId5"/>
           <a:stretch/>
         </p:blipFill>
         <p:spPr bwMode="auto">
@@ -17822,7 +21051,7 @@
     <a:masterClrMapping/>
   </p:clrMapOvr>
   <mc:AlternateContent xmlns:mc="http://schemas.openxmlformats.org/markup-compatibility/2006">
-    <mc:Choice xmlns:p14="http://schemas.microsoft.com/office/powerpoint/2010/main" Requires="p14">
+    <mc:Choice xmlns:p159="http://schemas.microsoft.com/office/powerpoint/2015/09/main" xmlns:p14="http://schemas.microsoft.com/office/powerpoint/2010/main" Requires="p159">
       <p:transition p14:dur="2000" advClick="1"/>
     </mc:Choice>
     <mc:Fallback>
@@ -18083,7 +21312,7 @@
     <a:masterClrMapping/>
   </p:clrMapOvr>
   <mc:AlternateContent xmlns:mc="http://schemas.openxmlformats.org/markup-compatibility/2006">
-    <mc:Choice xmlns:p14="http://schemas.microsoft.com/office/powerpoint/2010/main" Requires="p14">
+    <mc:Choice xmlns:p159="http://schemas.microsoft.com/office/powerpoint/2015/09/main" xmlns:p14="http://schemas.microsoft.com/office/powerpoint/2010/main" Requires="p159">
       <p:transition p14:dur="2000" advClick="1"/>
     </mc:Choice>
     <mc:Fallback>
@@ -18254,7 +21483,7 @@
           <p:nvPr/>
         </p:nvPicPr>
         <p:blipFill>
-          <a:blip r:embed="rId2"/>
+          <a:blip r:embed="rId3"/>
           <a:stretch/>
         </p:blipFill>
         <p:spPr bwMode="auto">
@@ -18274,7 +21503,7 @@
           <p:nvPr/>
         </p:nvPicPr>
         <p:blipFill>
-          <a:blip r:embed="rId3"/>
+          <a:blip r:embed="rId4"/>
           <a:stretch/>
         </p:blipFill>
         <p:spPr bwMode="auto">
@@ -18294,7 +21523,7 @@
           <p:nvPr/>
         </p:nvPicPr>
         <p:blipFill>
-          <a:blip r:embed="rId4"/>
+          <a:blip r:embed="rId5"/>
           <a:stretch/>
         </p:blipFill>
         <p:spPr bwMode="auto">
@@ -18425,7 +21654,7 @@
     <a:masterClrMapping/>
   </p:clrMapOvr>
   <mc:AlternateContent xmlns:mc="http://schemas.openxmlformats.org/markup-compatibility/2006">
-    <mc:Choice xmlns:p14="http://schemas.microsoft.com/office/powerpoint/2010/main" Requires="p14">
+    <mc:Choice xmlns:p159="http://schemas.microsoft.com/office/powerpoint/2015/09/main" xmlns:p14="http://schemas.microsoft.com/office/powerpoint/2010/main" Requires="p159">
       <p:transition p14:dur="2000" advClick="1"/>
     </mc:Choice>
     <mc:Fallback>
@@ -18626,4 +21855,190 @@
   </a:themeElements>
   <a:objectDefaults/>
 </a:theme>
+</file>
+
+<file path=ppt/theme/theme2.xml><?xml version="1.0" encoding="utf-8"?>
+<a:theme xmlns:a="http://schemas.openxmlformats.org/drawingml/2006/main" xmlns:r="http://schemas.openxmlformats.org/officeDocument/2006/relationships" xmlns:p="http://schemas.openxmlformats.org/presentationml/2006/main" name="Грань">
+  <a:themeElements>
+    <a:clrScheme name="Грань">
+      <a:dk1>
+        <a:sysClr val="windowText" lastClr="000000"/>
+      </a:dk1>
+      <a:lt1>
+        <a:sysClr val="window" lastClr="FFFFFF"/>
+      </a:lt1>
+      <a:dk2>
+        <a:srgbClr val="2C3C43"/>
+      </a:dk2>
+      <a:lt2>
+        <a:srgbClr val="EBEBEB"/>
+      </a:lt2>
+      <a:accent1>
+        <a:srgbClr val="90C226"/>
+      </a:accent1>
+      <a:accent2>
+        <a:srgbClr val="54A021"/>
+      </a:accent2>
+      <a:accent3>
+        <a:srgbClr val="E6B91E"/>
+      </a:accent3>
+      <a:accent4>
+        <a:srgbClr val="E76618"/>
+      </a:accent4>
+      <a:accent5>
+        <a:srgbClr val="C42F1A"/>
+      </a:accent5>
+      <a:accent6>
+        <a:srgbClr val="918655"/>
+      </a:accent6>
+      <a:hlink>
+        <a:srgbClr val="99CA3C"/>
+      </a:hlink>
+      <a:folHlink>
+        <a:srgbClr val="B9D181"/>
+      </a:folHlink>
+    </a:clrScheme>
+    <a:fontScheme name="">
+      <a:majorFont>
+        <a:latin typeface="Trebuchet MS"/>
+        <a:ea typeface="Arial"/>
+        <a:cs typeface="Arial"/>
+      </a:majorFont>
+      <a:minorFont>
+        <a:latin typeface="Trebuchet MS"/>
+        <a:ea typeface="Arial"/>
+        <a:cs typeface="Arial"/>
+      </a:minorFont>
+    </a:fontScheme>
+    <a:fmtScheme name="Грань">
+      <a:fillStyleLst>
+        <a:solidFill>
+          <a:schemeClr val="phClr"/>
+        </a:solidFill>
+        <a:gradFill>
+          <a:gsLst>
+            <a:gs pos="0">
+              <a:schemeClr val="phClr">
+                <a:tint val="65000"/>
+                <a:lumMod val="110000"/>
+              </a:schemeClr>
+            </a:gs>
+            <a:gs pos="88000">
+              <a:schemeClr val="phClr">
+                <a:tint val="90000"/>
+              </a:schemeClr>
+            </a:gs>
+          </a:gsLst>
+          <a:lin ang="5400000" scaled="0"/>
+        </a:gradFill>
+        <a:gradFill>
+          <a:gsLst>
+            <a:gs pos="0">
+              <a:schemeClr val="phClr">
+                <a:tint val="96000"/>
+                <a:lumMod val="100000"/>
+              </a:schemeClr>
+            </a:gs>
+            <a:gs pos="78000">
+              <a:schemeClr val="phClr">
+                <a:shade val="94000"/>
+                <a:lumMod val="94000"/>
+              </a:schemeClr>
+            </a:gs>
+          </a:gsLst>
+          <a:lin ang="5400000" scaled="0"/>
+        </a:gradFill>
+      </a:fillStyleLst>
+      <a:lnStyleLst>
+        <a:ln w="12700" cap="rnd" cmpd="sng" algn="ctr">
+          <a:solidFill>
+            <a:schemeClr val="phClr"/>
+          </a:solidFill>
+          <a:prstDash val="solid"/>
+        </a:ln>
+        <a:ln w="19050" cap="rnd" cmpd="sng" algn="ctr">
+          <a:solidFill>
+            <a:schemeClr val="phClr"/>
+          </a:solidFill>
+          <a:prstDash val="solid"/>
+        </a:ln>
+        <a:ln w="25400" cap="rnd" cmpd="sng" algn="ctr">
+          <a:solidFill>
+            <a:schemeClr val="phClr"/>
+          </a:solidFill>
+          <a:prstDash val="solid"/>
+        </a:ln>
+      </a:lnStyleLst>
+      <a:effectStyleLst>
+        <a:effectStyle>
+          <a:effectLst>
+            <a:outerShdw blurRad="40000" dist="20000" dir="5400000" rotWithShape="0">
+              <a:srgbClr val="000000">
+                <a:alpha val="38000"/>
+              </a:srgbClr>
+            </a:outerShdw>
+          </a:effectLst>
+        </a:effectStyle>
+        <a:effectStyle>
+          <a:effectLst>
+            <a:outerShdw blurRad="40000" dist="23000" dir="5400000" rotWithShape="0">
+              <a:srgbClr val="000000">
+                <a:alpha val="35000"/>
+              </a:srgbClr>
+            </a:outerShdw>
+          </a:effectLst>
+        </a:effectStyle>
+        <a:effectStyle>
+          <a:effectLst>
+            <a:outerShdw blurRad="40000" dist="23000" dir="5400000" rotWithShape="0">
+              <a:srgbClr val="000000">
+                <a:alpha val="35000"/>
+              </a:srgbClr>
+            </a:outerShdw>
+          </a:effectLst>
+        </a:effectStyle>
+      </a:effectStyleLst>
+      <a:bgFillStyleLst>
+        <a:solidFill>
+          <a:schemeClr val="phClr"/>
+        </a:solidFill>
+        <a:gradFill>
+          <a:gsLst>
+            <a:gs pos="0">
+              <a:schemeClr val="phClr">
+                <a:tint val="90000"/>
+                <a:lumMod val="104000"/>
+              </a:schemeClr>
+            </a:gs>
+            <a:gs pos="94000">
+              <a:schemeClr val="phClr">
+                <a:shade val="96000"/>
+                <a:lumMod val="82000"/>
+              </a:schemeClr>
+            </a:gs>
+          </a:gsLst>
+          <a:lin ang="5400000" scaled="0"/>
+        </a:gradFill>
+        <a:gradFill>
+          <a:gsLst>
+            <a:gs pos="0">
+              <a:schemeClr val="phClr">
+                <a:tint val="90000"/>
+                <a:lumMod val="110000"/>
+              </a:schemeClr>
+            </a:gs>
+            <a:gs pos="100000">
+              <a:schemeClr val="phClr">
+                <a:shade val="94000"/>
+                <a:lumMod val="96000"/>
+              </a:schemeClr>
+            </a:gs>
+          </a:gsLst>
+          <a:path path="circle"/>
+        </a:gradFill>
+      </a:bgFillStyleLst>
+    </a:fmtScheme>
+  </a:themeElements>
+  <a:objectDefaults/>
+</a:theme>
 </file>
</xml_diff>